<commit_message>
文档 by qiyu 2023-02-26
</commit_message>
<xml_diff>
--- a/doc/Neo4j简介.pptx
+++ b/doc/Neo4j简介.pptx
@@ -13,6 +13,8 @@
     <p:sldId id="257" r:id="rId7"/>
     <p:sldId id="262" r:id="rId8"/>
     <p:sldId id="263" r:id="rId9"/>
+    <p:sldId id="265" r:id="rId10"/>
+    <p:sldId id="264" r:id="rId11"/>
   </p:sldIdLst>
   <p:sldSz cx="12192000" cy="6858000"/>
   <p:notesSz cx="6858000" cy="9144000"/>
@@ -111,6 +113,11 @@
       </a:defRPr>
     </a:lvl9pPr>
   </p:defaultTextStyle>
+  <p:extLst>
+    <p:ext uri="{EFAFB233-063F-42B5-8137-9DF3F51BA10A}">
+      <p15:sldGuideLst xmlns:p15="http://schemas.microsoft.com/office/powerpoint/2012/main"/>
+    </p:ext>
+  </p:extLst>
 </p:presentation>
 </file>
 
@@ -303,7 +310,7 @@
             <a:fld id="{B61BEF0D-F0BB-DE4B-95CE-6DB70DBA9567}" type="datetimeFigureOut">
               <a:rPr lang="en-US" dirty="0"/>
               <a:pPr/>
-              <a:t>2/18/23</a:t>
+              <a:t>2/26/23</a:t>
             </a:fld>
             <a:endParaRPr lang="en-US" dirty="0"/>
           </a:p>
@@ -638,7 +645,7 @@
             <a:fld id="{B61BEF0D-F0BB-DE4B-95CE-6DB70DBA9567}" type="datetimeFigureOut">
               <a:rPr lang="en-US" dirty="0"/>
               <a:pPr/>
-              <a:t>2/18/23</a:t>
+              <a:t>2/26/23</a:t>
             </a:fld>
             <a:endParaRPr lang="en-US" dirty="0"/>
           </a:p>
@@ -1036,7 +1043,7 @@
             <a:fld id="{B61BEF0D-F0BB-DE4B-95CE-6DB70DBA9567}" type="datetimeFigureOut">
               <a:rPr lang="en-US" dirty="0"/>
               <a:pPr/>
-              <a:t>2/18/23</a:t>
+              <a:t>2/26/23</a:t>
             </a:fld>
             <a:endParaRPr lang="en-US" dirty="0"/>
           </a:p>
@@ -1369,7 +1376,7 @@
             <a:fld id="{B61BEF0D-F0BB-DE4B-95CE-6DB70DBA9567}" type="datetimeFigureOut">
               <a:rPr lang="en-US" dirty="0"/>
               <a:pPr/>
-              <a:t>2/18/23</a:t>
+              <a:t>2/26/23</a:t>
             </a:fld>
             <a:endParaRPr lang="en-US" dirty="0"/>
           </a:p>
@@ -1686,7 +1693,7 @@
             <a:fld id="{B61BEF0D-F0BB-DE4B-95CE-6DB70DBA9567}" type="datetimeFigureOut">
               <a:rPr lang="en-US" dirty="0"/>
               <a:pPr/>
-              <a:t>2/18/23</a:t>
+              <a:t>2/26/23</a:t>
             </a:fld>
             <a:endParaRPr lang="en-US" dirty="0"/>
           </a:p>
@@ -2079,7 +2086,7 @@
             <a:fld id="{B61BEF0D-F0BB-DE4B-95CE-6DB70DBA9567}" type="datetimeFigureOut">
               <a:rPr lang="en-US" dirty="0"/>
               <a:pPr/>
-              <a:t>2/18/23</a:t>
+              <a:t>2/26/23</a:t>
             </a:fld>
             <a:endParaRPr lang="en-US" dirty="0"/>
           </a:p>
@@ -2333,7 +2340,7 @@
             <a:fld id="{B61BEF0D-F0BB-DE4B-95CE-6DB70DBA9567}" type="datetimeFigureOut">
               <a:rPr lang="en-US" dirty="0"/>
               <a:pPr/>
-              <a:t>2/18/23</a:t>
+              <a:t>2/26/23</a:t>
             </a:fld>
             <a:endParaRPr lang="en-US" dirty="0"/>
           </a:p>
@@ -2592,7 +2599,7 @@
             <a:fld id="{B61BEF0D-F0BB-DE4B-95CE-6DB70DBA9567}" type="datetimeFigureOut">
               <a:rPr lang="en-US" dirty="0"/>
               <a:pPr/>
-              <a:t>2/18/23</a:t>
+              <a:t>2/26/23</a:t>
             </a:fld>
             <a:endParaRPr lang="en-US" dirty="0"/>
           </a:p>
@@ -2851,7 +2858,7 @@
             <a:fld id="{B61BEF0D-F0BB-DE4B-95CE-6DB70DBA9567}" type="datetimeFigureOut">
               <a:rPr lang="en-US" dirty="0"/>
               <a:pPr/>
-              <a:t>2/18/23</a:t>
+              <a:t>2/26/23</a:t>
             </a:fld>
             <a:endParaRPr lang="en-US" dirty="0"/>
           </a:p>
@@ -3177,7 +3184,7 @@
             <a:fld id="{B61BEF0D-F0BB-DE4B-95CE-6DB70DBA9567}" type="datetimeFigureOut">
               <a:rPr lang="en-US" dirty="0"/>
               <a:pPr/>
-              <a:t>2/18/23</a:t>
+              <a:t>2/26/23</a:t>
             </a:fld>
             <a:endParaRPr lang="en-US" dirty="0"/>
           </a:p>
@@ -3497,7 +3504,7 @@
             <a:fld id="{B61BEF0D-F0BB-DE4B-95CE-6DB70DBA9567}" type="datetimeFigureOut">
               <a:rPr lang="en-US" dirty="0"/>
               <a:pPr/>
-              <a:t>2/18/23</a:t>
+              <a:t>2/26/23</a:t>
             </a:fld>
             <a:endParaRPr lang="en-US" dirty="0"/>
           </a:p>
@@ -3951,7 +3958,7 @@
             <a:fld id="{B61BEF0D-F0BB-DE4B-95CE-6DB70DBA9567}" type="datetimeFigureOut">
               <a:rPr lang="en-US" dirty="0"/>
               <a:pPr/>
-              <a:t>2/18/23</a:t>
+              <a:t>2/26/23</a:t>
             </a:fld>
             <a:endParaRPr lang="en-US" dirty="0"/>
           </a:p>
@@ -4153,7 +4160,7 @@
             <a:fld id="{B61BEF0D-F0BB-DE4B-95CE-6DB70DBA9567}" type="datetimeFigureOut">
               <a:rPr lang="en-US" dirty="0"/>
               <a:pPr/>
-              <a:t>2/18/23</a:t>
+              <a:t>2/26/23</a:t>
             </a:fld>
             <a:endParaRPr lang="en-US" dirty="0"/>
           </a:p>
@@ -4327,7 +4334,7 @@
             <a:fld id="{B61BEF0D-F0BB-DE4B-95CE-6DB70DBA9567}" type="datetimeFigureOut">
               <a:rPr lang="en-US" dirty="0"/>
               <a:pPr/>
-              <a:t>2/18/23</a:t>
+              <a:t>2/26/23</a:t>
             </a:fld>
             <a:endParaRPr lang="en-US" dirty="0"/>
           </a:p>
@@ -4657,7 +4664,7 @@
             <a:fld id="{B61BEF0D-F0BB-DE4B-95CE-6DB70DBA9567}" type="datetimeFigureOut">
               <a:rPr lang="en-US" dirty="0"/>
               <a:pPr/>
-              <a:t>2/18/23</a:t>
+              <a:t>2/26/23</a:t>
             </a:fld>
             <a:endParaRPr lang="en-US" dirty="0"/>
           </a:p>
@@ -4999,7 +5006,7 @@
             <a:fld id="{B61BEF0D-F0BB-DE4B-95CE-6DB70DBA9567}" type="datetimeFigureOut">
               <a:rPr lang="en-US" dirty="0"/>
               <a:pPr/>
-              <a:t>2/18/23</a:t>
+              <a:t>2/26/23</a:t>
             </a:fld>
             <a:endParaRPr lang="en-US" dirty="0"/>
           </a:p>
@@ -7113,7 +7120,7 @@
             <a:fld id="{B61BEF0D-F0BB-DE4B-95CE-6DB70DBA9567}" type="datetimeFigureOut">
               <a:rPr lang="en-US" dirty="0"/>
               <a:pPr/>
-              <a:t>2/18/23</a:t>
+              <a:t>2/26/23</a:t>
             </a:fld>
             <a:endParaRPr lang="en-US" dirty="0"/>
           </a:p>
@@ -7970,6 +7977,296 @@
 </p:sld>
 </file>
 
+<file path=ppt/slides/slide10.xml><?xml version="1.0" encoding="utf-8"?>
+<p:sld xmlns:a="http://schemas.openxmlformats.org/drawingml/2006/main" xmlns:r="http://schemas.openxmlformats.org/officeDocument/2006/relationships" xmlns:p="http://schemas.openxmlformats.org/presentationml/2006/main">
+  <p:cSld>
+    <p:spTree>
+      <p:nvGrpSpPr>
+        <p:cNvPr id="1" name=""/>
+        <p:cNvGrpSpPr/>
+        <p:nvPr/>
+      </p:nvGrpSpPr>
+      <p:grpSpPr>
+        <a:xfrm>
+          <a:off x="0" y="0"/>
+          <a:ext cx="0" cy="0"/>
+          <a:chOff x="0" y="0"/>
+          <a:chExt cx="0" cy="0"/>
+        </a:xfrm>
+      </p:grpSpPr>
+      <p:sp>
+        <p:nvSpPr>
+          <p:cNvPr id="2" name="标题 1">
+            <a:extLst>
+              <a:ext uri="{FF2B5EF4-FFF2-40B4-BE49-F238E27FC236}">
+                <a16:creationId xmlns:a16="http://schemas.microsoft.com/office/drawing/2014/main" id="{8614B14E-6D51-254E-A264-C322354A1F49}"/>
+              </a:ext>
+            </a:extLst>
+          </p:cNvPr>
+          <p:cNvSpPr>
+            <a:spLocks noGrp="1"/>
+          </p:cNvSpPr>
+          <p:nvPr>
+            <p:ph type="title"/>
+          </p:nvPr>
+        </p:nvSpPr>
+        <p:spPr/>
+        <p:txBody>
+          <a:bodyPr/>
+          <a:lstStyle/>
+          <a:p>
+            <a:r>
+              <a:rPr kumimoji="1" lang="en-US" altLang="zh-CN" dirty="0"/>
+              <a:t>Cypher--Neo4j</a:t>
+            </a:r>
+            <a:r>
+              <a:rPr kumimoji="1" lang="zh-CN" altLang="en-US" dirty="0"/>
+              <a:t>查询语言</a:t>
+            </a:r>
+          </a:p>
+        </p:txBody>
+      </p:sp>
+      <p:sp>
+        <p:nvSpPr>
+          <p:cNvPr id="3" name="内容占位符 2">
+            <a:extLst>
+              <a:ext uri="{FF2B5EF4-FFF2-40B4-BE49-F238E27FC236}">
+                <a16:creationId xmlns:a16="http://schemas.microsoft.com/office/drawing/2014/main" id="{5B1259BA-E228-204F-A6C3-B41FD30BFAFE}"/>
+              </a:ext>
+            </a:extLst>
+          </p:cNvPr>
+          <p:cNvSpPr>
+            <a:spLocks noGrp="1"/>
+          </p:cNvSpPr>
+          <p:nvPr>
+            <p:ph idx="1"/>
+          </p:nvPr>
+        </p:nvSpPr>
+        <p:spPr>
+          <a:xfrm>
+            <a:off x="2589212" y="1757077"/>
+            <a:ext cx="8915400" cy="3777622"/>
+          </a:xfrm>
+        </p:spPr>
+        <p:txBody>
+          <a:bodyPr/>
+          <a:lstStyle/>
+          <a:p>
+            <a:r>
+              <a:rPr lang="zh-CN" altLang="en-US" b="0" i="0" dirty="0">
+                <a:solidFill>
+                  <a:srgbClr val="333333"/>
+                </a:solidFill>
+                <a:effectLst/>
+                <a:latin typeface="-apple-system"/>
+              </a:rPr>
+              <a:t>是一种声明式查询语言，遵循</a:t>
+            </a:r>
+            <a:r>
+              <a:rPr lang="en" altLang="zh-CN" b="0" i="0" dirty="0">
+                <a:solidFill>
+                  <a:srgbClr val="333333"/>
+                </a:solidFill>
+                <a:effectLst/>
+                <a:latin typeface="-apple-system"/>
+              </a:rPr>
+              <a:t>SQL</a:t>
+            </a:r>
+            <a:r>
+              <a:rPr lang="zh-CN" altLang="en-US" b="0" i="0" dirty="0">
+                <a:solidFill>
+                  <a:srgbClr val="333333"/>
+                </a:solidFill>
+                <a:effectLst/>
+                <a:latin typeface="-apple-system"/>
+              </a:rPr>
+              <a:t>语法。</a:t>
+            </a:r>
+          </a:p>
+          <a:p>
+            <a:r>
+              <a:rPr lang="zh-CN" altLang="en-US" b="0" i="0" dirty="0">
+                <a:solidFill>
+                  <a:srgbClr val="333333"/>
+                </a:solidFill>
+                <a:effectLst/>
+                <a:latin typeface="-apple-system"/>
+              </a:rPr>
+              <a:t>语法非常简单且人性化，格式可读，</a:t>
+            </a:r>
+            <a:r>
+              <a:rPr lang="zh-CN" altLang="en-US" b="0" i="0" dirty="0">
+                <a:solidFill>
+                  <a:srgbClr val="333333"/>
+                </a:solidFill>
+                <a:effectLst/>
+                <a:latin typeface="Arial" panose="020B0604020202020204" pitchFamily="34" charset="0"/>
+              </a:rPr>
+              <a:t>使用 </a:t>
+            </a:r>
+            <a:r>
+              <a:rPr lang="en" altLang="zh-CN" b="0" i="0" dirty="0">
+                <a:solidFill>
+                  <a:srgbClr val="F73131"/>
+                </a:solidFill>
+                <a:effectLst/>
+                <a:latin typeface="Arial" panose="020B0604020202020204" pitchFamily="34" charset="0"/>
+              </a:rPr>
+              <a:t>ASCII</a:t>
+            </a:r>
+            <a:r>
+              <a:rPr lang="en" altLang="zh-CN" b="0" i="0" dirty="0">
+                <a:solidFill>
+                  <a:srgbClr val="333333"/>
+                </a:solidFill>
+                <a:effectLst/>
+                <a:latin typeface="Arial" panose="020B0604020202020204" pitchFamily="34" charset="0"/>
+              </a:rPr>
+              <a:t> </a:t>
+            </a:r>
+            <a:r>
+              <a:rPr lang="en" altLang="zh-CN" b="0" i="0" dirty="0">
+                <a:solidFill>
+                  <a:srgbClr val="F73131"/>
+                </a:solidFill>
+                <a:effectLst/>
+                <a:latin typeface="Arial" panose="020B0604020202020204" pitchFamily="34" charset="0"/>
+              </a:rPr>
+              <a:t>art</a:t>
+            </a:r>
+            <a:r>
+              <a:rPr lang="en" altLang="zh-CN" b="0" i="0" dirty="0">
+                <a:solidFill>
+                  <a:srgbClr val="333333"/>
+                </a:solidFill>
+                <a:effectLst/>
+                <a:latin typeface="Arial" panose="020B0604020202020204" pitchFamily="34" charset="0"/>
+              </a:rPr>
+              <a:t> </a:t>
+            </a:r>
+            <a:r>
+              <a:rPr lang="zh-CN" altLang="en-US" b="0" i="0" dirty="0">
+                <a:solidFill>
+                  <a:srgbClr val="333333"/>
+                </a:solidFill>
+                <a:effectLst/>
+                <a:latin typeface="Arial" panose="020B0604020202020204" pitchFamily="34" charset="0"/>
+              </a:rPr>
+              <a:t>的形式来表达基于图的模式</a:t>
+            </a:r>
+            <a:r>
+              <a:rPr lang="zh-CN" altLang="en-US" b="0" i="0" dirty="0">
+                <a:solidFill>
+                  <a:srgbClr val="333333"/>
+                </a:solidFill>
+                <a:effectLst/>
+                <a:latin typeface="-apple-system"/>
+              </a:rPr>
+              <a:t>。</a:t>
+            </a:r>
+            <a:endParaRPr lang="en-US" altLang="zh-CN" b="0" i="0" dirty="0">
+              <a:solidFill>
+                <a:srgbClr val="333333"/>
+              </a:solidFill>
+              <a:effectLst/>
+              <a:latin typeface="-apple-system"/>
+            </a:endParaRPr>
+          </a:p>
+          <a:p>
+            <a:r>
+              <a:rPr kumimoji="1" lang="en-US" altLang="zh-CN" dirty="0"/>
+              <a:t>2015</a:t>
+            </a:r>
+            <a:r>
+              <a:rPr kumimoji="1" lang="zh-CN" altLang="en-US" dirty="0"/>
+              <a:t> </a:t>
+            </a:r>
+            <a:r>
+              <a:rPr kumimoji="1" lang="en-US" altLang="zh-CN" dirty="0"/>
+              <a:t>Neo</a:t>
+            </a:r>
+            <a:r>
+              <a:rPr kumimoji="1" lang="zh-CN" altLang="en-US" dirty="0"/>
+              <a:t> </a:t>
+            </a:r>
+            <a:r>
+              <a:rPr kumimoji="1" lang="en-US" altLang="zh-CN" dirty="0"/>
+              <a:t>Tecnology</a:t>
+            </a:r>
+            <a:r>
+              <a:rPr kumimoji="1" lang="zh-CN" altLang="en-US" dirty="0"/>
+              <a:t>发布了</a:t>
+            </a:r>
+            <a:r>
+              <a:rPr kumimoji="1" lang="en-US" altLang="zh-CN" dirty="0"/>
+              <a:t>OpenCypher, </a:t>
+            </a:r>
+            <a:r>
+              <a:rPr kumimoji="1" lang="zh-CN" altLang="en-US" dirty="0"/>
+              <a:t>现在被很多图书库支持。</a:t>
+            </a:r>
+            <a:endParaRPr kumimoji="1" lang="en-US" altLang="zh-CN" dirty="0"/>
+          </a:p>
+          <a:p>
+            <a:endParaRPr lang="zh-CN" altLang="en-US" b="0" i="0" dirty="0">
+              <a:solidFill>
+                <a:srgbClr val="333333"/>
+              </a:solidFill>
+              <a:effectLst/>
+              <a:latin typeface="-apple-system"/>
+            </a:endParaRPr>
+          </a:p>
+          <a:p>
+            <a:endParaRPr kumimoji="1" lang="en-US" altLang="zh-CN" dirty="0"/>
+          </a:p>
+          <a:p>
+            <a:endParaRPr kumimoji="1" lang="zh-CN" altLang="en-US" dirty="0"/>
+          </a:p>
+        </p:txBody>
+      </p:sp>
+      <p:pic>
+        <p:nvPicPr>
+          <p:cNvPr id="4" name="图片 3">
+            <a:extLst>
+              <a:ext uri="{FF2B5EF4-FFF2-40B4-BE49-F238E27FC236}">
+                <a16:creationId xmlns:a16="http://schemas.microsoft.com/office/drawing/2014/main" id="{AF3210DD-F987-804F-AEFA-A6172F539286}"/>
+              </a:ext>
+            </a:extLst>
+          </p:cNvPr>
+          <p:cNvPicPr>
+            <a:picLocks noChangeAspect="1"/>
+          </p:cNvPicPr>
+          <p:nvPr/>
+        </p:nvPicPr>
+        <p:blipFill>
+          <a:blip r:embed="rId2"/>
+          <a:stretch>
+            <a:fillRect/>
+          </a:stretch>
+        </p:blipFill>
+        <p:spPr>
+          <a:xfrm>
+            <a:off x="3388360" y="3037967"/>
+            <a:ext cx="6553463" cy="3570064"/>
+          </a:xfrm>
+          <a:prstGeom prst="rect">
+            <a:avLst/>
+          </a:prstGeom>
+        </p:spPr>
+      </p:pic>
+    </p:spTree>
+    <p:extLst>
+      <p:ext uri="{BB962C8B-B14F-4D97-AF65-F5344CB8AC3E}">
+        <p14:creationId xmlns:p14="http://schemas.microsoft.com/office/powerpoint/2010/main" val="778485964"/>
+      </p:ext>
+    </p:extLst>
+  </p:cSld>
+  <p:clrMapOvr>
+    <a:masterClrMapping/>
+  </p:clrMapOvr>
+</p:sld>
+</file>
+
 <file path=ppt/slides/slide2.xml><?xml version="1.0" encoding="utf-8"?>
 <p:sld xmlns:a="http://schemas.openxmlformats.org/drawingml/2006/main" xmlns:r="http://schemas.openxmlformats.org/officeDocument/2006/relationships" xmlns:p="http://schemas.openxmlformats.org/presentationml/2006/main">
   <p:cSld>
@@ -9635,57 +9932,125 @@
       </p:sp>
       <p:pic>
         <p:nvPicPr>
-          <p:cNvPr id="3074" name="Picture 2">
+          <p:cNvPr id="4" name="图片 3">
             <a:extLst>
               <a:ext uri="{FF2B5EF4-FFF2-40B4-BE49-F238E27FC236}">
-                <a16:creationId xmlns:a16="http://schemas.microsoft.com/office/drawing/2014/main" id="{CE0E4653-6F53-044A-B927-36A6E65140DB}"/>
+                <a16:creationId xmlns:a16="http://schemas.microsoft.com/office/drawing/2014/main" id="{2CDBCAB1-1510-8242-A419-627AD52FA398}"/>
               </a:ext>
             </a:extLst>
           </p:cNvPr>
           <p:cNvPicPr>
-            <a:picLocks noGrp="1" noChangeAspect="1" noChangeArrowheads="1"/>
+            <a:picLocks noChangeAspect="1"/>
           </p:cNvPicPr>
-          <p:nvPr>
-            <p:ph idx="1"/>
-          </p:nvPr>
+          <p:nvPr/>
         </p:nvPicPr>
         <p:blipFill>
-          <a:blip r:embed="rId2">
-            <a:extLst>
-              <a:ext uri="{28A0092B-C50C-407E-A947-70E740481C1C}">
-                <a14:useLocalDpi xmlns:a14="http://schemas.microsoft.com/office/drawing/2010/main" val="0"/>
-              </a:ext>
-            </a:extLst>
-          </a:blip>
-          <a:srcRect/>
+          <a:blip r:embed="rId2"/>
           <a:stretch>
             <a:fillRect/>
           </a:stretch>
         </p:blipFill>
-        <p:spPr bwMode="auto">
+        <p:spPr>
           <a:xfrm>
-            <a:off x="5157788" y="2133600"/>
-            <a:ext cx="3778250" cy="3778250"/>
+            <a:off x="5044141" y="2133600"/>
+            <a:ext cx="3669553" cy="3669553"/>
           </a:xfrm>
           <a:prstGeom prst="rect">
             <a:avLst/>
           </a:prstGeom>
-          <a:noFill/>
-          <a:extLst>
-            <a:ext uri="{909E8E84-426E-40DD-AFC4-6F175D3DCCD1}">
-              <a14:hiddenFill xmlns:a14="http://schemas.microsoft.com/office/drawing/2010/main">
-                <a:solidFill>
-                  <a:srgbClr val="FFFFFF"/>
-                </a:solidFill>
-              </a14:hiddenFill>
-            </a:ext>
-          </a:extLst>
         </p:spPr>
       </p:pic>
     </p:spTree>
     <p:extLst>
       <p:ext uri="{BB962C8B-B14F-4D97-AF65-F5344CB8AC3E}">
         <p14:creationId xmlns:p14="http://schemas.microsoft.com/office/powerpoint/2010/main" val="1596069969"/>
+      </p:ext>
+    </p:extLst>
+  </p:cSld>
+  <p:clrMapOvr>
+    <a:masterClrMapping/>
+  </p:clrMapOvr>
+</p:sld>
+</file>
+
+<file path=ppt/slides/slide9.xml><?xml version="1.0" encoding="utf-8"?>
+<p:sld xmlns:a="http://schemas.openxmlformats.org/drawingml/2006/main" xmlns:r="http://schemas.openxmlformats.org/officeDocument/2006/relationships" xmlns:p="http://schemas.openxmlformats.org/presentationml/2006/main">
+  <p:cSld>
+    <p:spTree>
+      <p:nvGrpSpPr>
+        <p:cNvPr id="1" name=""/>
+        <p:cNvGrpSpPr/>
+        <p:nvPr/>
+      </p:nvGrpSpPr>
+      <p:grpSpPr>
+        <a:xfrm>
+          <a:off x="0" y="0"/>
+          <a:ext cx="0" cy="0"/>
+          <a:chOff x="0" y="0"/>
+          <a:chExt cx="0" cy="0"/>
+        </a:xfrm>
+      </p:grpSpPr>
+      <p:sp>
+        <p:nvSpPr>
+          <p:cNvPr id="2" name="标题 1">
+            <a:extLst>
+              <a:ext uri="{FF2B5EF4-FFF2-40B4-BE49-F238E27FC236}">
+                <a16:creationId xmlns:a16="http://schemas.microsoft.com/office/drawing/2014/main" id="{36953776-DA76-2146-BF8C-26AB4474817B}"/>
+              </a:ext>
+            </a:extLst>
+          </p:cNvPr>
+          <p:cNvSpPr>
+            <a:spLocks noGrp="1"/>
+          </p:cNvSpPr>
+          <p:nvPr>
+            <p:ph type="title"/>
+          </p:nvPr>
+        </p:nvSpPr>
+        <p:spPr/>
+        <p:txBody>
+          <a:bodyPr/>
+          <a:lstStyle/>
+          <a:p>
+            <a:r>
+              <a:rPr kumimoji="1" lang="en-US" altLang="zh-CN" dirty="0"/>
+              <a:t>Neo4j</a:t>
+            </a:r>
+            <a:r>
+              <a:rPr kumimoji="1" lang="zh-CN" altLang="en-US" dirty="0"/>
+              <a:t>基本元素</a:t>
+            </a:r>
+          </a:p>
+        </p:txBody>
+      </p:sp>
+      <p:sp>
+        <p:nvSpPr>
+          <p:cNvPr id="3" name="内容占位符 2">
+            <a:extLst>
+              <a:ext uri="{FF2B5EF4-FFF2-40B4-BE49-F238E27FC236}">
+                <a16:creationId xmlns:a16="http://schemas.microsoft.com/office/drawing/2014/main" id="{77AE8126-BBE3-6146-A319-0DA6E531D7D7}"/>
+              </a:ext>
+            </a:extLst>
+          </p:cNvPr>
+          <p:cNvSpPr>
+            <a:spLocks noGrp="1"/>
+          </p:cNvSpPr>
+          <p:nvPr>
+            <p:ph idx="1"/>
+          </p:nvPr>
+        </p:nvSpPr>
+        <p:spPr/>
+        <p:txBody>
+          <a:bodyPr/>
+          <a:lstStyle/>
+          <a:p>
+            <a:endParaRPr kumimoji="1" lang="zh-CN" altLang="en-US"/>
+          </a:p>
+        </p:txBody>
+      </p:sp>
+    </p:spTree>
+    <p:extLst>
+      <p:ext uri="{BB962C8B-B14F-4D97-AF65-F5344CB8AC3E}">
+        <p14:creationId xmlns:p14="http://schemas.microsoft.com/office/powerpoint/2010/main" val="24335233"/>
       </p:ext>
     </p:extLst>
   </p:cSld>

</xml_diff>

<commit_message>
文档 by qiyu 2023-03-01
</commit_message>
<xml_diff>
--- a/doc/Neo4j简介.pptx
+++ b/doc/Neo4j简介.pptx
@@ -310,7 +310,7 @@
             <a:fld id="{B61BEF0D-F0BB-DE4B-95CE-6DB70DBA9567}" type="datetimeFigureOut">
               <a:rPr lang="en-US" dirty="0"/>
               <a:pPr/>
-              <a:t>2/26/23</a:t>
+              <a:t>3/1/23</a:t>
             </a:fld>
             <a:endParaRPr lang="en-US" dirty="0"/>
           </a:p>
@@ -645,7 +645,7 @@
             <a:fld id="{B61BEF0D-F0BB-DE4B-95CE-6DB70DBA9567}" type="datetimeFigureOut">
               <a:rPr lang="en-US" dirty="0"/>
               <a:pPr/>
-              <a:t>2/26/23</a:t>
+              <a:t>3/1/23</a:t>
             </a:fld>
             <a:endParaRPr lang="en-US" dirty="0"/>
           </a:p>
@@ -1043,7 +1043,7 @@
             <a:fld id="{B61BEF0D-F0BB-DE4B-95CE-6DB70DBA9567}" type="datetimeFigureOut">
               <a:rPr lang="en-US" dirty="0"/>
               <a:pPr/>
-              <a:t>2/26/23</a:t>
+              <a:t>3/1/23</a:t>
             </a:fld>
             <a:endParaRPr lang="en-US" dirty="0"/>
           </a:p>
@@ -1376,7 +1376,7 @@
             <a:fld id="{B61BEF0D-F0BB-DE4B-95CE-6DB70DBA9567}" type="datetimeFigureOut">
               <a:rPr lang="en-US" dirty="0"/>
               <a:pPr/>
-              <a:t>2/26/23</a:t>
+              <a:t>3/1/23</a:t>
             </a:fld>
             <a:endParaRPr lang="en-US" dirty="0"/>
           </a:p>
@@ -1693,7 +1693,7 @@
             <a:fld id="{B61BEF0D-F0BB-DE4B-95CE-6DB70DBA9567}" type="datetimeFigureOut">
               <a:rPr lang="en-US" dirty="0"/>
               <a:pPr/>
-              <a:t>2/26/23</a:t>
+              <a:t>3/1/23</a:t>
             </a:fld>
             <a:endParaRPr lang="en-US" dirty="0"/>
           </a:p>
@@ -2086,7 +2086,7 @@
             <a:fld id="{B61BEF0D-F0BB-DE4B-95CE-6DB70DBA9567}" type="datetimeFigureOut">
               <a:rPr lang="en-US" dirty="0"/>
               <a:pPr/>
-              <a:t>2/26/23</a:t>
+              <a:t>3/1/23</a:t>
             </a:fld>
             <a:endParaRPr lang="en-US" dirty="0"/>
           </a:p>
@@ -2340,7 +2340,7 @@
             <a:fld id="{B61BEF0D-F0BB-DE4B-95CE-6DB70DBA9567}" type="datetimeFigureOut">
               <a:rPr lang="en-US" dirty="0"/>
               <a:pPr/>
-              <a:t>2/26/23</a:t>
+              <a:t>3/1/23</a:t>
             </a:fld>
             <a:endParaRPr lang="en-US" dirty="0"/>
           </a:p>
@@ -2599,7 +2599,7 @@
             <a:fld id="{B61BEF0D-F0BB-DE4B-95CE-6DB70DBA9567}" type="datetimeFigureOut">
               <a:rPr lang="en-US" dirty="0"/>
               <a:pPr/>
-              <a:t>2/26/23</a:t>
+              <a:t>3/1/23</a:t>
             </a:fld>
             <a:endParaRPr lang="en-US" dirty="0"/>
           </a:p>
@@ -2858,7 +2858,7 @@
             <a:fld id="{B61BEF0D-F0BB-DE4B-95CE-6DB70DBA9567}" type="datetimeFigureOut">
               <a:rPr lang="en-US" dirty="0"/>
               <a:pPr/>
-              <a:t>2/26/23</a:t>
+              <a:t>3/1/23</a:t>
             </a:fld>
             <a:endParaRPr lang="en-US" dirty="0"/>
           </a:p>
@@ -3184,7 +3184,7 @@
             <a:fld id="{B61BEF0D-F0BB-DE4B-95CE-6DB70DBA9567}" type="datetimeFigureOut">
               <a:rPr lang="en-US" dirty="0"/>
               <a:pPr/>
-              <a:t>2/26/23</a:t>
+              <a:t>3/1/23</a:t>
             </a:fld>
             <a:endParaRPr lang="en-US" dirty="0"/>
           </a:p>
@@ -3504,7 +3504,7 @@
             <a:fld id="{B61BEF0D-F0BB-DE4B-95CE-6DB70DBA9567}" type="datetimeFigureOut">
               <a:rPr lang="en-US" dirty="0"/>
               <a:pPr/>
-              <a:t>2/26/23</a:t>
+              <a:t>3/1/23</a:t>
             </a:fld>
             <a:endParaRPr lang="en-US" dirty="0"/>
           </a:p>
@@ -3958,7 +3958,7 @@
             <a:fld id="{B61BEF0D-F0BB-DE4B-95CE-6DB70DBA9567}" type="datetimeFigureOut">
               <a:rPr lang="en-US" dirty="0"/>
               <a:pPr/>
-              <a:t>2/26/23</a:t>
+              <a:t>3/1/23</a:t>
             </a:fld>
             <a:endParaRPr lang="en-US" dirty="0"/>
           </a:p>
@@ -4160,7 +4160,7 @@
             <a:fld id="{B61BEF0D-F0BB-DE4B-95CE-6DB70DBA9567}" type="datetimeFigureOut">
               <a:rPr lang="en-US" dirty="0"/>
               <a:pPr/>
-              <a:t>2/26/23</a:t>
+              <a:t>3/1/23</a:t>
             </a:fld>
             <a:endParaRPr lang="en-US" dirty="0"/>
           </a:p>
@@ -4334,7 +4334,7 @@
             <a:fld id="{B61BEF0D-F0BB-DE4B-95CE-6DB70DBA9567}" type="datetimeFigureOut">
               <a:rPr lang="en-US" dirty="0"/>
               <a:pPr/>
-              <a:t>2/26/23</a:t>
+              <a:t>3/1/23</a:t>
             </a:fld>
             <a:endParaRPr lang="en-US" dirty="0"/>
           </a:p>
@@ -4664,7 +4664,7 @@
             <a:fld id="{B61BEF0D-F0BB-DE4B-95CE-6DB70DBA9567}" type="datetimeFigureOut">
               <a:rPr lang="en-US" dirty="0"/>
               <a:pPr/>
-              <a:t>2/26/23</a:t>
+              <a:t>3/1/23</a:t>
             </a:fld>
             <a:endParaRPr lang="en-US" dirty="0"/>
           </a:p>
@@ -5006,7 +5006,7 @@
             <a:fld id="{B61BEF0D-F0BB-DE4B-95CE-6DB70DBA9567}" type="datetimeFigureOut">
               <a:rPr lang="en-US" dirty="0"/>
               <a:pPr/>
-              <a:t>2/26/23</a:t>
+              <a:t>3/1/23</a:t>
             </a:fld>
             <a:endParaRPr lang="en-US" dirty="0"/>
           </a:p>
@@ -7120,7 +7120,7 @@
             <a:fld id="{B61BEF0D-F0BB-DE4B-95CE-6DB70DBA9567}" type="datetimeFigureOut">
               <a:rPr lang="en-US" dirty="0"/>
               <a:pPr/>
-              <a:t>2/26/23</a:t>
+              <a:t>3/1/23</a:t>
             </a:fld>
             <a:endParaRPr lang="en-US" dirty="0"/>
           </a:p>
@@ -8203,7 +8203,7 @@
             </a:r>
             <a:r>
               <a:rPr kumimoji="1" lang="zh-CN" altLang="en-US" dirty="0"/>
-              <a:t>现在被很多图书库支持。</a:t>
+              <a:t>现在被很多图数据库支持。</a:t>
             </a:r>
             <a:endParaRPr kumimoji="1" lang="en-US" altLang="zh-CN" dirty="0"/>
           </a:p>
@@ -8226,34 +8226,91 @@
       </p:sp>
       <p:pic>
         <p:nvPicPr>
-          <p:cNvPr id="4" name="图片 3">
+          <p:cNvPr id="1030" name="Picture 6" descr="sample cypher">
             <a:extLst>
               <a:ext uri="{FF2B5EF4-FFF2-40B4-BE49-F238E27FC236}">
-                <a16:creationId xmlns:a16="http://schemas.microsoft.com/office/drawing/2014/main" id="{AF3210DD-F987-804F-AEFA-A6172F539286}"/>
+                <a16:creationId xmlns:a16="http://schemas.microsoft.com/office/drawing/2014/main" id="{C538ADFB-FAE3-A24E-9436-9203A480B85C}"/>
               </a:ext>
             </a:extLst>
           </p:cNvPr>
           <p:cNvPicPr>
-            <a:picLocks noChangeAspect="1"/>
+            <a:picLocks noChangeAspect="1" noChangeArrowheads="1"/>
           </p:cNvPicPr>
           <p:nvPr/>
         </p:nvPicPr>
         <p:blipFill>
-          <a:blip r:embed="rId2"/>
+          <a:blip r:embed="rId2">
+            <a:extLst>
+              <a:ext uri="{28A0092B-C50C-407E-A947-70E740481C1C}">
+                <a14:useLocalDpi xmlns:a14="http://schemas.microsoft.com/office/drawing/2010/main" val="0"/>
+              </a:ext>
+            </a:extLst>
+          </a:blip>
+          <a:srcRect/>
           <a:stretch>
             <a:fillRect/>
           </a:stretch>
         </p:blipFill>
-        <p:spPr>
+        <p:spPr bwMode="auto">
           <a:xfrm>
-            <a:off x="3388360" y="3037967"/>
-            <a:ext cx="6553463" cy="3570064"/>
+            <a:off x="2852928" y="3037967"/>
+            <a:ext cx="6659880" cy="2885081"/>
           </a:xfrm>
           <a:prstGeom prst="rect">
             <a:avLst/>
           </a:prstGeom>
+          <a:noFill/>
+          <a:extLst>
+            <a:ext uri="{909E8E84-426E-40DD-AFC4-6F175D3DCCD1}">
+              <a14:hiddenFill xmlns:a14="http://schemas.microsoft.com/office/drawing/2010/main">
+                <a:solidFill>
+                  <a:srgbClr val="FFFFFF"/>
+                </a:solidFill>
+              </a14:hiddenFill>
+            </a:ext>
+          </a:extLst>
         </p:spPr>
       </p:pic>
+      <p:sp>
+        <p:nvSpPr>
+          <p:cNvPr id="5" name="文本框 4">
+            <a:extLst>
+              <a:ext uri="{FF2B5EF4-FFF2-40B4-BE49-F238E27FC236}">
+                <a16:creationId xmlns:a16="http://schemas.microsoft.com/office/drawing/2014/main" id="{1FAEDC6B-E1D6-5A4E-98B4-F3AC98E87A08}"/>
+              </a:ext>
+            </a:extLst>
+          </p:cNvPr>
+          <p:cNvSpPr txBox="1"/>
+          <p:nvPr/>
+        </p:nvSpPr>
+        <p:spPr>
+          <a:xfrm>
+            <a:off x="2852928" y="6126480"/>
+            <a:ext cx="5141151" cy="369332"/>
+          </a:xfrm>
+          <a:prstGeom prst="rect">
+            <a:avLst/>
+          </a:prstGeom>
+          <a:noFill/>
+        </p:spPr>
+        <p:txBody>
+          <a:bodyPr wrap="none" rtlCol="0">
+            <a:spAutoFit/>
+          </a:bodyPr>
+          <a:lstStyle/>
+          <a:p>
+            <a:r>
+              <a:rPr kumimoji="1" lang="zh-CN" altLang="en-US" dirty="0"/>
+              <a:t>官网：</a:t>
+            </a:r>
+            <a:r>
+              <a:rPr kumimoji="1" lang="en" altLang="zh-CN" dirty="0"/>
+              <a:t>https://neo4j.com/developer/cypher/</a:t>
+            </a:r>
+            <a:endParaRPr kumimoji="1" lang="zh-CN" altLang="en-US" dirty="0"/>
+          </a:p>
+        </p:txBody>
+      </p:sp>
     </p:spTree>
     <p:extLst>
       <p:ext uri="{BB962C8B-B14F-4D97-AF65-F5344CB8AC3E}">
@@ -8510,6 +8567,9 @@
             <a:endParaRPr lang="en-US" altLang="zh-CN" dirty="0"/>
           </a:p>
           <a:p>
+            <a:pPr marL="0" indent="0">
+              <a:buNone/>
+            </a:pPr>
             <a:br>
               <a:rPr lang="zh-CN" altLang="en-US" dirty="0"/>
             </a:br>
@@ -10038,15 +10098,195 @@
             <p:ph idx="1"/>
           </p:nvPr>
         </p:nvSpPr>
-        <p:spPr/>
+        <p:spPr>
+          <a:xfrm>
+            <a:off x="2589212" y="1347216"/>
+            <a:ext cx="8915400" cy="3777622"/>
+          </a:xfrm>
+        </p:spPr>
         <p:txBody>
           <a:bodyPr/>
           <a:lstStyle/>
           <a:p>
-            <a:endParaRPr kumimoji="1" lang="zh-CN" altLang="en-US"/>
-          </a:p>
-        </p:txBody>
-      </p:sp>
+            <a:r>
+              <a:rPr kumimoji="1" lang="zh-CN" altLang="en-US" dirty="0"/>
+              <a:t>节点（</a:t>
+            </a:r>
+            <a:r>
+              <a:rPr kumimoji="1" lang="en-US" altLang="zh-CN" dirty="0"/>
+              <a:t>Node</a:t>
+            </a:r>
+            <a:r>
+              <a:rPr kumimoji="1" lang="zh-CN" altLang="en-US" dirty="0"/>
+              <a:t>）：对应图里的节点。节点可以包含多个属性和多个标签。</a:t>
+            </a:r>
+            <a:br>
+              <a:rPr kumimoji="1" lang="en-US" altLang="zh-CN" dirty="0"/>
+            </a:br>
+            <a:r>
+              <a:rPr kumimoji="1" lang="en-US" altLang="zh-CN" dirty="0"/>
+              <a:t>person:Actor:Director {‘name’:’xxx’, age:30}</a:t>
+            </a:r>
+          </a:p>
+          <a:p>
+            <a:r>
+              <a:rPr kumimoji="1" lang="zh-CN" altLang="en-US" dirty="0"/>
+              <a:t>关系（</a:t>
+            </a:r>
+            <a:r>
+              <a:rPr kumimoji="1" lang="en-US" altLang="zh-CN" dirty="0"/>
+              <a:t>Relationship</a:t>
+            </a:r>
+            <a:r>
+              <a:rPr kumimoji="1" lang="zh-CN" altLang="en-US" dirty="0"/>
+              <a:t>）：对应图里的边，连接</a:t>
+            </a:r>
+            <a:r>
+              <a:rPr kumimoji="1" lang="en-US" altLang="zh-CN" dirty="0"/>
+              <a:t>2</a:t>
+            </a:r>
+            <a:r>
+              <a:rPr kumimoji="1" lang="zh-CN" altLang="en-US" dirty="0"/>
+              <a:t>个节点。关系可以包含多个属性，但只能有</a:t>
+            </a:r>
+            <a:r>
+              <a:rPr kumimoji="1" lang="en-US" altLang="zh-CN" dirty="0"/>
+              <a:t>1</a:t>
+            </a:r>
+            <a:r>
+              <a:rPr kumimoji="1" lang="zh-CN" altLang="en-US" dirty="0"/>
+              <a:t>个类型（</a:t>
+            </a:r>
+            <a:r>
+              <a:rPr kumimoji="1" lang="en-US" altLang="zh-CN" dirty="0"/>
+              <a:t>type</a:t>
+            </a:r>
+            <a:r>
+              <a:rPr kumimoji="1" lang="zh-CN" altLang="en-US" dirty="0"/>
+              <a:t>）。关系拥有方向，</a:t>
+            </a:r>
+            <a:r>
+              <a:rPr kumimoji="1" lang="en-US" altLang="zh-CN" dirty="0"/>
+              <a:t>Neo4j</a:t>
+            </a:r>
+            <a:r>
+              <a:rPr kumimoji="1" lang="zh-CN" altLang="en-US" dirty="0"/>
+              <a:t>只支持单向关系。</a:t>
+            </a:r>
+            <a:br>
+              <a:rPr kumimoji="1" lang="en-US" altLang="zh-CN" dirty="0"/>
+            </a:br>
+            <a:r>
+              <a:rPr kumimoji="1" lang="en-US" altLang="zh-CN" dirty="0"/>
+              <a:t>(p:Person)-[r:ACTED_IN]-&gt;(m:Movie) </a:t>
+            </a:r>
+            <a:br>
+              <a:rPr kumimoji="1" lang="en-US" altLang="zh-CN" dirty="0"/>
+            </a:br>
+            <a:r>
+              <a:rPr kumimoji="1" lang="en-US" altLang="zh-CN" dirty="0"/>
+              <a:t>ACTED_IN</a:t>
+            </a:r>
+            <a:r>
+              <a:rPr kumimoji="1" lang="zh-CN" altLang="en-US" dirty="0"/>
+              <a:t>对于节点</a:t>
+            </a:r>
+            <a:r>
+              <a:rPr kumimoji="1" lang="en-US" altLang="zh-CN" dirty="0"/>
+              <a:t>Person</a:t>
+            </a:r>
+            <a:r>
+              <a:rPr kumimoji="1" lang="zh-CN" altLang="en-US" dirty="0"/>
+              <a:t>来说是</a:t>
+            </a:r>
+            <a:r>
+              <a:rPr kumimoji="1" lang="en" altLang="zh-CN" dirty="0"/>
+              <a:t>OUTGOING</a:t>
+            </a:r>
+            <a:r>
+              <a:rPr kumimoji="1" lang="zh-CN" altLang="en-US" dirty="0"/>
+              <a:t>，对于</a:t>
+            </a:r>
+            <a:r>
+              <a:rPr kumimoji="1" lang="en-US" altLang="zh-CN" dirty="0"/>
+              <a:t>Movie</a:t>
+            </a:r>
+            <a:r>
+              <a:rPr kumimoji="1" lang="zh-CN" altLang="en-US" dirty="0"/>
+              <a:t>节点是</a:t>
+            </a:r>
+            <a:r>
+              <a:rPr kumimoji="1" lang="en" altLang="zh-CN" dirty="0"/>
+              <a:t>INCOMING</a:t>
+            </a:r>
+            <a:endParaRPr kumimoji="1" lang="en-US" altLang="zh-CN" dirty="0"/>
+          </a:p>
+          <a:p>
+            <a:r>
+              <a:rPr kumimoji="1" lang="zh-CN" altLang="en-US" dirty="0"/>
+              <a:t>属性：节点和关系都可以指定多个属性并参与查询。</a:t>
+            </a:r>
+            <a:endParaRPr kumimoji="1" lang="en-US" altLang="zh-CN" dirty="0"/>
+          </a:p>
+          <a:p>
+            <a:br>
+              <a:rPr kumimoji="1" lang="en-US" altLang="zh-CN" dirty="0"/>
+            </a:br>
+            <a:endParaRPr kumimoji="1" lang="en-US" altLang="zh-CN" dirty="0"/>
+          </a:p>
+          <a:p>
+            <a:pPr marL="0" indent="0">
+              <a:buNone/>
+            </a:pPr>
+            <a:endParaRPr kumimoji="1" lang="en-US" altLang="zh-CN" dirty="0"/>
+          </a:p>
+          <a:p>
+            <a:pPr marL="0" indent="0">
+              <a:buNone/>
+            </a:pPr>
+            <a:r>
+              <a:rPr kumimoji="1" lang="en-US" altLang="zh-CN" dirty="0"/>
+              <a:t>	</a:t>
+            </a:r>
+          </a:p>
+          <a:p>
+            <a:pPr marL="0" indent="0">
+              <a:buNone/>
+            </a:pPr>
+            <a:endParaRPr kumimoji="1" lang="zh-CN" altLang="en-US" dirty="0"/>
+          </a:p>
+        </p:txBody>
+      </p:sp>
+      <p:pic>
+        <p:nvPicPr>
+          <p:cNvPr id="4" name="图片 3">
+            <a:extLst>
+              <a:ext uri="{FF2B5EF4-FFF2-40B4-BE49-F238E27FC236}">
+                <a16:creationId xmlns:a16="http://schemas.microsoft.com/office/drawing/2014/main" id="{8370E82C-2F97-F34E-9663-9E1F9E6B1900}"/>
+              </a:ext>
+            </a:extLst>
+          </p:cNvPr>
+          <p:cNvPicPr>
+            <a:picLocks noChangeAspect="1"/>
+          </p:cNvPicPr>
+          <p:nvPr/>
+        </p:nvPicPr>
+        <p:blipFill>
+          <a:blip r:embed="rId2"/>
+          <a:stretch>
+            <a:fillRect/>
+          </a:stretch>
+        </p:blipFill>
+        <p:spPr>
+          <a:xfrm>
+            <a:off x="3025802" y="3583029"/>
+            <a:ext cx="6140395" cy="3345041"/>
+          </a:xfrm>
+          <a:prstGeom prst="rect">
+            <a:avLst/>
+          </a:prstGeom>
+        </p:spPr>
+      </p:pic>
     </p:spTree>
     <p:extLst>
       <p:ext uri="{BB962C8B-B14F-4D97-AF65-F5344CB8AC3E}">

</xml_diff>

<commit_message>
文档 by qiyu 2023-03-02
</commit_message>
<xml_diff>
--- a/doc/Neo4j简介.pptx
+++ b/doc/Neo4j简介.pptx
@@ -14,11 +14,11 @@
     <p:sldId id="262" r:id="rId8"/>
     <p:sldId id="263" r:id="rId9"/>
     <p:sldId id="265" r:id="rId10"/>
-    <p:sldId id="264" r:id="rId11"/>
-    <p:sldId id="270" r:id="rId12"/>
-    <p:sldId id="268" r:id="rId13"/>
-    <p:sldId id="267" r:id="rId14"/>
-    <p:sldId id="269" r:id="rId15"/>
+    <p:sldId id="269" r:id="rId11"/>
+    <p:sldId id="264" r:id="rId12"/>
+    <p:sldId id="270" r:id="rId13"/>
+    <p:sldId id="268" r:id="rId14"/>
+    <p:sldId id="267" r:id="rId15"/>
     <p:sldId id="266" r:id="rId16"/>
   </p:sldIdLst>
   <p:sldSz cx="12192000" cy="6858000"/>
@@ -315,7 +315,7 @@
             <a:fld id="{B61BEF0D-F0BB-DE4B-95CE-6DB70DBA9567}" type="datetimeFigureOut">
               <a:rPr lang="en-US" dirty="0"/>
               <a:pPr/>
-              <a:t>3/1/23</a:t>
+              <a:t>3/2/23</a:t>
             </a:fld>
             <a:endParaRPr lang="en-US" dirty="0"/>
           </a:p>
@@ -650,7 +650,7 @@
             <a:fld id="{B61BEF0D-F0BB-DE4B-95CE-6DB70DBA9567}" type="datetimeFigureOut">
               <a:rPr lang="en-US" dirty="0"/>
               <a:pPr/>
-              <a:t>3/1/23</a:t>
+              <a:t>3/2/23</a:t>
             </a:fld>
             <a:endParaRPr lang="en-US" dirty="0"/>
           </a:p>
@@ -1048,7 +1048,7 @@
             <a:fld id="{B61BEF0D-F0BB-DE4B-95CE-6DB70DBA9567}" type="datetimeFigureOut">
               <a:rPr lang="en-US" dirty="0"/>
               <a:pPr/>
-              <a:t>3/1/23</a:t>
+              <a:t>3/2/23</a:t>
             </a:fld>
             <a:endParaRPr lang="en-US" dirty="0"/>
           </a:p>
@@ -1381,7 +1381,7 @@
             <a:fld id="{B61BEF0D-F0BB-DE4B-95CE-6DB70DBA9567}" type="datetimeFigureOut">
               <a:rPr lang="en-US" dirty="0"/>
               <a:pPr/>
-              <a:t>3/1/23</a:t>
+              <a:t>3/2/23</a:t>
             </a:fld>
             <a:endParaRPr lang="en-US" dirty="0"/>
           </a:p>
@@ -1698,7 +1698,7 @@
             <a:fld id="{B61BEF0D-F0BB-DE4B-95CE-6DB70DBA9567}" type="datetimeFigureOut">
               <a:rPr lang="en-US" dirty="0"/>
               <a:pPr/>
-              <a:t>3/1/23</a:t>
+              <a:t>3/2/23</a:t>
             </a:fld>
             <a:endParaRPr lang="en-US" dirty="0"/>
           </a:p>
@@ -2091,7 +2091,7 @@
             <a:fld id="{B61BEF0D-F0BB-DE4B-95CE-6DB70DBA9567}" type="datetimeFigureOut">
               <a:rPr lang="en-US" dirty="0"/>
               <a:pPr/>
-              <a:t>3/1/23</a:t>
+              <a:t>3/2/23</a:t>
             </a:fld>
             <a:endParaRPr lang="en-US" dirty="0"/>
           </a:p>
@@ -2345,7 +2345,7 @@
             <a:fld id="{B61BEF0D-F0BB-DE4B-95CE-6DB70DBA9567}" type="datetimeFigureOut">
               <a:rPr lang="en-US" dirty="0"/>
               <a:pPr/>
-              <a:t>3/1/23</a:t>
+              <a:t>3/2/23</a:t>
             </a:fld>
             <a:endParaRPr lang="en-US" dirty="0"/>
           </a:p>
@@ -2604,7 +2604,7 @@
             <a:fld id="{B61BEF0D-F0BB-DE4B-95CE-6DB70DBA9567}" type="datetimeFigureOut">
               <a:rPr lang="en-US" dirty="0"/>
               <a:pPr/>
-              <a:t>3/1/23</a:t>
+              <a:t>3/2/23</a:t>
             </a:fld>
             <a:endParaRPr lang="en-US" dirty="0"/>
           </a:p>
@@ -2863,7 +2863,7 @@
             <a:fld id="{B61BEF0D-F0BB-DE4B-95CE-6DB70DBA9567}" type="datetimeFigureOut">
               <a:rPr lang="en-US" dirty="0"/>
               <a:pPr/>
-              <a:t>3/1/23</a:t>
+              <a:t>3/2/23</a:t>
             </a:fld>
             <a:endParaRPr lang="en-US" dirty="0"/>
           </a:p>
@@ -3189,7 +3189,7 @@
             <a:fld id="{B61BEF0D-F0BB-DE4B-95CE-6DB70DBA9567}" type="datetimeFigureOut">
               <a:rPr lang="en-US" dirty="0"/>
               <a:pPr/>
-              <a:t>3/1/23</a:t>
+              <a:t>3/2/23</a:t>
             </a:fld>
             <a:endParaRPr lang="en-US" dirty="0"/>
           </a:p>
@@ -3509,7 +3509,7 @@
             <a:fld id="{B61BEF0D-F0BB-DE4B-95CE-6DB70DBA9567}" type="datetimeFigureOut">
               <a:rPr lang="en-US" dirty="0"/>
               <a:pPr/>
-              <a:t>3/1/23</a:t>
+              <a:t>3/2/23</a:t>
             </a:fld>
             <a:endParaRPr lang="en-US" dirty="0"/>
           </a:p>
@@ -3963,7 +3963,7 @@
             <a:fld id="{B61BEF0D-F0BB-DE4B-95CE-6DB70DBA9567}" type="datetimeFigureOut">
               <a:rPr lang="en-US" dirty="0"/>
               <a:pPr/>
-              <a:t>3/1/23</a:t>
+              <a:t>3/2/23</a:t>
             </a:fld>
             <a:endParaRPr lang="en-US" dirty="0"/>
           </a:p>
@@ -4165,7 +4165,7 @@
             <a:fld id="{B61BEF0D-F0BB-DE4B-95CE-6DB70DBA9567}" type="datetimeFigureOut">
               <a:rPr lang="en-US" dirty="0"/>
               <a:pPr/>
-              <a:t>3/1/23</a:t>
+              <a:t>3/2/23</a:t>
             </a:fld>
             <a:endParaRPr lang="en-US" dirty="0"/>
           </a:p>
@@ -4339,7 +4339,7 @@
             <a:fld id="{B61BEF0D-F0BB-DE4B-95CE-6DB70DBA9567}" type="datetimeFigureOut">
               <a:rPr lang="en-US" dirty="0"/>
               <a:pPr/>
-              <a:t>3/1/23</a:t>
+              <a:t>3/2/23</a:t>
             </a:fld>
             <a:endParaRPr lang="en-US" dirty="0"/>
           </a:p>
@@ -4669,7 +4669,7 @@
             <a:fld id="{B61BEF0D-F0BB-DE4B-95CE-6DB70DBA9567}" type="datetimeFigureOut">
               <a:rPr lang="en-US" dirty="0"/>
               <a:pPr/>
-              <a:t>3/1/23</a:t>
+              <a:t>3/2/23</a:t>
             </a:fld>
             <a:endParaRPr lang="en-US" dirty="0"/>
           </a:p>
@@ -5011,7 +5011,7 @@
             <a:fld id="{B61BEF0D-F0BB-DE4B-95CE-6DB70DBA9567}" type="datetimeFigureOut">
               <a:rPr lang="en-US" dirty="0"/>
               <a:pPr/>
-              <a:t>3/1/23</a:t>
+              <a:t>3/2/23</a:t>
             </a:fld>
             <a:endParaRPr lang="en-US" dirty="0"/>
           </a:p>
@@ -7125,7 +7125,7 @@
             <a:fld id="{B61BEF0D-F0BB-DE4B-95CE-6DB70DBA9567}" type="datetimeFigureOut">
               <a:rPr lang="en-US" dirty="0"/>
               <a:pPr/>
-              <a:t>3/1/23</a:t>
+              <a:t>3/2/23</a:t>
             </a:fld>
             <a:endParaRPr lang="en-US" dirty="0"/>
           </a:p>
@@ -8004,6 +8004,241 @@
           <p:cNvPr id="2" name="标题 1">
             <a:extLst>
               <a:ext uri="{FF2B5EF4-FFF2-40B4-BE49-F238E27FC236}">
+                <a16:creationId xmlns:a16="http://schemas.microsoft.com/office/drawing/2014/main" id="{F57B46D3-4CF7-3B43-AC29-B94A7CF598DA}"/>
+              </a:ext>
+            </a:extLst>
+          </p:cNvPr>
+          <p:cNvSpPr>
+            <a:spLocks noGrp="1"/>
+          </p:cNvSpPr>
+          <p:nvPr>
+            <p:ph type="title"/>
+          </p:nvPr>
+        </p:nvSpPr>
+        <p:spPr/>
+        <p:txBody>
+          <a:bodyPr/>
+          <a:lstStyle/>
+          <a:p>
+            <a:r>
+              <a:rPr kumimoji="1" lang="en-US" altLang="zh-CN" dirty="0"/>
+              <a:t>Neo4j</a:t>
+            </a:r>
+            <a:r>
+              <a:rPr kumimoji="1" lang="zh-CN" altLang="en-US" dirty="0"/>
+              <a:t> </a:t>
+            </a:r>
+            <a:r>
+              <a:rPr kumimoji="1" lang="en-US" altLang="zh-CN" dirty="0"/>
+              <a:t>Schema</a:t>
+            </a:r>
+            <a:r>
+              <a:rPr kumimoji="1" lang="zh-CN" altLang="en-US" dirty="0"/>
+              <a:t>（模式）</a:t>
+            </a:r>
+          </a:p>
+        </p:txBody>
+      </p:sp>
+      <p:sp>
+        <p:nvSpPr>
+          <p:cNvPr id="3" name="内容占位符 2">
+            <a:extLst>
+              <a:ext uri="{FF2B5EF4-FFF2-40B4-BE49-F238E27FC236}">
+                <a16:creationId xmlns:a16="http://schemas.microsoft.com/office/drawing/2014/main" id="{470B33F9-02A0-0A44-958A-CD8D2E207334}"/>
+              </a:ext>
+            </a:extLst>
+          </p:cNvPr>
+          <p:cNvSpPr>
+            <a:spLocks noGrp="1"/>
+          </p:cNvSpPr>
+          <p:nvPr>
+            <p:ph idx="1"/>
+          </p:nvPr>
+        </p:nvSpPr>
+        <p:spPr/>
+        <p:txBody>
+          <a:bodyPr/>
+          <a:lstStyle/>
+          <a:p>
+            <a:r>
+              <a:rPr kumimoji="1" lang="zh-CN" altLang="en-US" dirty="0"/>
+              <a:t>在</a:t>
+            </a:r>
+            <a:r>
+              <a:rPr kumimoji="1" lang="en-US" altLang="zh-CN" dirty="0"/>
+              <a:t>Neo4j</a:t>
+            </a:r>
+            <a:r>
+              <a:rPr kumimoji="1" lang="zh-CN" altLang="en-US" dirty="0"/>
+              <a:t>中模式指索引（</a:t>
+            </a:r>
+            <a:r>
+              <a:rPr kumimoji="1" lang="en-US" altLang="zh-CN" dirty="0"/>
+              <a:t>index</a:t>
+            </a:r>
+            <a:r>
+              <a:rPr kumimoji="1" lang="zh-CN" altLang="en-US" dirty="0"/>
+              <a:t>）和约束（</a:t>
+            </a:r>
+            <a:r>
+              <a:rPr kumimoji="1" lang="en" altLang="zh-CN" dirty="0"/>
+              <a:t>constraint</a:t>
+            </a:r>
+            <a:r>
+              <a:rPr kumimoji="1" lang="zh-CN" altLang="en-US" dirty="0"/>
+              <a:t>）</a:t>
+            </a:r>
+            <a:endParaRPr kumimoji="1" lang="en-US" altLang="zh-CN" dirty="0"/>
+          </a:p>
+          <a:p>
+            <a:pPr algn="l"/>
+            <a:r>
+              <a:rPr kumimoji="1" lang="zh-CN" altLang="en-US" dirty="0"/>
+              <a:t>可以在指定类型的节点的属性上创建索引</a:t>
+            </a:r>
+            <a:r>
+              <a:rPr kumimoji="1" lang="en-US" altLang="zh-CN" dirty="0"/>
+              <a:t>(</a:t>
+            </a:r>
+            <a:r>
+              <a:rPr kumimoji="1" lang="zh-CN" altLang="en-US" dirty="0"/>
+              <a:t>支持复合索引</a:t>
+            </a:r>
+            <a:r>
+              <a:rPr kumimoji="1" lang="en-US" altLang="zh-CN" dirty="0"/>
+              <a:t>)</a:t>
+            </a:r>
+            <a:r>
+              <a:rPr kumimoji="1" lang="zh-CN" altLang="en-US" dirty="0"/>
+              <a:t>。</a:t>
+            </a:r>
+            <a:br>
+              <a:rPr kumimoji="1" lang="en-US" altLang="zh-CN" dirty="0"/>
+            </a:br>
+            <a:r>
+              <a:rPr kumimoji="1" lang="en" altLang="zh-CN" sz="1600" dirty="0"/>
+              <a:t>CREATE INDEX  FOR (a:Actor) ON (a.name, a.born)</a:t>
+            </a:r>
+          </a:p>
+          <a:p>
+            <a:pPr algn="l"/>
+            <a:r>
+              <a:rPr kumimoji="1" lang="zh-CN" altLang="en-US" dirty="0"/>
+              <a:t>不支持在关系的属性上创建索引。</a:t>
+            </a:r>
+            <a:endParaRPr kumimoji="1" lang="en-US" altLang="zh-CN" dirty="0"/>
+          </a:p>
+          <a:p>
+            <a:pPr algn="l"/>
+            <a:r>
+              <a:rPr kumimoji="1" lang="zh-CN" altLang="en-US" dirty="0"/>
+              <a:t>可以在指定类型的节点的某个属性上创建约束</a:t>
+            </a:r>
+            <a:r>
+              <a:rPr kumimoji="1" lang="en-US" altLang="zh-CN" dirty="0"/>
+              <a:t>(</a:t>
+            </a:r>
+            <a:r>
+              <a:rPr kumimoji="1" lang="zh-CN" altLang="en-US" dirty="0"/>
+              <a:t>不支持复合约束</a:t>
+            </a:r>
+            <a:r>
+              <a:rPr kumimoji="1" lang="en-US" altLang="zh-CN" dirty="0"/>
+              <a:t>)</a:t>
+            </a:r>
+            <a:r>
+              <a:rPr kumimoji="1" lang="zh-CN" altLang="en-US" dirty="0"/>
+              <a:t>。</a:t>
+            </a:r>
+            <a:br>
+              <a:rPr kumimoji="1" lang="en-US" altLang="zh-CN" dirty="0"/>
+            </a:br>
+            <a:r>
+              <a:rPr kumimoji="1" lang="en" altLang="zh-CN" sz="1600" dirty="0"/>
+              <a:t>CREATE CONSTRAINT FOR (movie:Movie) REQUIRE movie.title IS UNIQUE</a:t>
+            </a:r>
+            <a:endParaRPr kumimoji="1" lang="en-US" altLang="zh-CN" sz="1600" dirty="0"/>
+          </a:p>
+          <a:p>
+            <a:pPr algn="l"/>
+            <a:r>
+              <a:rPr kumimoji="1" lang="zh-CN" altLang="en-US" dirty="0"/>
+              <a:t>约束分为唯一约束和属性存在约束（只有企业版才支持）</a:t>
+            </a:r>
+            <a:endParaRPr kumimoji="1" lang="en-US" altLang="zh-CN" dirty="0"/>
+          </a:p>
+          <a:p>
+            <a:pPr algn="l"/>
+            <a:r>
+              <a:rPr kumimoji="1" lang="zh-CN" altLang="en-US" dirty="0"/>
+              <a:t>创建约束会同时创建一个索引。</a:t>
+            </a:r>
+            <a:endParaRPr kumimoji="1" lang="en-US" altLang="zh-CN" dirty="0"/>
+          </a:p>
+          <a:p>
+            <a:pPr algn="l"/>
+            <a:r>
+              <a:rPr kumimoji="1" lang="zh-CN" altLang="en-US" dirty="0"/>
+              <a:t>支持在关系的属性上创建约束。</a:t>
+            </a:r>
+            <a:br>
+              <a:rPr kumimoji="1" lang="en-US" altLang="zh-CN" dirty="0"/>
+            </a:br>
+            <a:endParaRPr lang="en" altLang="zh-CN" b="0" i="0" dirty="0">
+              <a:solidFill>
+                <a:srgbClr val="000000"/>
+              </a:solidFill>
+              <a:effectLst/>
+              <a:latin typeface="Nunito Sans" pitchFamily="2" charset="0"/>
+            </a:endParaRPr>
+          </a:p>
+          <a:p>
+            <a:pPr algn="l"/>
+            <a:endParaRPr lang="en" altLang="zh-CN" b="0" i="0" dirty="0">
+              <a:solidFill>
+                <a:srgbClr val="000000"/>
+              </a:solidFill>
+              <a:effectLst/>
+              <a:latin typeface="Nunito Sans" pitchFamily="2" charset="0"/>
+            </a:endParaRPr>
+          </a:p>
+        </p:txBody>
+      </p:sp>
+    </p:spTree>
+    <p:extLst>
+      <p:ext uri="{BB962C8B-B14F-4D97-AF65-F5344CB8AC3E}">
+        <p14:creationId xmlns:p14="http://schemas.microsoft.com/office/powerpoint/2010/main" val="867333664"/>
+      </p:ext>
+    </p:extLst>
+  </p:cSld>
+  <p:clrMapOvr>
+    <a:masterClrMapping/>
+  </p:clrMapOvr>
+</p:sld>
+</file>
+
+<file path=ppt/slides/slide11.xml><?xml version="1.0" encoding="utf-8"?>
+<p:sld xmlns:a="http://schemas.openxmlformats.org/drawingml/2006/main" xmlns:r="http://schemas.openxmlformats.org/officeDocument/2006/relationships" xmlns:p="http://schemas.openxmlformats.org/presentationml/2006/main">
+  <p:cSld>
+    <p:spTree>
+      <p:nvGrpSpPr>
+        <p:cNvPr id="1" name=""/>
+        <p:cNvGrpSpPr/>
+        <p:nvPr/>
+      </p:nvGrpSpPr>
+      <p:grpSpPr>
+        <a:xfrm>
+          <a:off x="0" y="0"/>
+          <a:ext cx="0" cy="0"/>
+          <a:chOff x="0" y="0"/>
+          <a:chExt cx="0" cy="0"/>
+        </a:xfrm>
+      </p:grpSpPr>
+      <p:sp>
+        <p:nvSpPr>
+          <p:cNvPr id="2" name="标题 1">
+            <a:extLst>
+              <a:ext uri="{FF2B5EF4-FFF2-40B4-BE49-F238E27FC236}">
                 <a16:creationId xmlns:a16="http://schemas.microsoft.com/office/drawing/2014/main" id="{8614B14E-6D51-254E-A264-C322354A1F49}"/>
               </a:ext>
             </a:extLst>
@@ -8329,93 +8564,6 @@
 </p:sld>
 </file>
 
-<file path=ppt/slides/slide11.xml><?xml version="1.0" encoding="utf-8"?>
-<p:sld xmlns:a="http://schemas.openxmlformats.org/drawingml/2006/main" xmlns:r="http://schemas.openxmlformats.org/officeDocument/2006/relationships" xmlns:p="http://schemas.openxmlformats.org/presentationml/2006/main">
-  <p:cSld>
-    <p:spTree>
-      <p:nvGrpSpPr>
-        <p:cNvPr id="1" name=""/>
-        <p:cNvGrpSpPr/>
-        <p:nvPr/>
-      </p:nvGrpSpPr>
-      <p:grpSpPr>
-        <a:xfrm>
-          <a:off x="0" y="0"/>
-          <a:ext cx="0" cy="0"/>
-          <a:chOff x="0" y="0"/>
-          <a:chExt cx="0" cy="0"/>
-        </a:xfrm>
-      </p:grpSpPr>
-      <p:sp>
-        <p:nvSpPr>
-          <p:cNvPr id="2" name="标题 1">
-            <a:extLst>
-              <a:ext uri="{FF2B5EF4-FFF2-40B4-BE49-F238E27FC236}">
-                <a16:creationId xmlns:a16="http://schemas.microsoft.com/office/drawing/2014/main" id="{2E650F0F-5E2B-5F47-9E9D-0DB3413A0D28}"/>
-              </a:ext>
-            </a:extLst>
-          </p:cNvPr>
-          <p:cNvSpPr>
-            <a:spLocks noGrp="1"/>
-          </p:cNvSpPr>
-          <p:nvPr>
-            <p:ph type="title"/>
-          </p:nvPr>
-        </p:nvSpPr>
-        <p:spPr/>
-        <p:txBody>
-          <a:bodyPr/>
-          <a:lstStyle/>
-          <a:p>
-            <a:r>
-              <a:rPr kumimoji="1" lang="en-US" altLang="zh-CN" dirty="0"/>
-              <a:t>Cypher</a:t>
-            </a:r>
-            <a:r>
-              <a:rPr kumimoji="1" lang="zh-CN" altLang="en-US" dirty="0"/>
-              <a:t>执行计划</a:t>
-            </a:r>
-          </a:p>
-        </p:txBody>
-      </p:sp>
-      <p:sp>
-        <p:nvSpPr>
-          <p:cNvPr id="3" name="内容占位符 2">
-            <a:extLst>
-              <a:ext uri="{FF2B5EF4-FFF2-40B4-BE49-F238E27FC236}">
-                <a16:creationId xmlns:a16="http://schemas.microsoft.com/office/drawing/2014/main" id="{B1685F71-928E-DE42-9D53-9EE5ED81F8B6}"/>
-              </a:ext>
-            </a:extLst>
-          </p:cNvPr>
-          <p:cNvSpPr>
-            <a:spLocks noGrp="1"/>
-          </p:cNvSpPr>
-          <p:nvPr>
-            <p:ph idx="1"/>
-          </p:nvPr>
-        </p:nvSpPr>
-        <p:spPr/>
-        <p:txBody>
-          <a:bodyPr/>
-          <a:lstStyle/>
-          <a:p>
-            <a:endParaRPr kumimoji="1" lang="zh-CN" altLang="en-US"/>
-          </a:p>
-        </p:txBody>
-      </p:sp>
-    </p:spTree>
-    <p:extLst>
-      <p:ext uri="{BB962C8B-B14F-4D97-AF65-F5344CB8AC3E}">
-        <p14:creationId xmlns:p14="http://schemas.microsoft.com/office/powerpoint/2010/main" val="2741174435"/>
-      </p:ext>
-    </p:extLst>
-  </p:cSld>
-  <p:clrMapOvr>
-    <a:masterClrMapping/>
-  </p:clrMapOvr>
-</p:sld>
-</file>
-
 <file path=ppt/slides/slide12.xml><?xml version="1.0" encoding="utf-8"?>
 <p:sld xmlns:a="http://schemas.openxmlformats.org/drawingml/2006/main" xmlns:r="http://schemas.openxmlformats.org/officeDocument/2006/relationships" xmlns:p="http://schemas.openxmlformats.org/presentationml/2006/main">
   <p:cSld>
@@ -8438,7 +8586,7 @@
           <p:cNvPr id="2" name="标题 1">
             <a:extLst>
               <a:ext uri="{FF2B5EF4-FFF2-40B4-BE49-F238E27FC236}">
-                <a16:creationId xmlns:a16="http://schemas.microsoft.com/office/drawing/2014/main" id="{D080B79F-ED71-7245-B840-04A9E90E6934}"/>
+                <a16:creationId xmlns:a16="http://schemas.microsoft.com/office/drawing/2014/main" id="{2E650F0F-5E2B-5F47-9E9D-0DB3413A0D28}"/>
               </a:ext>
             </a:extLst>
           </p:cNvPr>
@@ -8456,11 +8604,11 @@
           <a:p>
             <a:r>
               <a:rPr kumimoji="1" lang="en-US" altLang="zh-CN" dirty="0"/>
-              <a:t>Neo4j</a:t>
+              <a:t>Cypher</a:t>
             </a:r>
             <a:r>
               <a:rPr kumimoji="1" lang="zh-CN" altLang="en-US" dirty="0"/>
-              <a:t>免邻接索引</a:t>
+              <a:t>执行计划</a:t>
             </a:r>
           </a:p>
         </p:txBody>
@@ -8470,7 +8618,7 @@
           <p:cNvPr id="3" name="内容占位符 2">
             <a:extLst>
               <a:ext uri="{FF2B5EF4-FFF2-40B4-BE49-F238E27FC236}">
-                <a16:creationId xmlns:a16="http://schemas.microsoft.com/office/drawing/2014/main" id="{AB5601CA-7E82-6B42-9FC2-6F912481A5C7}"/>
+                <a16:creationId xmlns:a16="http://schemas.microsoft.com/office/drawing/2014/main" id="{B1685F71-928E-DE42-9D53-9EE5ED81F8B6}"/>
               </a:ext>
             </a:extLst>
           </p:cNvPr>
@@ -8493,7 +8641,7 @@
     </p:spTree>
     <p:extLst>
       <p:ext uri="{BB962C8B-B14F-4D97-AF65-F5344CB8AC3E}">
-        <p14:creationId xmlns:p14="http://schemas.microsoft.com/office/powerpoint/2010/main" val="3794740161"/>
+        <p14:creationId xmlns:p14="http://schemas.microsoft.com/office/powerpoint/2010/main" val="2741174435"/>
       </p:ext>
     </p:extLst>
   </p:cSld>
@@ -8525,7 +8673,7 @@
           <p:cNvPr id="2" name="标题 1">
             <a:extLst>
               <a:ext uri="{FF2B5EF4-FFF2-40B4-BE49-F238E27FC236}">
-                <a16:creationId xmlns:a16="http://schemas.microsoft.com/office/drawing/2014/main" id="{64AA338F-5E28-8645-9FBA-8CE398797205}"/>
+                <a16:creationId xmlns:a16="http://schemas.microsoft.com/office/drawing/2014/main" id="{D080B79F-ED71-7245-B840-04A9E90E6934}"/>
               </a:ext>
             </a:extLst>
           </p:cNvPr>
@@ -8547,7 +8695,7 @@
             </a:r>
             <a:r>
               <a:rPr kumimoji="1" lang="zh-CN" altLang="en-US" dirty="0"/>
-              <a:t>底层存储结构</a:t>
+              <a:t>免邻接索引</a:t>
             </a:r>
           </a:p>
         </p:txBody>
@@ -8557,7 +8705,7 @@
           <p:cNvPr id="3" name="内容占位符 2">
             <a:extLst>
               <a:ext uri="{FF2B5EF4-FFF2-40B4-BE49-F238E27FC236}">
-                <a16:creationId xmlns:a16="http://schemas.microsoft.com/office/drawing/2014/main" id="{17F8453D-02AA-AE44-B99D-70F1CBCE74C6}"/>
+                <a16:creationId xmlns:a16="http://schemas.microsoft.com/office/drawing/2014/main" id="{AB5601CA-7E82-6B42-9FC2-6F912481A5C7}"/>
               </a:ext>
             </a:extLst>
           </p:cNvPr>
@@ -8580,7 +8728,7 @@
     </p:spTree>
     <p:extLst>
       <p:ext uri="{BB962C8B-B14F-4D97-AF65-F5344CB8AC3E}">
-        <p14:creationId xmlns:p14="http://schemas.microsoft.com/office/powerpoint/2010/main" val="4079489057"/>
+        <p14:creationId xmlns:p14="http://schemas.microsoft.com/office/powerpoint/2010/main" val="3794740161"/>
       </p:ext>
     </p:extLst>
   </p:cSld>
@@ -8612,7 +8760,7 @@
           <p:cNvPr id="2" name="标题 1">
             <a:extLst>
               <a:ext uri="{FF2B5EF4-FFF2-40B4-BE49-F238E27FC236}">
-                <a16:creationId xmlns:a16="http://schemas.microsoft.com/office/drawing/2014/main" id="{F57B46D3-4CF7-3B43-AC29-B94A7CF598DA}"/>
+                <a16:creationId xmlns:a16="http://schemas.microsoft.com/office/drawing/2014/main" id="{64AA338F-5E28-8645-9FBA-8CE398797205}"/>
               </a:ext>
             </a:extLst>
           </p:cNvPr>
@@ -8634,7 +8782,7 @@
             </a:r>
             <a:r>
               <a:rPr kumimoji="1" lang="zh-CN" altLang="en-US" dirty="0"/>
-              <a:t>索引，约束</a:t>
+              <a:t>底层存储结构</a:t>
             </a:r>
           </a:p>
         </p:txBody>
@@ -8644,7 +8792,7 @@
           <p:cNvPr id="3" name="内容占位符 2">
             <a:extLst>
               <a:ext uri="{FF2B5EF4-FFF2-40B4-BE49-F238E27FC236}">
-                <a16:creationId xmlns:a16="http://schemas.microsoft.com/office/drawing/2014/main" id="{470B33F9-02A0-0A44-958A-CD8D2E207334}"/>
+                <a16:creationId xmlns:a16="http://schemas.microsoft.com/office/drawing/2014/main" id="{17F8453D-02AA-AE44-B99D-70F1CBCE74C6}"/>
               </a:ext>
             </a:extLst>
           </p:cNvPr>
@@ -8667,7 +8815,7 @@
     </p:spTree>
     <p:extLst>
       <p:ext uri="{BB962C8B-B14F-4D97-AF65-F5344CB8AC3E}">
-        <p14:creationId xmlns:p14="http://schemas.microsoft.com/office/powerpoint/2010/main" val="867333664"/>
+        <p14:creationId xmlns:p14="http://schemas.microsoft.com/office/powerpoint/2010/main" val="4079489057"/>
       </p:ext>
     </p:extLst>
   </p:cSld>
@@ -10664,7 +10812,7 @@
           <a:p>
             <a:r>
               <a:rPr kumimoji="1" lang="zh-CN" altLang="en-US" dirty="0"/>
-              <a:t>属性：节点和关系都可以指定多个属性并参与查询。</a:t>
+              <a:t>属性：节点和关系都可以指定多个属性并参与查询。属性大小写敏感。</a:t>
             </a:r>
             <a:endParaRPr kumimoji="1" lang="en-US" altLang="zh-CN" dirty="0"/>
           </a:p>

</xml_diff>

<commit_message>
文档 by qiyu 2023-03-05
</commit_message>
<xml_diff>
--- a/doc/Neo4j简介.pptx
+++ b/doc/Neo4j简介.pptx
@@ -13,13 +13,16 @@
     <p:sldId id="257" r:id="rId7"/>
     <p:sldId id="262" r:id="rId8"/>
     <p:sldId id="263" r:id="rId9"/>
-    <p:sldId id="265" r:id="rId10"/>
-    <p:sldId id="269" r:id="rId11"/>
-    <p:sldId id="264" r:id="rId12"/>
-    <p:sldId id="270" r:id="rId13"/>
-    <p:sldId id="268" r:id="rId14"/>
-    <p:sldId id="267" r:id="rId15"/>
-    <p:sldId id="266" r:id="rId16"/>
+    <p:sldId id="273" r:id="rId10"/>
+    <p:sldId id="265" r:id="rId11"/>
+    <p:sldId id="269" r:id="rId12"/>
+    <p:sldId id="264" r:id="rId13"/>
+    <p:sldId id="271" r:id="rId14"/>
+    <p:sldId id="272" r:id="rId15"/>
+    <p:sldId id="270" r:id="rId16"/>
+    <p:sldId id="268" r:id="rId17"/>
+    <p:sldId id="267" r:id="rId18"/>
+    <p:sldId id="266" r:id="rId19"/>
   </p:sldIdLst>
   <p:sldSz cx="12192000" cy="6858000"/>
   <p:notesSz cx="6858000" cy="9144000"/>
@@ -315,7 +318,7 @@
             <a:fld id="{B61BEF0D-F0BB-DE4B-95CE-6DB70DBA9567}" type="datetimeFigureOut">
               <a:rPr lang="en-US" dirty="0"/>
               <a:pPr/>
-              <a:t>3/2/23</a:t>
+              <a:t>3/4/23</a:t>
             </a:fld>
             <a:endParaRPr lang="en-US" dirty="0"/>
           </a:p>
@@ -650,7 +653,7 @@
             <a:fld id="{B61BEF0D-F0BB-DE4B-95CE-6DB70DBA9567}" type="datetimeFigureOut">
               <a:rPr lang="en-US" dirty="0"/>
               <a:pPr/>
-              <a:t>3/2/23</a:t>
+              <a:t>3/4/23</a:t>
             </a:fld>
             <a:endParaRPr lang="en-US" dirty="0"/>
           </a:p>
@@ -1048,7 +1051,7 @@
             <a:fld id="{B61BEF0D-F0BB-DE4B-95CE-6DB70DBA9567}" type="datetimeFigureOut">
               <a:rPr lang="en-US" dirty="0"/>
               <a:pPr/>
-              <a:t>3/2/23</a:t>
+              <a:t>3/4/23</a:t>
             </a:fld>
             <a:endParaRPr lang="en-US" dirty="0"/>
           </a:p>
@@ -1381,7 +1384,7 @@
             <a:fld id="{B61BEF0D-F0BB-DE4B-95CE-6DB70DBA9567}" type="datetimeFigureOut">
               <a:rPr lang="en-US" dirty="0"/>
               <a:pPr/>
-              <a:t>3/2/23</a:t>
+              <a:t>3/4/23</a:t>
             </a:fld>
             <a:endParaRPr lang="en-US" dirty="0"/>
           </a:p>
@@ -1698,7 +1701,7 @@
             <a:fld id="{B61BEF0D-F0BB-DE4B-95CE-6DB70DBA9567}" type="datetimeFigureOut">
               <a:rPr lang="en-US" dirty="0"/>
               <a:pPr/>
-              <a:t>3/2/23</a:t>
+              <a:t>3/4/23</a:t>
             </a:fld>
             <a:endParaRPr lang="en-US" dirty="0"/>
           </a:p>
@@ -2091,7 +2094,7 @@
             <a:fld id="{B61BEF0D-F0BB-DE4B-95CE-6DB70DBA9567}" type="datetimeFigureOut">
               <a:rPr lang="en-US" dirty="0"/>
               <a:pPr/>
-              <a:t>3/2/23</a:t>
+              <a:t>3/4/23</a:t>
             </a:fld>
             <a:endParaRPr lang="en-US" dirty="0"/>
           </a:p>
@@ -2345,7 +2348,7 @@
             <a:fld id="{B61BEF0D-F0BB-DE4B-95CE-6DB70DBA9567}" type="datetimeFigureOut">
               <a:rPr lang="en-US" dirty="0"/>
               <a:pPr/>
-              <a:t>3/2/23</a:t>
+              <a:t>3/4/23</a:t>
             </a:fld>
             <a:endParaRPr lang="en-US" dirty="0"/>
           </a:p>
@@ -2604,7 +2607,7 @@
             <a:fld id="{B61BEF0D-F0BB-DE4B-95CE-6DB70DBA9567}" type="datetimeFigureOut">
               <a:rPr lang="en-US" dirty="0"/>
               <a:pPr/>
-              <a:t>3/2/23</a:t>
+              <a:t>3/4/23</a:t>
             </a:fld>
             <a:endParaRPr lang="en-US" dirty="0"/>
           </a:p>
@@ -2863,7 +2866,7 @@
             <a:fld id="{B61BEF0D-F0BB-DE4B-95CE-6DB70DBA9567}" type="datetimeFigureOut">
               <a:rPr lang="en-US" dirty="0"/>
               <a:pPr/>
-              <a:t>3/2/23</a:t>
+              <a:t>3/4/23</a:t>
             </a:fld>
             <a:endParaRPr lang="en-US" dirty="0"/>
           </a:p>
@@ -3189,7 +3192,7 @@
             <a:fld id="{B61BEF0D-F0BB-DE4B-95CE-6DB70DBA9567}" type="datetimeFigureOut">
               <a:rPr lang="en-US" dirty="0"/>
               <a:pPr/>
-              <a:t>3/2/23</a:t>
+              <a:t>3/4/23</a:t>
             </a:fld>
             <a:endParaRPr lang="en-US" dirty="0"/>
           </a:p>
@@ -3509,7 +3512,7 @@
             <a:fld id="{B61BEF0D-F0BB-DE4B-95CE-6DB70DBA9567}" type="datetimeFigureOut">
               <a:rPr lang="en-US" dirty="0"/>
               <a:pPr/>
-              <a:t>3/2/23</a:t>
+              <a:t>3/4/23</a:t>
             </a:fld>
             <a:endParaRPr lang="en-US" dirty="0"/>
           </a:p>
@@ -3963,7 +3966,7 @@
             <a:fld id="{B61BEF0D-F0BB-DE4B-95CE-6DB70DBA9567}" type="datetimeFigureOut">
               <a:rPr lang="en-US" dirty="0"/>
               <a:pPr/>
-              <a:t>3/2/23</a:t>
+              <a:t>3/4/23</a:t>
             </a:fld>
             <a:endParaRPr lang="en-US" dirty="0"/>
           </a:p>
@@ -4165,7 +4168,7 @@
             <a:fld id="{B61BEF0D-F0BB-DE4B-95CE-6DB70DBA9567}" type="datetimeFigureOut">
               <a:rPr lang="en-US" dirty="0"/>
               <a:pPr/>
-              <a:t>3/2/23</a:t>
+              <a:t>3/4/23</a:t>
             </a:fld>
             <a:endParaRPr lang="en-US" dirty="0"/>
           </a:p>
@@ -4339,7 +4342,7 @@
             <a:fld id="{B61BEF0D-F0BB-DE4B-95CE-6DB70DBA9567}" type="datetimeFigureOut">
               <a:rPr lang="en-US" dirty="0"/>
               <a:pPr/>
-              <a:t>3/2/23</a:t>
+              <a:t>3/4/23</a:t>
             </a:fld>
             <a:endParaRPr lang="en-US" dirty="0"/>
           </a:p>
@@ -4669,7 +4672,7 @@
             <a:fld id="{B61BEF0D-F0BB-DE4B-95CE-6DB70DBA9567}" type="datetimeFigureOut">
               <a:rPr lang="en-US" dirty="0"/>
               <a:pPr/>
-              <a:t>3/2/23</a:t>
+              <a:t>3/4/23</a:t>
             </a:fld>
             <a:endParaRPr lang="en-US" dirty="0"/>
           </a:p>
@@ -5011,7 +5014,7 @@
             <a:fld id="{B61BEF0D-F0BB-DE4B-95CE-6DB70DBA9567}" type="datetimeFigureOut">
               <a:rPr lang="en-US" dirty="0"/>
               <a:pPr/>
-              <a:t>3/2/23</a:t>
+              <a:t>3/4/23</a:t>
             </a:fld>
             <a:endParaRPr lang="en-US" dirty="0"/>
           </a:p>
@@ -7125,7 +7128,7 @@
             <a:fld id="{B61BEF0D-F0BB-DE4B-95CE-6DB70DBA9567}" type="datetimeFigureOut">
               <a:rPr lang="en-US" dirty="0"/>
               <a:pPr/>
-              <a:t>3/2/23</a:t>
+              <a:t>3/4/23</a:t>
             </a:fld>
             <a:endParaRPr lang="en-US" dirty="0"/>
           </a:p>
@@ -8004,6 +8007,273 @@
           <p:cNvPr id="2" name="标题 1">
             <a:extLst>
               <a:ext uri="{FF2B5EF4-FFF2-40B4-BE49-F238E27FC236}">
+                <a16:creationId xmlns:a16="http://schemas.microsoft.com/office/drawing/2014/main" id="{36953776-DA76-2146-BF8C-26AB4474817B}"/>
+              </a:ext>
+            </a:extLst>
+          </p:cNvPr>
+          <p:cNvSpPr>
+            <a:spLocks noGrp="1"/>
+          </p:cNvSpPr>
+          <p:nvPr>
+            <p:ph type="title"/>
+          </p:nvPr>
+        </p:nvSpPr>
+        <p:spPr/>
+        <p:txBody>
+          <a:bodyPr/>
+          <a:lstStyle/>
+          <a:p>
+            <a:r>
+              <a:rPr kumimoji="1" lang="en-US" altLang="zh-CN" dirty="0"/>
+              <a:t>Neo4j</a:t>
+            </a:r>
+            <a:r>
+              <a:rPr kumimoji="1" lang="zh-CN" altLang="en-US" dirty="0"/>
+              <a:t>基本元素</a:t>
+            </a:r>
+          </a:p>
+        </p:txBody>
+      </p:sp>
+      <p:sp>
+        <p:nvSpPr>
+          <p:cNvPr id="3" name="内容占位符 2">
+            <a:extLst>
+              <a:ext uri="{FF2B5EF4-FFF2-40B4-BE49-F238E27FC236}">
+                <a16:creationId xmlns:a16="http://schemas.microsoft.com/office/drawing/2014/main" id="{77AE8126-BBE3-6146-A319-0DA6E531D7D7}"/>
+              </a:ext>
+            </a:extLst>
+          </p:cNvPr>
+          <p:cNvSpPr>
+            <a:spLocks noGrp="1"/>
+          </p:cNvSpPr>
+          <p:nvPr>
+            <p:ph idx="1"/>
+          </p:nvPr>
+        </p:nvSpPr>
+        <p:spPr>
+          <a:xfrm>
+            <a:off x="2589212" y="1347216"/>
+            <a:ext cx="8915400" cy="3777622"/>
+          </a:xfrm>
+        </p:spPr>
+        <p:txBody>
+          <a:bodyPr/>
+          <a:lstStyle/>
+          <a:p>
+            <a:r>
+              <a:rPr kumimoji="1" lang="zh-CN" altLang="en-US" dirty="0"/>
+              <a:t>节点（</a:t>
+            </a:r>
+            <a:r>
+              <a:rPr kumimoji="1" lang="en-US" altLang="zh-CN" dirty="0"/>
+              <a:t>Node</a:t>
+            </a:r>
+            <a:r>
+              <a:rPr kumimoji="1" lang="zh-CN" altLang="en-US" dirty="0"/>
+              <a:t>）：对应图里的节点。节点可以包含多个属性和多个标签。</a:t>
+            </a:r>
+            <a:br>
+              <a:rPr kumimoji="1" lang="en-US" altLang="zh-CN" dirty="0"/>
+            </a:br>
+            <a:r>
+              <a:rPr kumimoji="1" lang="en-US" altLang="zh-CN" dirty="0"/>
+              <a:t>person:Actor:Director {‘name’:’xxx’, age:30}</a:t>
+            </a:r>
+          </a:p>
+          <a:p>
+            <a:r>
+              <a:rPr kumimoji="1" lang="zh-CN" altLang="en-US" dirty="0"/>
+              <a:t>关系（</a:t>
+            </a:r>
+            <a:r>
+              <a:rPr kumimoji="1" lang="en-US" altLang="zh-CN" dirty="0"/>
+              <a:t>Relationship</a:t>
+            </a:r>
+            <a:r>
+              <a:rPr kumimoji="1" lang="zh-CN" altLang="en-US" dirty="0"/>
+              <a:t>）：对应图里的边，连接</a:t>
+            </a:r>
+            <a:r>
+              <a:rPr kumimoji="1" lang="en-US" altLang="zh-CN" dirty="0"/>
+              <a:t>2</a:t>
+            </a:r>
+            <a:r>
+              <a:rPr kumimoji="1" lang="zh-CN" altLang="en-US" dirty="0"/>
+              <a:t>个节点。关系可以包含多个属性，但只能有</a:t>
+            </a:r>
+            <a:r>
+              <a:rPr kumimoji="1" lang="en-US" altLang="zh-CN" dirty="0"/>
+              <a:t>1</a:t>
+            </a:r>
+            <a:r>
+              <a:rPr kumimoji="1" lang="zh-CN" altLang="en-US" dirty="0"/>
+              <a:t>个类型（</a:t>
+            </a:r>
+            <a:r>
+              <a:rPr kumimoji="1" lang="en-US" altLang="zh-CN" dirty="0"/>
+              <a:t>type</a:t>
+            </a:r>
+            <a:r>
+              <a:rPr kumimoji="1" lang="zh-CN" altLang="en-US" dirty="0"/>
+              <a:t>）。关系拥有方向，</a:t>
+            </a:r>
+            <a:r>
+              <a:rPr kumimoji="1" lang="en-US" altLang="zh-CN" dirty="0"/>
+              <a:t>Neo4j</a:t>
+            </a:r>
+            <a:r>
+              <a:rPr kumimoji="1" lang="zh-CN" altLang="en-US" dirty="0"/>
+              <a:t>只支持单向关系。</a:t>
+            </a:r>
+            <a:br>
+              <a:rPr kumimoji="1" lang="en-US" altLang="zh-CN" dirty="0"/>
+            </a:br>
+            <a:r>
+              <a:rPr kumimoji="1" lang="en-US" altLang="zh-CN" dirty="0"/>
+              <a:t>(p:Person)-[r:ACTED_IN]-&gt;(m:Movie) </a:t>
+            </a:r>
+            <a:br>
+              <a:rPr kumimoji="1" lang="en-US" altLang="zh-CN" dirty="0"/>
+            </a:br>
+            <a:r>
+              <a:rPr kumimoji="1" lang="en-US" altLang="zh-CN" dirty="0"/>
+              <a:t>ACTED_IN</a:t>
+            </a:r>
+            <a:r>
+              <a:rPr kumimoji="1" lang="zh-CN" altLang="en-US" dirty="0"/>
+              <a:t>对于节点</a:t>
+            </a:r>
+            <a:r>
+              <a:rPr kumimoji="1" lang="en-US" altLang="zh-CN" dirty="0"/>
+              <a:t>Person</a:t>
+            </a:r>
+            <a:r>
+              <a:rPr kumimoji="1" lang="zh-CN" altLang="en-US" dirty="0"/>
+              <a:t>来说是</a:t>
+            </a:r>
+            <a:r>
+              <a:rPr kumimoji="1" lang="en" altLang="zh-CN" dirty="0"/>
+              <a:t>OUTGOING</a:t>
+            </a:r>
+            <a:r>
+              <a:rPr kumimoji="1" lang="zh-CN" altLang="en-US" dirty="0"/>
+              <a:t>，对于</a:t>
+            </a:r>
+            <a:r>
+              <a:rPr kumimoji="1" lang="en-US" altLang="zh-CN" dirty="0"/>
+              <a:t>Movie</a:t>
+            </a:r>
+            <a:r>
+              <a:rPr kumimoji="1" lang="zh-CN" altLang="en-US" dirty="0"/>
+              <a:t>节点是</a:t>
+            </a:r>
+            <a:r>
+              <a:rPr kumimoji="1" lang="en" altLang="zh-CN" dirty="0"/>
+              <a:t>INCOMING</a:t>
+            </a:r>
+            <a:endParaRPr kumimoji="1" lang="en-US" altLang="zh-CN" dirty="0"/>
+          </a:p>
+          <a:p>
+            <a:r>
+              <a:rPr kumimoji="1" lang="zh-CN" altLang="en-US" dirty="0"/>
+              <a:t>属性：节点和关系都可以指定多个属性并参与查询。属性大小写敏感。</a:t>
+            </a:r>
+            <a:endParaRPr kumimoji="1" lang="en-US" altLang="zh-CN" dirty="0"/>
+          </a:p>
+          <a:p>
+            <a:br>
+              <a:rPr kumimoji="1" lang="en-US" altLang="zh-CN" dirty="0"/>
+            </a:br>
+            <a:endParaRPr kumimoji="1" lang="en-US" altLang="zh-CN" dirty="0"/>
+          </a:p>
+          <a:p>
+            <a:pPr marL="0" indent="0">
+              <a:buNone/>
+            </a:pPr>
+            <a:endParaRPr kumimoji="1" lang="en-US" altLang="zh-CN" dirty="0"/>
+          </a:p>
+          <a:p>
+            <a:pPr marL="0" indent="0">
+              <a:buNone/>
+            </a:pPr>
+            <a:r>
+              <a:rPr kumimoji="1" lang="en-US" altLang="zh-CN" dirty="0"/>
+              <a:t>	</a:t>
+            </a:r>
+          </a:p>
+          <a:p>
+            <a:pPr marL="0" indent="0">
+              <a:buNone/>
+            </a:pPr>
+            <a:endParaRPr kumimoji="1" lang="zh-CN" altLang="en-US" dirty="0"/>
+          </a:p>
+        </p:txBody>
+      </p:sp>
+      <p:pic>
+        <p:nvPicPr>
+          <p:cNvPr id="4" name="图片 3">
+            <a:extLst>
+              <a:ext uri="{FF2B5EF4-FFF2-40B4-BE49-F238E27FC236}">
+                <a16:creationId xmlns:a16="http://schemas.microsoft.com/office/drawing/2014/main" id="{8370E82C-2F97-F34E-9663-9E1F9E6B1900}"/>
+              </a:ext>
+            </a:extLst>
+          </p:cNvPr>
+          <p:cNvPicPr>
+            <a:picLocks noChangeAspect="1"/>
+          </p:cNvPicPr>
+          <p:nvPr/>
+        </p:nvPicPr>
+        <p:blipFill>
+          <a:blip r:embed="rId2"/>
+          <a:stretch>
+            <a:fillRect/>
+          </a:stretch>
+        </p:blipFill>
+        <p:spPr>
+          <a:xfrm>
+            <a:off x="3025802" y="3583029"/>
+            <a:ext cx="6140395" cy="3345041"/>
+          </a:xfrm>
+          <a:prstGeom prst="rect">
+            <a:avLst/>
+          </a:prstGeom>
+        </p:spPr>
+      </p:pic>
+    </p:spTree>
+    <p:extLst>
+      <p:ext uri="{BB962C8B-B14F-4D97-AF65-F5344CB8AC3E}">
+        <p14:creationId xmlns:p14="http://schemas.microsoft.com/office/powerpoint/2010/main" val="24335233"/>
+      </p:ext>
+    </p:extLst>
+  </p:cSld>
+  <p:clrMapOvr>
+    <a:masterClrMapping/>
+  </p:clrMapOvr>
+</p:sld>
+</file>
+
+<file path=ppt/slides/slide11.xml><?xml version="1.0" encoding="utf-8"?>
+<p:sld xmlns:a="http://schemas.openxmlformats.org/drawingml/2006/main" xmlns:r="http://schemas.openxmlformats.org/officeDocument/2006/relationships" xmlns:p="http://schemas.openxmlformats.org/presentationml/2006/main">
+  <p:cSld>
+    <p:spTree>
+      <p:nvGrpSpPr>
+        <p:cNvPr id="1" name=""/>
+        <p:cNvGrpSpPr/>
+        <p:nvPr/>
+      </p:nvGrpSpPr>
+      <p:grpSpPr>
+        <a:xfrm>
+          <a:off x="0" y="0"/>
+          <a:ext cx="0" cy="0"/>
+          <a:chOff x="0" y="0"/>
+          <a:chExt cx="0" cy="0"/>
+        </a:xfrm>
+      </p:grpSpPr>
+      <p:sp>
+        <p:nvSpPr>
+          <p:cNvPr id="2" name="标题 1">
+            <a:extLst>
+              <a:ext uri="{FF2B5EF4-FFF2-40B4-BE49-F238E27FC236}">
                 <a16:creationId xmlns:a16="http://schemas.microsoft.com/office/drawing/2014/main" id="{F57B46D3-4CF7-3B43-AC29-B94A7CF598DA}"/>
               </a:ext>
             </a:extLst>
@@ -8217,7 +8487,7 @@
 </p:sld>
 </file>
 
-<file path=ppt/slides/slide11.xml><?xml version="1.0" encoding="utf-8"?>
+<file path=ppt/slides/slide12.xml><?xml version="1.0" encoding="utf-8"?>
 <p:sld xmlns:a="http://schemas.openxmlformats.org/drawingml/2006/main" xmlns:r="http://schemas.openxmlformats.org/officeDocument/2006/relationships" xmlns:p="http://schemas.openxmlformats.org/presentationml/2006/main">
   <p:cSld>
     <p:spTree>
@@ -8564,93 +8834,6 @@
 </p:sld>
 </file>
 
-<file path=ppt/slides/slide12.xml><?xml version="1.0" encoding="utf-8"?>
-<p:sld xmlns:a="http://schemas.openxmlformats.org/drawingml/2006/main" xmlns:r="http://schemas.openxmlformats.org/officeDocument/2006/relationships" xmlns:p="http://schemas.openxmlformats.org/presentationml/2006/main">
-  <p:cSld>
-    <p:spTree>
-      <p:nvGrpSpPr>
-        <p:cNvPr id="1" name=""/>
-        <p:cNvGrpSpPr/>
-        <p:nvPr/>
-      </p:nvGrpSpPr>
-      <p:grpSpPr>
-        <a:xfrm>
-          <a:off x="0" y="0"/>
-          <a:ext cx="0" cy="0"/>
-          <a:chOff x="0" y="0"/>
-          <a:chExt cx="0" cy="0"/>
-        </a:xfrm>
-      </p:grpSpPr>
-      <p:sp>
-        <p:nvSpPr>
-          <p:cNvPr id="2" name="标题 1">
-            <a:extLst>
-              <a:ext uri="{FF2B5EF4-FFF2-40B4-BE49-F238E27FC236}">
-                <a16:creationId xmlns:a16="http://schemas.microsoft.com/office/drawing/2014/main" id="{2E650F0F-5E2B-5F47-9E9D-0DB3413A0D28}"/>
-              </a:ext>
-            </a:extLst>
-          </p:cNvPr>
-          <p:cNvSpPr>
-            <a:spLocks noGrp="1"/>
-          </p:cNvSpPr>
-          <p:nvPr>
-            <p:ph type="title"/>
-          </p:nvPr>
-        </p:nvSpPr>
-        <p:spPr/>
-        <p:txBody>
-          <a:bodyPr/>
-          <a:lstStyle/>
-          <a:p>
-            <a:r>
-              <a:rPr kumimoji="1" lang="en-US" altLang="zh-CN" dirty="0"/>
-              <a:t>Cypher</a:t>
-            </a:r>
-            <a:r>
-              <a:rPr kumimoji="1" lang="zh-CN" altLang="en-US" dirty="0"/>
-              <a:t>执行计划</a:t>
-            </a:r>
-          </a:p>
-        </p:txBody>
-      </p:sp>
-      <p:sp>
-        <p:nvSpPr>
-          <p:cNvPr id="3" name="内容占位符 2">
-            <a:extLst>
-              <a:ext uri="{FF2B5EF4-FFF2-40B4-BE49-F238E27FC236}">
-                <a16:creationId xmlns:a16="http://schemas.microsoft.com/office/drawing/2014/main" id="{B1685F71-928E-DE42-9D53-9EE5ED81F8B6}"/>
-              </a:ext>
-            </a:extLst>
-          </p:cNvPr>
-          <p:cNvSpPr>
-            <a:spLocks noGrp="1"/>
-          </p:cNvSpPr>
-          <p:nvPr>
-            <p:ph idx="1"/>
-          </p:nvPr>
-        </p:nvSpPr>
-        <p:spPr/>
-        <p:txBody>
-          <a:bodyPr/>
-          <a:lstStyle/>
-          <a:p>
-            <a:endParaRPr kumimoji="1" lang="zh-CN" altLang="en-US"/>
-          </a:p>
-        </p:txBody>
-      </p:sp>
-    </p:spTree>
-    <p:extLst>
-      <p:ext uri="{BB962C8B-B14F-4D97-AF65-F5344CB8AC3E}">
-        <p14:creationId xmlns:p14="http://schemas.microsoft.com/office/powerpoint/2010/main" val="2741174435"/>
-      </p:ext>
-    </p:extLst>
-  </p:cSld>
-  <p:clrMapOvr>
-    <a:masterClrMapping/>
-  </p:clrMapOvr>
-</p:sld>
-</file>
-
 <file path=ppt/slides/slide13.xml><?xml version="1.0" encoding="utf-8"?>
 <p:sld xmlns:a="http://schemas.openxmlformats.org/drawingml/2006/main" xmlns:r="http://schemas.openxmlformats.org/officeDocument/2006/relationships" xmlns:p="http://schemas.openxmlformats.org/presentationml/2006/main">
   <p:cSld>
@@ -8673,7 +8856,7 @@
           <p:cNvPr id="2" name="标题 1">
             <a:extLst>
               <a:ext uri="{FF2B5EF4-FFF2-40B4-BE49-F238E27FC236}">
-                <a16:creationId xmlns:a16="http://schemas.microsoft.com/office/drawing/2014/main" id="{D080B79F-ED71-7245-B840-04A9E90E6934}"/>
+                <a16:creationId xmlns:a16="http://schemas.microsoft.com/office/drawing/2014/main" id="{20C0B4C4-BE8D-944A-99A9-B550FE9A2B60}"/>
               </a:ext>
             </a:extLst>
           </p:cNvPr>
@@ -8695,7 +8878,7 @@
             </a:r>
             <a:r>
               <a:rPr kumimoji="1" lang="zh-CN" altLang="en-US" dirty="0"/>
-              <a:t>免邻接索引</a:t>
+              <a:t>数据遍历框架</a:t>
             </a:r>
           </a:p>
         </p:txBody>
@@ -8705,7 +8888,7 @@
           <p:cNvPr id="3" name="内容占位符 2">
             <a:extLst>
               <a:ext uri="{FF2B5EF4-FFF2-40B4-BE49-F238E27FC236}">
-                <a16:creationId xmlns:a16="http://schemas.microsoft.com/office/drawing/2014/main" id="{AB5601CA-7E82-6B42-9FC2-6F912481A5C7}"/>
+                <a16:creationId xmlns:a16="http://schemas.microsoft.com/office/drawing/2014/main" id="{BCFA56B5-68FC-2D4F-9D91-627F0CADAC6F}"/>
               </a:ext>
             </a:extLst>
           </p:cNvPr>
@@ -8718,17 +8901,282 @@
         </p:nvSpPr>
         <p:spPr/>
         <p:txBody>
-          <a:bodyPr/>
+          <a:bodyPr>
+            <a:normAutofit lnSpcReduction="10000"/>
+          </a:bodyPr>
           <a:lstStyle/>
           <a:p>
-            <a:endParaRPr kumimoji="1" lang="zh-CN" altLang="en-US"/>
+            <a:r>
+              <a:rPr kumimoji="1" lang="en-US" altLang="zh-CN" dirty="0"/>
+              <a:t>Neo4j</a:t>
+            </a:r>
+            <a:r>
+              <a:rPr kumimoji="1" lang="zh-CN" altLang="en-US" dirty="0"/>
+              <a:t>遍历</a:t>
+            </a:r>
+            <a:r>
+              <a:rPr kumimoji="1" lang="en-US" altLang="zh-CN" dirty="0"/>
+              <a:t>API</a:t>
+            </a:r>
+            <a:r>
+              <a:rPr kumimoji="1" lang="zh-CN" altLang="en-US" dirty="0"/>
+              <a:t>采用的是基于回调，惰性执行的机制。只有调用</a:t>
+            </a:r>
+            <a:r>
+              <a:rPr lang="en" altLang="zh-CN" sz="1800" dirty="0">
+                <a:solidFill>
+                  <a:srgbClr val="A9B7C6"/>
+                </a:solidFill>
+                <a:effectLst/>
+                <a:latin typeface="JetBrains Mono"/>
+              </a:rPr>
+              <a:t>Traverser</a:t>
+            </a:r>
+            <a:r>
+              <a:rPr lang="zh-CN" altLang="en" dirty="0"/>
+              <a:t>对象</a:t>
+            </a:r>
+            <a:r>
+              <a:rPr lang="zh-CN" altLang="en-US" dirty="0"/>
+              <a:t>的</a:t>
+            </a:r>
+            <a:r>
+              <a:rPr lang="en-US" altLang="zh-CN" dirty="0"/>
+              <a:t>next</a:t>
+            </a:r>
+            <a:r>
+              <a:rPr lang="zh-CN" altLang="en-US" dirty="0"/>
+              <a:t>方法，遍历操作才会被执行一次</a:t>
+            </a:r>
+            <a:r>
+              <a:rPr kumimoji="1" lang="zh-CN" altLang="en-US" dirty="0"/>
+              <a:t>。</a:t>
+            </a:r>
+            <a:endParaRPr kumimoji="1" lang="en-US" altLang="zh-CN" dirty="0"/>
+          </a:p>
+          <a:p>
+            <a:r>
+              <a:rPr kumimoji="1" lang="zh-CN" altLang="en-US" dirty="0"/>
+              <a:t>遍历框架基本概念：</a:t>
+            </a:r>
+            <a:endParaRPr kumimoji="1" lang="en-US" altLang="zh-CN" dirty="0"/>
+          </a:p>
+          <a:p>
+            <a:pPr algn="just">
+              <a:buFont typeface="Arial" panose="020B0604020202020204" pitchFamily="34" charset="0"/>
+              <a:buChar char="•"/>
+            </a:pPr>
+            <a:r>
+              <a:rPr lang="zh-CN" altLang="en-US" b="0" i="0" dirty="0">
+                <a:solidFill>
+                  <a:srgbClr val="555555"/>
+                </a:solidFill>
+                <a:effectLst/>
+                <a:latin typeface="Lato" panose="020F0502020204030204" pitchFamily="34" charset="0"/>
+              </a:rPr>
+              <a:t>路径拓展（</a:t>
+            </a:r>
+            <a:r>
+              <a:rPr lang="en" altLang="zh-CN" b="0" i="0" dirty="0">
+                <a:solidFill>
+                  <a:srgbClr val="555555"/>
+                </a:solidFill>
+                <a:effectLst/>
+                <a:latin typeface="Lato" panose="020F0502020204030204" pitchFamily="34" charset="0"/>
+              </a:rPr>
+              <a:t>PathExpander</a:t>
+            </a:r>
+            <a:r>
+              <a:rPr lang="zh-CN" altLang="en" b="0" i="0" dirty="0">
+                <a:solidFill>
+                  <a:srgbClr val="555555"/>
+                </a:solidFill>
+                <a:effectLst/>
+                <a:latin typeface="Lato" panose="020F0502020204030204" pitchFamily="34" charset="0"/>
+              </a:rPr>
+              <a:t>）：</a:t>
+            </a:r>
+            <a:r>
+              <a:rPr lang="zh-CN" altLang="en-US" b="0" i="0" dirty="0">
+                <a:solidFill>
+                  <a:srgbClr val="555555"/>
+                </a:solidFill>
+                <a:effectLst/>
+                <a:latin typeface="Lato" panose="020F0502020204030204" pitchFamily="34" charset="0"/>
+              </a:rPr>
+              <a:t>定义将要对图数据库中的什么进行遍历，一般是指针对关系的指向和关系的类型进行遍历。</a:t>
+            </a:r>
+          </a:p>
+          <a:p>
+            <a:pPr algn="just">
+              <a:buFont typeface="Arial" panose="020B0604020202020204" pitchFamily="34" charset="0"/>
+              <a:buChar char="•"/>
+            </a:pPr>
+            <a:r>
+              <a:rPr lang="zh-CN" altLang="en-US" b="0" i="0" dirty="0">
+                <a:solidFill>
+                  <a:srgbClr val="555555"/>
+                </a:solidFill>
+                <a:effectLst/>
+                <a:latin typeface="Lato" panose="020F0502020204030204" pitchFamily="34" charset="0"/>
+              </a:rPr>
+              <a:t>顺序（</a:t>
+            </a:r>
+            <a:r>
+              <a:rPr lang="en" altLang="zh-CN" b="0" i="0" dirty="0">
+                <a:solidFill>
+                  <a:srgbClr val="555555"/>
+                </a:solidFill>
+                <a:effectLst/>
+                <a:latin typeface="Lato" panose="020F0502020204030204" pitchFamily="34" charset="0"/>
+              </a:rPr>
+              <a:t>Order</a:t>
+            </a:r>
+            <a:r>
+              <a:rPr lang="zh-CN" altLang="en" b="0" i="0" dirty="0">
+                <a:solidFill>
+                  <a:srgbClr val="555555"/>
+                </a:solidFill>
+                <a:effectLst/>
+                <a:latin typeface="Lato" panose="020F0502020204030204" pitchFamily="34" charset="0"/>
+              </a:rPr>
+              <a:t>）：</a:t>
+            </a:r>
+            <a:r>
+              <a:rPr lang="zh-CN" altLang="en-US" b="0" i="0" dirty="0">
+                <a:solidFill>
+                  <a:srgbClr val="555555"/>
+                </a:solidFill>
+                <a:effectLst/>
+                <a:latin typeface="Lato" panose="020F0502020204030204" pitchFamily="34" charset="0"/>
+              </a:rPr>
+              <a:t>深度优先或广度优先。</a:t>
+            </a:r>
+          </a:p>
+          <a:p>
+            <a:pPr algn="just">
+              <a:buFont typeface="Arial" panose="020B0604020202020204" pitchFamily="34" charset="0"/>
+              <a:buChar char="•"/>
+            </a:pPr>
+            <a:r>
+              <a:rPr lang="zh-CN" altLang="en-US" b="0" i="0" dirty="0">
+                <a:solidFill>
+                  <a:srgbClr val="555555"/>
+                </a:solidFill>
+                <a:effectLst/>
+                <a:latin typeface="Lato" panose="020F0502020204030204" pitchFamily="34" charset="0"/>
+              </a:rPr>
+              <a:t>唯一性（</a:t>
+            </a:r>
+            <a:r>
+              <a:rPr lang="en" altLang="zh-CN" b="0" i="0" dirty="0">
+                <a:solidFill>
+                  <a:srgbClr val="555555"/>
+                </a:solidFill>
+                <a:effectLst/>
+                <a:latin typeface="Lato" panose="020F0502020204030204" pitchFamily="34" charset="0"/>
+              </a:rPr>
+              <a:t>Uniqueness</a:t>
+            </a:r>
+            <a:r>
+              <a:rPr lang="zh-CN" altLang="en" b="0" i="0" dirty="0">
+                <a:solidFill>
+                  <a:srgbClr val="555555"/>
+                </a:solidFill>
+                <a:effectLst/>
+                <a:latin typeface="Lato" panose="020F0502020204030204" pitchFamily="34" charset="0"/>
+              </a:rPr>
+              <a:t>）：</a:t>
+            </a:r>
+            <a:r>
+              <a:rPr lang="zh-CN" altLang="en-US" b="0" i="0" dirty="0">
+                <a:solidFill>
+                  <a:srgbClr val="555555"/>
+                </a:solidFill>
+                <a:effectLst/>
+                <a:latin typeface="Lato" panose="020F0502020204030204" pitchFamily="34" charset="0"/>
+              </a:rPr>
+              <a:t>在遍历过程中，确保每个节点（关系、路径）只被遍历一次。</a:t>
+            </a:r>
+          </a:p>
+          <a:p>
+            <a:pPr algn="just">
+              <a:buFont typeface="Arial" panose="020B0604020202020204" pitchFamily="34" charset="0"/>
+              <a:buChar char="•"/>
+            </a:pPr>
+            <a:r>
+              <a:rPr lang="zh-CN" altLang="en-US" b="0" i="0" dirty="0">
+                <a:solidFill>
+                  <a:srgbClr val="555555"/>
+                </a:solidFill>
+                <a:effectLst/>
+                <a:latin typeface="Lato" panose="020F0502020204030204" pitchFamily="34" charset="0"/>
+              </a:rPr>
+              <a:t>评估器（</a:t>
+            </a:r>
+            <a:r>
+              <a:rPr lang="en" altLang="zh-CN" b="0" i="0" dirty="0">
+                <a:solidFill>
+                  <a:srgbClr val="555555"/>
+                </a:solidFill>
+                <a:effectLst/>
+                <a:latin typeface="Lato" panose="020F0502020204030204" pitchFamily="34" charset="0"/>
+              </a:rPr>
+              <a:t>Evaluator</a:t>
+            </a:r>
+            <a:r>
+              <a:rPr lang="zh-CN" altLang="en" b="0" i="0" dirty="0">
+                <a:solidFill>
+                  <a:srgbClr val="555555"/>
+                </a:solidFill>
+                <a:effectLst/>
+                <a:latin typeface="Lato" panose="020F0502020204030204" pitchFamily="34" charset="0"/>
+              </a:rPr>
+              <a:t>）：</a:t>
+            </a:r>
+            <a:r>
+              <a:rPr lang="zh-CN" altLang="en-US" b="0" i="0" dirty="0">
+                <a:solidFill>
+                  <a:srgbClr val="555555"/>
+                </a:solidFill>
+                <a:effectLst/>
+                <a:latin typeface="Lato" panose="020F0502020204030204" pitchFamily="34" charset="0"/>
+              </a:rPr>
+              <a:t>用来决定返回什么结果，以及是否停止或继续遍历当前位置。</a:t>
+            </a:r>
+          </a:p>
+          <a:p>
+            <a:pPr algn="just">
+              <a:buFont typeface="Arial" panose="020B0604020202020204" pitchFamily="34" charset="0"/>
+              <a:buChar char="•"/>
+            </a:pPr>
+            <a:r>
+              <a:rPr lang="zh-CN" altLang="en-US" b="0" i="0" dirty="0">
+                <a:solidFill>
+                  <a:srgbClr val="555555"/>
+                </a:solidFill>
+                <a:effectLst/>
+                <a:latin typeface="Lato" panose="020F0502020204030204" pitchFamily="34" charset="0"/>
+              </a:rPr>
+              <a:t>开始节点：启动遍历最先开始的节点。</a:t>
+            </a:r>
+          </a:p>
+          <a:p>
+            <a:r>
+              <a:rPr kumimoji="1" lang="zh-CN" altLang="en-US" dirty="0"/>
+              <a:t>广度优先遍历比深度优先更耗内存</a:t>
+            </a:r>
+            <a:endParaRPr kumimoji="1" lang="en-US" altLang="zh-CN" dirty="0"/>
+          </a:p>
+          <a:p>
+            <a:endParaRPr kumimoji="1" lang="zh-CN" altLang="en-US" dirty="0"/>
           </a:p>
         </p:txBody>
       </p:sp>
     </p:spTree>
     <p:extLst>
       <p:ext uri="{BB962C8B-B14F-4D97-AF65-F5344CB8AC3E}">
-        <p14:creationId xmlns:p14="http://schemas.microsoft.com/office/powerpoint/2010/main" val="3794740161"/>
+        <p14:creationId xmlns:p14="http://schemas.microsoft.com/office/powerpoint/2010/main" val="3999315403"/>
       </p:ext>
     </p:extLst>
   </p:cSld>
@@ -8760,6 +9208,274 @@
           <p:cNvPr id="2" name="标题 1">
             <a:extLst>
               <a:ext uri="{FF2B5EF4-FFF2-40B4-BE49-F238E27FC236}">
+                <a16:creationId xmlns:a16="http://schemas.microsoft.com/office/drawing/2014/main" id="{6C54F70C-B38F-F749-8793-85BF998FFCB9}"/>
+              </a:ext>
+            </a:extLst>
+          </p:cNvPr>
+          <p:cNvSpPr>
+            <a:spLocks noGrp="1"/>
+          </p:cNvSpPr>
+          <p:nvPr>
+            <p:ph type="title"/>
+          </p:nvPr>
+        </p:nvSpPr>
+        <p:spPr/>
+        <p:txBody>
+          <a:bodyPr/>
+          <a:lstStyle/>
+          <a:p>
+            <a:r>
+              <a:rPr kumimoji="1" lang="en-US" altLang="zh-CN" dirty="0"/>
+              <a:t>Neo4j</a:t>
+            </a:r>
+            <a:r>
+              <a:rPr kumimoji="1" lang="zh-CN" altLang="en-US" dirty="0"/>
+              <a:t>遍历框架结构图</a:t>
+            </a:r>
+          </a:p>
+        </p:txBody>
+      </p:sp>
+      <p:pic>
+        <p:nvPicPr>
+          <p:cNvPr id="4" name="内容占位符 3">
+            <a:extLst>
+              <a:ext uri="{FF2B5EF4-FFF2-40B4-BE49-F238E27FC236}">
+                <a16:creationId xmlns:a16="http://schemas.microsoft.com/office/drawing/2014/main" id="{85F7FDE0-75C5-DE43-9430-E13B4F7C644C}"/>
+              </a:ext>
+            </a:extLst>
+          </p:cNvPr>
+          <p:cNvPicPr>
+            <a:picLocks noGrp="1" noChangeAspect="1"/>
+          </p:cNvPicPr>
+          <p:nvPr>
+            <p:ph idx="1"/>
+          </p:nvPr>
+        </p:nvPicPr>
+        <p:blipFill>
+          <a:blip r:embed="rId2"/>
+          <a:stretch>
+            <a:fillRect/>
+          </a:stretch>
+        </p:blipFill>
+        <p:spPr>
+          <a:xfrm>
+            <a:off x="4001113" y="2133600"/>
+            <a:ext cx="6091599" cy="3778250"/>
+          </a:xfrm>
+          <a:prstGeom prst="rect">
+            <a:avLst/>
+          </a:prstGeom>
+        </p:spPr>
+      </p:pic>
+    </p:spTree>
+    <p:extLst>
+      <p:ext uri="{BB962C8B-B14F-4D97-AF65-F5344CB8AC3E}">
+        <p14:creationId xmlns:p14="http://schemas.microsoft.com/office/powerpoint/2010/main" val="2100692175"/>
+      </p:ext>
+    </p:extLst>
+  </p:cSld>
+  <p:clrMapOvr>
+    <a:masterClrMapping/>
+  </p:clrMapOvr>
+</p:sld>
+</file>
+
+<file path=ppt/slides/slide15.xml><?xml version="1.0" encoding="utf-8"?>
+<p:sld xmlns:a="http://schemas.openxmlformats.org/drawingml/2006/main" xmlns:r="http://schemas.openxmlformats.org/officeDocument/2006/relationships" xmlns:p="http://schemas.openxmlformats.org/presentationml/2006/main">
+  <p:cSld>
+    <p:spTree>
+      <p:nvGrpSpPr>
+        <p:cNvPr id="1" name=""/>
+        <p:cNvGrpSpPr/>
+        <p:nvPr/>
+      </p:nvGrpSpPr>
+      <p:grpSpPr>
+        <a:xfrm>
+          <a:off x="0" y="0"/>
+          <a:ext cx="0" cy="0"/>
+          <a:chOff x="0" y="0"/>
+          <a:chExt cx="0" cy="0"/>
+        </a:xfrm>
+      </p:grpSpPr>
+      <p:sp>
+        <p:nvSpPr>
+          <p:cNvPr id="2" name="标题 1">
+            <a:extLst>
+              <a:ext uri="{FF2B5EF4-FFF2-40B4-BE49-F238E27FC236}">
+                <a16:creationId xmlns:a16="http://schemas.microsoft.com/office/drawing/2014/main" id="{2E650F0F-5E2B-5F47-9E9D-0DB3413A0D28}"/>
+              </a:ext>
+            </a:extLst>
+          </p:cNvPr>
+          <p:cNvSpPr>
+            <a:spLocks noGrp="1"/>
+          </p:cNvSpPr>
+          <p:nvPr>
+            <p:ph type="title"/>
+          </p:nvPr>
+        </p:nvSpPr>
+        <p:spPr/>
+        <p:txBody>
+          <a:bodyPr/>
+          <a:lstStyle/>
+          <a:p>
+            <a:r>
+              <a:rPr kumimoji="1" lang="en-US" altLang="zh-CN" dirty="0"/>
+              <a:t>Cypher</a:t>
+            </a:r>
+            <a:r>
+              <a:rPr kumimoji="1" lang="zh-CN" altLang="en-US" dirty="0"/>
+              <a:t>执行计划</a:t>
+            </a:r>
+          </a:p>
+        </p:txBody>
+      </p:sp>
+      <p:sp>
+        <p:nvSpPr>
+          <p:cNvPr id="3" name="内容占位符 2">
+            <a:extLst>
+              <a:ext uri="{FF2B5EF4-FFF2-40B4-BE49-F238E27FC236}">
+                <a16:creationId xmlns:a16="http://schemas.microsoft.com/office/drawing/2014/main" id="{B1685F71-928E-DE42-9D53-9EE5ED81F8B6}"/>
+              </a:ext>
+            </a:extLst>
+          </p:cNvPr>
+          <p:cNvSpPr>
+            <a:spLocks noGrp="1"/>
+          </p:cNvSpPr>
+          <p:nvPr>
+            <p:ph idx="1"/>
+          </p:nvPr>
+        </p:nvSpPr>
+        <p:spPr/>
+        <p:txBody>
+          <a:bodyPr/>
+          <a:lstStyle/>
+          <a:p>
+            <a:endParaRPr kumimoji="1" lang="zh-CN" altLang="en-US"/>
+          </a:p>
+        </p:txBody>
+      </p:sp>
+    </p:spTree>
+    <p:extLst>
+      <p:ext uri="{BB962C8B-B14F-4D97-AF65-F5344CB8AC3E}">
+        <p14:creationId xmlns:p14="http://schemas.microsoft.com/office/powerpoint/2010/main" val="2741174435"/>
+      </p:ext>
+    </p:extLst>
+  </p:cSld>
+  <p:clrMapOvr>
+    <a:masterClrMapping/>
+  </p:clrMapOvr>
+</p:sld>
+</file>
+
+<file path=ppt/slides/slide16.xml><?xml version="1.0" encoding="utf-8"?>
+<p:sld xmlns:a="http://schemas.openxmlformats.org/drawingml/2006/main" xmlns:r="http://schemas.openxmlformats.org/officeDocument/2006/relationships" xmlns:p="http://schemas.openxmlformats.org/presentationml/2006/main">
+  <p:cSld>
+    <p:spTree>
+      <p:nvGrpSpPr>
+        <p:cNvPr id="1" name=""/>
+        <p:cNvGrpSpPr/>
+        <p:nvPr/>
+      </p:nvGrpSpPr>
+      <p:grpSpPr>
+        <a:xfrm>
+          <a:off x="0" y="0"/>
+          <a:ext cx="0" cy="0"/>
+          <a:chOff x="0" y="0"/>
+          <a:chExt cx="0" cy="0"/>
+        </a:xfrm>
+      </p:grpSpPr>
+      <p:sp>
+        <p:nvSpPr>
+          <p:cNvPr id="2" name="标题 1">
+            <a:extLst>
+              <a:ext uri="{FF2B5EF4-FFF2-40B4-BE49-F238E27FC236}">
+                <a16:creationId xmlns:a16="http://schemas.microsoft.com/office/drawing/2014/main" id="{D080B79F-ED71-7245-B840-04A9E90E6934}"/>
+              </a:ext>
+            </a:extLst>
+          </p:cNvPr>
+          <p:cNvSpPr>
+            <a:spLocks noGrp="1"/>
+          </p:cNvSpPr>
+          <p:nvPr>
+            <p:ph type="title"/>
+          </p:nvPr>
+        </p:nvSpPr>
+        <p:spPr/>
+        <p:txBody>
+          <a:bodyPr/>
+          <a:lstStyle/>
+          <a:p>
+            <a:r>
+              <a:rPr kumimoji="1" lang="en-US" altLang="zh-CN" dirty="0"/>
+              <a:t>Neo4j</a:t>
+            </a:r>
+            <a:r>
+              <a:rPr kumimoji="1" lang="zh-CN" altLang="en-US" dirty="0"/>
+              <a:t>免邻接索引</a:t>
+            </a:r>
+          </a:p>
+        </p:txBody>
+      </p:sp>
+      <p:sp>
+        <p:nvSpPr>
+          <p:cNvPr id="3" name="内容占位符 2">
+            <a:extLst>
+              <a:ext uri="{FF2B5EF4-FFF2-40B4-BE49-F238E27FC236}">
+                <a16:creationId xmlns:a16="http://schemas.microsoft.com/office/drawing/2014/main" id="{AB5601CA-7E82-6B42-9FC2-6F912481A5C7}"/>
+              </a:ext>
+            </a:extLst>
+          </p:cNvPr>
+          <p:cNvSpPr>
+            <a:spLocks noGrp="1"/>
+          </p:cNvSpPr>
+          <p:nvPr>
+            <p:ph idx="1"/>
+          </p:nvPr>
+        </p:nvSpPr>
+        <p:spPr/>
+        <p:txBody>
+          <a:bodyPr/>
+          <a:lstStyle/>
+          <a:p>
+            <a:endParaRPr kumimoji="1" lang="zh-CN" altLang="en-US"/>
+          </a:p>
+        </p:txBody>
+      </p:sp>
+    </p:spTree>
+    <p:extLst>
+      <p:ext uri="{BB962C8B-B14F-4D97-AF65-F5344CB8AC3E}">
+        <p14:creationId xmlns:p14="http://schemas.microsoft.com/office/powerpoint/2010/main" val="3794740161"/>
+      </p:ext>
+    </p:extLst>
+  </p:cSld>
+  <p:clrMapOvr>
+    <a:masterClrMapping/>
+  </p:clrMapOvr>
+</p:sld>
+</file>
+
+<file path=ppt/slides/slide17.xml><?xml version="1.0" encoding="utf-8"?>
+<p:sld xmlns:a="http://schemas.openxmlformats.org/drawingml/2006/main" xmlns:r="http://schemas.openxmlformats.org/officeDocument/2006/relationships" xmlns:p="http://schemas.openxmlformats.org/presentationml/2006/main">
+  <p:cSld>
+    <p:spTree>
+      <p:nvGrpSpPr>
+        <p:cNvPr id="1" name=""/>
+        <p:cNvGrpSpPr/>
+        <p:nvPr/>
+      </p:nvGrpSpPr>
+      <p:grpSpPr>
+        <a:xfrm>
+          <a:off x="0" y="0"/>
+          <a:ext cx="0" cy="0"/>
+          <a:chOff x="0" y="0"/>
+          <a:chExt cx="0" cy="0"/>
+        </a:xfrm>
+      </p:grpSpPr>
+      <p:sp>
+        <p:nvSpPr>
+          <p:cNvPr id="2" name="标题 1">
+            <a:extLst>
+              <a:ext uri="{FF2B5EF4-FFF2-40B4-BE49-F238E27FC236}">
                 <a16:creationId xmlns:a16="http://schemas.microsoft.com/office/drawing/2014/main" id="{64AA338F-5E28-8645-9FBA-8CE398797205}"/>
               </a:ext>
             </a:extLst>
@@ -8825,7 +9541,7 @@
 </p:sld>
 </file>
 
-<file path=ppt/slides/slide15.xml><?xml version="1.0" encoding="utf-8"?>
+<file path=ppt/slides/slide18.xml><?xml version="1.0" encoding="utf-8"?>
 <p:sld xmlns:a="http://schemas.openxmlformats.org/drawingml/2006/main" xmlns:r="http://schemas.openxmlformats.org/officeDocument/2006/relationships" xmlns:p="http://schemas.openxmlformats.org/presentationml/2006/main">
   <p:cSld>
     <p:spTree>
@@ -10643,7 +11359,7 @@
           <p:cNvPr id="2" name="标题 1">
             <a:extLst>
               <a:ext uri="{FF2B5EF4-FFF2-40B4-BE49-F238E27FC236}">
-                <a16:creationId xmlns:a16="http://schemas.microsoft.com/office/drawing/2014/main" id="{36953776-DA76-2146-BF8C-26AB4474817B}"/>
+                <a16:creationId xmlns:a16="http://schemas.microsoft.com/office/drawing/2014/main" id="{F04841E0-28E1-AC40-B71F-3125A50B40D3}"/>
               </a:ext>
             </a:extLst>
           </p:cNvPr>
@@ -10665,7 +11381,7 @@
             </a:r>
             <a:r>
               <a:rPr kumimoji="1" lang="zh-CN" altLang="en-US" dirty="0"/>
-              <a:t>基本元素</a:t>
+              <a:t>运行模式</a:t>
             </a:r>
           </a:p>
         </p:txBody>
@@ -10675,7 +11391,7 @@
           <p:cNvPr id="3" name="内容占位符 2">
             <a:extLst>
               <a:ext uri="{FF2B5EF4-FFF2-40B4-BE49-F238E27FC236}">
-                <a16:creationId xmlns:a16="http://schemas.microsoft.com/office/drawing/2014/main" id="{77AE8126-BBE3-6146-A319-0DA6E531D7D7}"/>
+                <a16:creationId xmlns:a16="http://schemas.microsoft.com/office/drawing/2014/main" id="{8BA702F5-4540-154B-851B-9E05E383ACD7}"/>
               </a:ext>
             </a:extLst>
           </p:cNvPr>
@@ -10686,72 +11402,135 @@
             <p:ph idx="1"/>
           </p:nvPr>
         </p:nvSpPr>
-        <p:spPr>
-          <a:xfrm>
-            <a:off x="2589212" y="1347216"/>
-            <a:ext cx="8915400" cy="3777622"/>
-          </a:xfrm>
-        </p:spPr>
+        <p:spPr/>
         <p:txBody>
           <a:bodyPr/>
           <a:lstStyle/>
           <a:p>
             <a:r>
+              <a:rPr kumimoji="1" lang="en-US" altLang="zh-CN" dirty="0"/>
+              <a:t>Neo4j</a:t>
+            </a:r>
+            <a:r>
               <a:rPr kumimoji="1" lang="zh-CN" altLang="en-US" dirty="0"/>
-              <a:t>节点（</a:t>
+              <a:t>使用</a:t>
             </a:r>
             <a:r>
               <a:rPr kumimoji="1" lang="en-US" altLang="zh-CN" dirty="0"/>
-              <a:t>Node</a:t>
+              <a:t>Java</a:t>
             </a:r>
             <a:r>
               <a:rPr kumimoji="1" lang="zh-CN" altLang="en-US" dirty="0"/>
-              <a:t>）：对应图里的节点。节点可以包含多个属性和多个标签。</a:t>
+              <a:t>编写，运行于</a:t>
+            </a:r>
+            <a:r>
+              <a:rPr kumimoji="1" lang="en-US" altLang="zh-CN" dirty="0"/>
+              <a:t>JVM</a:t>
+            </a:r>
+            <a:r>
+              <a:rPr kumimoji="1" lang="zh-CN" altLang="en-US" dirty="0"/>
+              <a:t>。</a:t>
+            </a:r>
+            <a:endParaRPr kumimoji="1" lang="en-US" altLang="zh-CN" dirty="0"/>
+          </a:p>
+          <a:p>
+            <a:r>
+              <a:rPr kumimoji="1" lang="zh-CN" altLang="en-US" dirty="0"/>
+              <a:t>嵌入式部署：应用和</a:t>
+            </a:r>
+            <a:r>
+              <a:rPr kumimoji="1" lang="en-US" altLang="zh-CN" dirty="0"/>
+              <a:t>Neo4j</a:t>
+            </a:r>
+            <a:r>
+              <a:rPr kumimoji="1" lang="zh-CN" altLang="en-US" dirty="0"/>
+              <a:t>运行在同一个</a:t>
+            </a:r>
+            <a:r>
+              <a:rPr kumimoji="1" lang="en-US" altLang="zh-CN" dirty="0"/>
+              <a:t>JVM</a:t>
+            </a:r>
+            <a:r>
+              <a:rPr kumimoji="1" lang="zh-CN" altLang="en-US" dirty="0"/>
+              <a:t>进程中。通过引入</a:t>
+            </a:r>
+            <a:r>
+              <a:rPr kumimoji="1" lang="en-US" altLang="zh-CN" dirty="0"/>
+              <a:t>Neo4j</a:t>
+            </a:r>
+            <a:r>
+              <a:rPr kumimoji="1" lang="zh-CN" altLang="en-US" dirty="0"/>
+              <a:t>的</a:t>
+            </a:r>
+            <a:r>
+              <a:rPr kumimoji="1" lang="en-US" altLang="zh-CN" dirty="0"/>
+              <a:t>jar</a:t>
+            </a:r>
+            <a:r>
+              <a:rPr kumimoji="1" lang="zh-CN" altLang="en-US" dirty="0"/>
+              <a:t>包，应用可以直接创建一个</a:t>
+            </a:r>
+            <a:r>
+              <a:rPr kumimoji="1" lang="en-US" altLang="zh-CN" dirty="0"/>
+              <a:t>Neo4j</a:t>
+            </a:r>
+            <a:r>
+              <a:rPr kumimoji="1" lang="zh-CN" altLang="en-US" dirty="0"/>
+              <a:t>实例，并使用</a:t>
+            </a:r>
+            <a:r>
+              <a:rPr kumimoji="1" lang="en-US" altLang="zh-CN" dirty="0"/>
+              <a:t>Neo4j</a:t>
+            </a:r>
+            <a:r>
+              <a:rPr kumimoji="1" lang="zh-CN" altLang="en-US" dirty="0"/>
+              <a:t> </a:t>
+            </a:r>
+            <a:r>
+              <a:rPr kumimoji="1" lang="en-US" altLang="zh-CN" dirty="0"/>
+              <a:t>Java</a:t>
+            </a:r>
+            <a:r>
+              <a:rPr kumimoji="1" lang="zh-CN" altLang="en-US" dirty="0"/>
+              <a:t> </a:t>
+            </a:r>
+            <a:r>
+              <a:rPr kumimoji="1" lang="en-US" altLang="zh-CN" dirty="0"/>
+              <a:t>Api</a:t>
+            </a:r>
+            <a:r>
+              <a:rPr kumimoji="1" lang="zh-CN" altLang="en-US" dirty="0"/>
+              <a:t>来操作数据库。此</a:t>
+            </a:r>
+            <a:r>
+              <a:rPr kumimoji="1" lang="en-US" altLang="zh-CN" dirty="0"/>
+              <a:t>Neo4j</a:t>
+            </a:r>
+            <a:r>
+              <a:rPr kumimoji="1" lang="zh-CN" altLang="en-US" dirty="0"/>
+              <a:t>实例拥有完整的</a:t>
+            </a:r>
+            <a:r>
+              <a:rPr kumimoji="1" lang="en-US" altLang="zh-CN" dirty="0"/>
+              <a:t>acid</a:t>
+            </a:r>
+            <a:r>
+              <a:rPr kumimoji="1" lang="zh-CN" altLang="en-US" dirty="0"/>
+              <a:t>事务。</a:t>
             </a:r>
             <a:br>
               <a:rPr kumimoji="1" lang="en-US" altLang="zh-CN" dirty="0"/>
             </a:br>
             <a:r>
-              <a:rPr kumimoji="1" lang="en-US" altLang="zh-CN" dirty="0"/>
-              <a:t>person:Actor:Director {‘name’:’xxx’, age:30}</a:t>
-            </a:r>
-          </a:p>
-          <a:p>
-            <a:r>
               <a:rPr kumimoji="1" lang="zh-CN" altLang="en-US" dirty="0"/>
-              <a:t>关系（</a:t>
-            </a:r>
-            <a:r>
-              <a:rPr kumimoji="1" lang="en-US" altLang="zh-CN" dirty="0"/>
-              <a:t>Relationship</a:t>
-            </a:r>
+              <a:t>优点是可以比较轻量的使用图数据库的功能，缺点是没有一些高级功能，也没法组成集群。</a:t>
+            </a:r>
+            <a:endParaRPr kumimoji="1" lang="en-US" altLang="zh-CN" dirty="0"/>
+          </a:p>
+          <a:p>
             <a:r>
               <a:rPr kumimoji="1" lang="zh-CN" altLang="en-US" dirty="0"/>
-              <a:t>）：对应图里的边，连接</a:t>
-            </a:r>
-            <a:r>
-              <a:rPr kumimoji="1" lang="en-US" altLang="zh-CN" dirty="0"/>
-              <a:t>2</a:t>
-            </a:r>
-            <a:r>
-              <a:rPr kumimoji="1" lang="zh-CN" altLang="en-US" dirty="0"/>
-              <a:t>个节点。关系可以包含多个属性，但只能有</a:t>
-            </a:r>
-            <a:r>
-              <a:rPr kumimoji="1" lang="en-US" altLang="zh-CN" dirty="0"/>
-              <a:t>1</a:t>
-            </a:r>
-            <a:r>
-              <a:rPr kumimoji="1" lang="zh-CN" altLang="en-US" dirty="0"/>
-              <a:t>个类型（</a:t>
-            </a:r>
-            <a:r>
-              <a:rPr kumimoji="1" lang="en-US" altLang="zh-CN" dirty="0"/>
-              <a:t>type</a:t>
-            </a:r>
-            <a:r>
-              <a:rPr kumimoji="1" lang="zh-CN" altLang="en-US" dirty="0"/>
-              <a:t>）。关系拥有方向，</a:t>
+              <a:t>独立部署：应用进程独立于</a:t>
             </a:r>
             <a:r>
               <a:rPr kumimoji="1" lang="en-US" altLang="zh-CN" dirty="0"/>
@@ -10759,126 +11538,32 @@
             </a:r>
             <a:r>
               <a:rPr kumimoji="1" lang="zh-CN" altLang="en-US" dirty="0"/>
-              <a:t>只支持单向关系。</a:t>
-            </a:r>
-            <a:br>
+              <a:t>实例。采用</a:t>
+            </a:r>
+            <a:r>
               <a:rPr kumimoji="1" lang="en-US" altLang="zh-CN" dirty="0"/>
-            </a:br>
+              <a:t>Neo4j</a:t>
+            </a:r>
+            <a:r>
+              <a:rPr kumimoji="1" lang="zh-CN" altLang="en-US" dirty="0"/>
+              <a:t> </a:t>
+            </a:r>
             <a:r>
               <a:rPr kumimoji="1" lang="en-US" altLang="zh-CN" dirty="0"/>
-              <a:t>(p:Person)-[r:ACTED_IN]-&gt;(m:Movie) </a:t>
-            </a:r>
-            <a:br>
-              <a:rPr kumimoji="1" lang="en-US" altLang="zh-CN" dirty="0"/>
-            </a:br>
-            <a:r>
-              <a:rPr kumimoji="1" lang="en-US" altLang="zh-CN" dirty="0"/>
-              <a:t>ACTED_IN</a:t>
+              <a:t>Driver</a:t>
             </a:r>
             <a:r>
               <a:rPr kumimoji="1" lang="zh-CN" altLang="en-US" dirty="0"/>
-              <a:t>对于节点</a:t>
-            </a:r>
-            <a:r>
-              <a:rPr kumimoji="1" lang="en-US" altLang="zh-CN" dirty="0"/>
-              <a:t>Person</a:t>
-            </a:r>
-            <a:r>
-              <a:rPr kumimoji="1" lang="zh-CN" altLang="en-US" dirty="0"/>
-              <a:t>来说是</a:t>
-            </a:r>
-            <a:r>
-              <a:rPr kumimoji="1" lang="en" altLang="zh-CN" dirty="0"/>
-              <a:t>OUTGOING</a:t>
-            </a:r>
-            <a:r>
-              <a:rPr kumimoji="1" lang="zh-CN" altLang="en-US" dirty="0"/>
-              <a:t>，对于</a:t>
-            </a:r>
-            <a:r>
-              <a:rPr kumimoji="1" lang="en-US" altLang="zh-CN" dirty="0"/>
-              <a:t>Movie</a:t>
-            </a:r>
-            <a:r>
-              <a:rPr kumimoji="1" lang="zh-CN" altLang="en-US" dirty="0"/>
-              <a:t>节点是</a:t>
-            </a:r>
-            <a:r>
-              <a:rPr kumimoji="1" lang="en" altLang="zh-CN" dirty="0"/>
-              <a:t>INCOMING</a:t>
+              <a:t>来连接并操作数据库。</a:t>
             </a:r>
             <a:endParaRPr kumimoji="1" lang="en-US" altLang="zh-CN" dirty="0"/>
           </a:p>
-          <a:p>
-            <a:r>
-              <a:rPr kumimoji="1" lang="zh-CN" altLang="en-US" dirty="0"/>
-              <a:t>属性：节点和关系都可以指定多个属性并参与查询。属性大小写敏感。</a:t>
-            </a:r>
-            <a:endParaRPr kumimoji="1" lang="en-US" altLang="zh-CN" dirty="0"/>
-          </a:p>
-          <a:p>
-            <a:br>
-              <a:rPr kumimoji="1" lang="en-US" altLang="zh-CN" dirty="0"/>
-            </a:br>
-            <a:endParaRPr kumimoji="1" lang="en-US" altLang="zh-CN" dirty="0"/>
-          </a:p>
-          <a:p>
-            <a:pPr marL="0" indent="0">
-              <a:buNone/>
-            </a:pPr>
-            <a:endParaRPr kumimoji="1" lang="en-US" altLang="zh-CN" dirty="0"/>
-          </a:p>
-          <a:p>
-            <a:pPr marL="0" indent="0">
-              <a:buNone/>
-            </a:pPr>
-            <a:r>
-              <a:rPr kumimoji="1" lang="en-US" altLang="zh-CN" dirty="0"/>
-              <a:t>	</a:t>
-            </a:r>
-          </a:p>
-          <a:p>
-            <a:pPr marL="0" indent="0">
-              <a:buNone/>
-            </a:pPr>
-            <a:endParaRPr kumimoji="1" lang="zh-CN" altLang="en-US" dirty="0"/>
-          </a:p>
-        </p:txBody>
-      </p:sp>
-      <p:pic>
-        <p:nvPicPr>
-          <p:cNvPr id="4" name="图片 3">
-            <a:extLst>
-              <a:ext uri="{FF2B5EF4-FFF2-40B4-BE49-F238E27FC236}">
-                <a16:creationId xmlns:a16="http://schemas.microsoft.com/office/drawing/2014/main" id="{8370E82C-2F97-F34E-9663-9E1F9E6B1900}"/>
-              </a:ext>
-            </a:extLst>
-          </p:cNvPr>
-          <p:cNvPicPr>
-            <a:picLocks noChangeAspect="1"/>
-          </p:cNvPicPr>
-          <p:nvPr/>
-        </p:nvPicPr>
-        <p:blipFill>
-          <a:blip r:embed="rId2"/>
-          <a:stretch>
-            <a:fillRect/>
-          </a:stretch>
-        </p:blipFill>
-        <p:spPr>
-          <a:xfrm>
-            <a:off x="3025802" y="3583029"/>
-            <a:ext cx="6140395" cy="3345041"/>
-          </a:xfrm>
-          <a:prstGeom prst="rect">
-            <a:avLst/>
-          </a:prstGeom>
-        </p:spPr>
-      </p:pic>
+        </p:txBody>
+      </p:sp>
     </p:spTree>
     <p:extLst>
       <p:ext uri="{BB962C8B-B14F-4D97-AF65-F5344CB8AC3E}">
-        <p14:creationId xmlns:p14="http://schemas.microsoft.com/office/powerpoint/2010/main" val="24335233"/>
+        <p14:creationId xmlns:p14="http://schemas.microsoft.com/office/powerpoint/2010/main" val="3550747937"/>
       </p:ext>
     </p:extLst>
   </p:cSld>

</xml_diff>

<commit_message>
文档 by qiyu 2023-03-19
</commit_message>
<xml_diff>
--- a/doc/Neo4j简介.pptx
+++ b/doc/Neo4j简介.pptx
@@ -20,9 +20,10 @@
     <p:sldId id="271" r:id="rId14"/>
     <p:sldId id="272" r:id="rId15"/>
     <p:sldId id="270" r:id="rId16"/>
-    <p:sldId id="268" r:id="rId17"/>
-    <p:sldId id="267" r:id="rId18"/>
-    <p:sldId id="266" r:id="rId19"/>
+    <p:sldId id="274" r:id="rId17"/>
+    <p:sldId id="268" r:id="rId18"/>
+    <p:sldId id="267" r:id="rId19"/>
+    <p:sldId id="266" r:id="rId20"/>
   </p:sldIdLst>
   <p:sldSz cx="12192000" cy="6858000"/>
   <p:notesSz cx="6858000" cy="9144000"/>
@@ -318,7 +319,7 @@
             <a:fld id="{B61BEF0D-F0BB-DE4B-95CE-6DB70DBA9567}" type="datetimeFigureOut">
               <a:rPr lang="en-US" dirty="0"/>
               <a:pPr/>
-              <a:t>3/6/23</a:t>
+              <a:t>3/18/23</a:t>
             </a:fld>
             <a:endParaRPr lang="en-US" dirty="0"/>
           </a:p>
@@ -653,7 +654,7 @@
             <a:fld id="{B61BEF0D-F0BB-DE4B-95CE-6DB70DBA9567}" type="datetimeFigureOut">
               <a:rPr lang="en-US" dirty="0"/>
               <a:pPr/>
-              <a:t>3/6/23</a:t>
+              <a:t>3/18/23</a:t>
             </a:fld>
             <a:endParaRPr lang="en-US" dirty="0"/>
           </a:p>
@@ -1051,7 +1052,7 @@
             <a:fld id="{B61BEF0D-F0BB-DE4B-95CE-6DB70DBA9567}" type="datetimeFigureOut">
               <a:rPr lang="en-US" dirty="0"/>
               <a:pPr/>
-              <a:t>3/6/23</a:t>
+              <a:t>3/18/23</a:t>
             </a:fld>
             <a:endParaRPr lang="en-US" dirty="0"/>
           </a:p>
@@ -1384,7 +1385,7 @@
             <a:fld id="{B61BEF0D-F0BB-DE4B-95CE-6DB70DBA9567}" type="datetimeFigureOut">
               <a:rPr lang="en-US" dirty="0"/>
               <a:pPr/>
-              <a:t>3/6/23</a:t>
+              <a:t>3/18/23</a:t>
             </a:fld>
             <a:endParaRPr lang="en-US" dirty="0"/>
           </a:p>
@@ -1701,7 +1702,7 @@
             <a:fld id="{B61BEF0D-F0BB-DE4B-95CE-6DB70DBA9567}" type="datetimeFigureOut">
               <a:rPr lang="en-US" dirty="0"/>
               <a:pPr/>
-              <a:t>3/6/23</a:t>
+              <a:t>3/18/23</a:t>
             </a:fld>
             <a:endParaRPr lang="en-US" dirty="0"/>
           </a:p>
@@ -2094,7 +2095,7 @@
             <a:fld id="{B61BEF0D-F0BB-DE4B-95CE-6DB70DBA9567}" type="datetimeFigureOut">
               <a:rPr lang="en-US" dirty="0"/>
               <a:pPr/>
-              <a:t>3/6/23</a:t>
+              <a:t>3/18/23</a:t>
             </a:fld>
             <a:endParaRPr lang="en-US" dirty="0"/>
           </a:p>
@@ -2348,7 +2349,7 @@
             <a:fld id="{B61BEF0D-F0BB-DE4B-95CE-6DB70DBA9567}" type="datetimeFigureOut">
               <a:rPr lang="en-US" dirty="0"/>
               <a:pPr/>
-              <a:t>3/6/23</a:t>
+              <a:t>3/18/23</a:t>
             </a:fld>
             <a:endParaRPr lang="en-US" dirty="0"/>
           </a:p>
@@ -2607,7 +2608,7 @@
             <a:fld id="{B61BEF0D-F0BB-DE4B-95CE-6DB70DBA9567}" type="datetimeFigureOut">
               <a:rPr lang="en-US" dirty="0"/>
               <a:pPr/>
-              <a:t>3/6/23</a:t>
+              <a:t>3/18/23</a:t>
             </a:fld>
             <a:endParaRPr lang="en-US" dirty="0"/>
           </a:p>
@@ -2866,7 +2867,7 @@
             <a:fld id="{B61BEF0D-F0BB-DE4B-95CE-6DB70DBA9567}" type="datetimeFigureOut">
               <a:rPr lang="en-US" dirty="0"/>
               <a:pPr/>
-              <a:t>3/6/23</a:t>
+              <a:t>3/18/23</a:t>
             </a:fld>
             <a:endParaRPr lang="en-US" dirty="0"/>
           </a:p>
@@ -3192,7 +3193,7 @@
             <a:fld id="{B61BEF0D-F0BB-DE4B-95CE-6DB70DBA9567}" type="datetimeFigureOut">
               <a:rPr lang="en-US" dirty="0"/>
               <a:pPr/>
-              <a:t>3/6/23</a:t>
+              <a:t>3/18/23</a:t>
             </a:fld>
             <a:endParaRPr lang="en-US" dirty="0"/>
           </a:p>
@@ -3512,7 +3513,7 @@
             <a:fld id="{B61BEF0D-F0BB-DE4B-95CE-6DB70DBA9567}" type="datetimeFigureOut">
               <a:rPr lang="en-US" dirty="0"/>
               <a:pPr/>
-              <a:t>3/6/23</a:t>
+              <a:t>3/18/23</a:t>
             </a:fld>
             <a:endParaRPr lang="en-US" dirty="0"/>
           </a:p>
@@ -3966,7 +3967,7 @@
             <a:fld id="{B61BEF0D-F0BB-DE4B-95CE-6DB70DBA9567}" type="datetimeFigureOut">
               <a:rPr lang="en-US" dirty="0"/>
               <a:pPr/>
-              <a:t>3/6/23</a:t>
+              <a:t>3/18/23</a:t>
             </a:fld>
             <a:endParaRPr lang="en-US" dirty="0"/>
           </a:p>
@@ -4168,7 +4169,7 @@
             <a:fld id="{B61BEF0D-F0BB-DE4B-95CE-6DB70DBA9567}" type="datetimeFigureOut">
               <a:rPr lang="en-US" dirty="0"/>
               <a:pPr/>
-              <a:t>3/6/23</a:t>
+              <a:t>3/18/23</a:t>
             </a:fld>
             <a:endParaRPr lang="en-US" dirty="0"/>
           </a:p>
@@ -4342,7 +4343,7 @@
             <a:fld id="{B61BEF0D-F0BB-DE4B-95CE-6DB70DBA9567}" type="datetimeFigureOut">
               <a:rPr lang="en-US" dirty="0"/>
               <a:pPr/>
-              <a:t>3/6/23</a:t>
+              <a:t>3/18/23</a:t>
             </a:fld>
             <a:endParaRPr lang="en-US" dirty="0"/>
           </a:p>
@@ -4672,7 +4673,7 @@
             <a:fld id="{B61BEF0D-F0BB-DE4B-95CE-6DB70DBA9567}" type="datetimeFigureOut">
               <a:rPr lang="en-US" dirty="0"/>
               <a:pPr/>
-              <a:t>3/6/23</a:t>
+              <a:t>3/18/23</a:t>
             </a:fld>
             <a:endParaRPr lang="en-US" dirty="0"/>
           </a:p>
@@ -5014,7 +5015,7 @@
             <a:fld id="{B61BEF0D-F0BB-DE4B-95CE-6DB70DBA9567}" type="datetimeFigureOut">
               <a:rPr lang="en-US" dirty="0"/>
               <a:pPr/>
-              <a:t>3/6/23</a:t>
+              <a:t>3/18/23</a:t>
             </a:fld>
             <a:endParaRPr lang="en-US" dirty="0"/>
           </a:p>
@@ -7128,7 +7129,7 @@
             <a:fld id="{B61BEF0D-F0BB-DE4B-95CE-6DB70DBA9567}" type="datetimeFigureOut">
               <a:rPr lang="en-US" dirty="0"/>
               <a:pPr/>
-              <a:t>3/6/23</a:t>
+              <a:t>3/18/23</a:t>
             </a:fld>
             <a:endParaRPr lang="en-US" dirty="0"/>
           </a:p>
@@ -9350,7 +9351,224 @@
           <a:bodyPr/>
           <a:lstStyle/>
           <a:p>
-            <a:endParaRPr kumimoji="1" lang="zh-CN" altLang="en-US"/>
+            <a:r>
+              <a:rPr lang="en" altLang="zh-CN" b="0" i="0" dirty="0">
+                <a:solidFill>
+                  <a:srgbClr val="4D4D4D"/>
+                </a:solidFill>
+                <a:effectLst/>
+                <a:latin typeface="-apple-system"/>
+              </a:rPr>
+              <a:t>  Cypher</a:t>
+            </a:r>
+            <a:r>
+              <a:rPr lang="zh-CN" altLang="en-US" b="0" i="0" dirty="0">
+                <a:solidFill>
+                  <a:srgbClr val="4D4D4D"/>
+                </a:solidFill>
+                <a:effectLst/>
+                <a:latin typeface="-apple-system"/>
+              </a:rPr>
+              <a:t>查询计划程序将每个查询转换为执行计划。 执行计划告诉</a:t>
+            </a:r>
+            <a:r>
+              <a:rPr lang="en" altLang="zh-CN" b="0" i="0" dirty="0">
+                <a:solidFill>
+                  <a:srgbClr val="4D4D4D"/>
+                </a:solidFill>
+                <a:effectLst/>
+                <a:latin typeface="-apple-system"/>
+              </a:rPr>
+              <a:t>Neo4j</a:t>
+            </a:r>
+            <a:r>
+              <a:rPr lang="zh-CN" altLang="en-US" b="0" i="0" dirty="0">
+                <a:solidFill>
+                  <a:srgbClr val="4D4D4D"/>
+                </a:solidFill>
+                <a:effectLst/>
+                <a:latin typeface="-apple-system"/>
+              </a:rPr>
+              <a:t>在执行查询时要执行哪些操作。</a:t>
+            </a:r>
+            <a:r>
+              <a:rPr lang="en" altLang="zh-CN" b="0" i="0" dirty="0">
+                <a:solidFill>
+                  <a:srgbClr val="4D4D4D"/>
+                </a:solidFill>
+                <a:effectLst/>
+                <a:latin typeface="-apple-system"/>
+              </a:rPr>
+              <a:t>Neo4j</a:t>
+            </a:r>
+            <a:r>
+              <a:rPr lang="zh-CN" altLang="en-US" b="0" i="0" dirty="0">
+                <a:solidFill>
+                  <a:srgbClr val="4D4D4D"/>
+                </a:solidFill>
+                <a:effectLst/>
+                <a:latin typeface="-apple-system"/>
+              </a:rPr>
+              <a:t>使用的是基于成本的优化器（</a:t>
+            </a:r>
+            <a:r>
+              <a:rPr lang="en" altLang="zh-CN" b="0" i="0" dirty="0">
+                <a:solidFill>
+                  <a:srgbClr val="4D4D4D"/>
+                </a:solidFill>
+                <a:effectLst/>
+                <a:latin typeface="-apple-system"/>
+              </a:rPr>
+              <a:t>Cost Based Optimizer)</a:t>
+            </a:r>
+          </a:p>
+          <a:p>
+            <a:r>
+              <a:rPr lang="en-US" altLang="zh-CN" b="0" i="0" dirty="0">
+                <a:solidFill>
+                  <a:srgbClr val="4D4D4D"/>
+                </a:solidFill>
+                <a:effectLst/>
+                <a:latin typeface="-apple-system"/>
+              </a:rPr>
+              <a:t>Neo4j</a:t>
+            </a:r>
+            <a:r>
+              <a:rPr lang="zh-CN" altLang="en-US" b="0" i="0" dirty="0">
+                <a:solidFill>
+                  <a:srgbClr val="4D4D4D"/>
+                </a:solidFill>
+                <a:effectLst/>
+                <a:latin typeface="-apple-system"/>
+              </a:rPr>
+              <a:t>将查询分解为一些被称为运算符的小块。运算符以模式（</a:t>
+            </a:r>
+            <a:r>
+              <a:rPr lang="en-US" altLang="zh-CN" b="0" i="0" dirty="0">
+                <a:solidFill>
+                  <a:srgbClr val="4D4D4D"/>
+                </a:solidFill>
+                <a:effectLst/>
+                <a:latin typeface="-apple-system"/>
+              </a:rPr>
+              <a:t>Pattern</a:t>
+            </a:r>
+            <a:r>
+              <a:rPr lang="zh-CN" altLang="en-US" b="0" i="0" dirty="0">
+                <a:solidFill>
+                  <a:srgbClr val="4D4D4D"/>
+                </a:solidFill>
+                <a:effectLst/>
+                <a:latin typeface="-apple-system"/>
+              </a:rPr>
+              <a:t>）的形式连接在一起组成一个执行计划。</a:t>
+            </a:r>
+            <a:endParaRPr lang="en-US" altLang="zh-CN" b="0" i="0" dirty="0">
+              <a:solidFill>
+                <a:srgbClr val="4D4D4D"/>
+              </a:solidFill>
+              <a:effectLst/>
+              <a:latin typeface="-apple-system"/>
+            </a:endParaRPr>
+          </a:p>
+          <a:p>
+            <a:r>
+              <a:rPr kumimoji="1" lang="en-US" altLang="zh-CN" dirty="0"/>
+              <a:t> </a:t>
+            </a:r>
+            <a:r>
+              <a:rPr kumimoji="1" lang="zh-CN" altLang="en-US" dirty="0"/>
+              <a:t>查看</a:t>
+            </a:r>
+            <a:r>
+              <a:rPr kumimoji="1" lang="en-US" altLang="zh-CN" dirty="0"/>
+              <a:t>neo4j</a:t>
+            </a:r>
+            <a:r>
+              <a:rPr kumimoji="1" lang="zh-CN" altLang="en-US" dirty="0"/>
+              <a:t>执行计划有</a:t>
+            </a:r>
+            <a:r>
+              <a:rPr kumimoji="1" lang="en-US" altLang="zh-CN" dirty="0"/>
+              <a:t>2</a:t>
+            </a:r>
+            <a:r>
+              <a:rPr kumimoji="1" lang="zh-CN" altLang="en-US" dirty="0"/>
+              <a:t>种方式：</a:t>
+            </a:r>
+            <a:endParaRPr kumimoji="1" lang="en-US" altLang="zh-CN" dirty="0"/>
+          </a:p>
+          <a:p>
+            <a:pPr algn="l">
+              <a:buFont typeface="Arial" panose="020B0604020202020204" pitchFamily="34" charset="0"/>
+              <a:buChar char="•"/>
+            </a:pPr>
+            <a:r>
+              <a:rPr lang="en" altLang="zh-CN" b="1" i="0" dirty="0">
+                <a:solidFill>
+                  <a:srgbClr val="9C8EC1"/>
+                </a:solidFill>
+                <a:effectLst/>
+                <a:latin typeface="-apple-system"/>
+              </a:rPr>
+              <a:t>EXPLAIN</a:t>
+            </a:r>
+            <a:r>
+              <a:rPr lang="zh-CN" altLang="en" b="0" i="0" dirty="0">
+                <a:solidFill>
+                  <a:srgbClr val="000000"/>
+                </a:solidFill>
+                <a:effectLst/>
+                <a:latin typeface="-apple-system"/>
+              </a:rPr>
+              <a:t>：</a:t>
+            </a:r>
+            <a:r>
+              <a:rPr lang="zh-CN" altLang="en-US" b="0" i="0" dirty="0">
+                <a:solidFill>
+                  <a:srgbClr val="000000"/>
+                </a:solidFill>
+                <a:effectLst/>
+                <a:latin typeface="-apple-system"/>
+              </a:rPr>
+              <a:t>只查看执行计划，不执行语句，所以不会返回结果，数据库也不会产生变化。</a:t>
+            </a:r>
+          </a:p>
+          <a:p>
+            <a:pPr algn="l">
+              <a:buFont typeface="Arial" panose="020B0604020202020204" pitchFamily="34" charset="0"/>
+              <a:buChar char="•"/>
+            </a:pPr>
+            <a:r>
+              <a:rPr lang="en" altLang="zh-CN" b="1" i="0" dirty="0">
+                <a:solidFill>
+                  <a:srgbClr val="9C8EC1"/>
+                </a:solidFill>
+                <a:effectLst/>
+                <a:latin typeface="-apple-system"/>
+              </a:rPr>
+              <a:t>PROFILE</a:t>
+            </a:r>
+            <a:r>
+              <a:rPr lang="zh-CN" altLang="en" b="0" i="0" dirty="0">
+                <a:solidFill>
+                  <a:srgbClr val="000000"/>
+                </a:solidFill>
+                <a:effectLst/>
+                <a:latin typeface="-apple-system"/>
+              </a:rPr>
+              <a:t>：</a:t>
+            </a:r>
+            <a:r>
+              <a:rPr lang="zh-CN" altLang="en-US" dirty="0">
+                <a:solidFill>
+                  <a:srgbClr val="000000"/>
+                </a:solidFill>
+                <a:latin typeface="-apple-system"/>
+              </a:rPr>
+              <a:t>查看执行计划并执行语句，跟踪传递了多少行数据给每个运算符，以及每个运算符与存储层交互了多少次以获取必要的数据。</a:t>
+            </a:r>
+            <a:endParaRPr kumimoji="1" lang="zh-CN" altLang="en-US" dirty="0"/>
           </a:p>
         </p:txBody>
       </p:sp>
@@ -9389,7 +9607,7 @@
           <p:cNvPr id="2" name="标题 1">
             <a:extLst>
               <a:ext uri="{FF2B5EF4-FFF2-40B4-BE49-F238E27FC236}">
-                <a16:creationId xmlns:a16="http://schemas.microsoft.com/office/drawing/2014/main" id="{D080B79F-ED71-7245-B840-04A9E90E6934}"/>
+                <a16:creationId xmlns:a16="http://schemas.microsoft.com/office/drawing/2014/main" id="{248941F2-8384-3E45-BC78-01C74B251A50}"/>
               </a:ext>
             </a:extLst>
           </p:cNvPr>
@@ -9406,14 +9624,9 @@
           <a:lstStyle/>
           <a:p>
             <a:r>
-              <a:rPr kumimoji="1" lang="en-US" altLang="zh-CN" dirty="0"/>
-              <a:t>Neo4j</a:t>
-            </a:r>
-            <a:r>
-              <a:rPr kumimoji="1" lang="zh-CN" altLang="en-US"/>
-              <a:t>免索引邻接</a:t>
-            </a:r>
-            <a:endParaRPr kumimoji="1" lang="zh-CN" altLang="en-US" dirty="0"/>
+              <a:rPr kumimoji="1" lang="zh-CN" altLang="en-US" dirty="0"/>
+              <a:t>执行计划统计信息</a:t>
+            </a:r>
           </a:p>
         </p:txBody>
       </p:sp>
@@ -9422,7 +9635,7 @@
           <p:cNvPr id="3" name="内容占位符 2">
             <a:extLst>
               <a:ext uri="{FF2B5EF4-FFF2-40B4-BE49-F238E27FC236}">
-                <a16:creationId xmlns:a16="http://schemas.microsoft.com/office/drawing/2014/main" id="{AB5601CA-7E82-6B42-9FC2-6F912481A5C7}"/>
+                <a16:creationId xmlns:a16="http://schemas.microsoft.com/office/drawing/2014/main" id="{8D606DE9-D41E-6443-A36F-22BB10F53B61}"/>
               </a:ext>
             </a:extLst>
           </p:cNvPr>
@@ -9438,14 +9651,240 @@
           <a:bodyPr/>
           <a:lstStyle/>
           <a:p>
-            <a:endParaRPr kumimoji="1" lang="zh-CN" altLang="en-US"/>
-          </a:p>
-        </p:txBody>
-      </p:sp>
+            <a:r>
+              <a:rPr kumimoji="1" lang="en-US" altLang="zh-CN" dirty="0"/>
+              <a:t>rows</a:t>
+            </a:r>
+            <a:r>
+              <a:rPr kumimoji="1" lang="zh-CN" altLang="en-US" dirty="0"/>
+              <a:t>：</a:t>
+            </a:r>
+            <a:r>
+              <a:rPr kumimoji="1" lang="en-US" altLang="zh-CN" dirty="0"/>
+              <a:t>Row</a:t>
+            </a:r>
+            <a:r>
+              <a:rPr kumimoji="1" lang="zh-CN" altLang="en-US" dirty="0"/>
+              <a:t>运算符产生的行数，只有带</a:t>
+            </a:r>
+            <a:r>
+              <a:rPr kumimoji="1" lang="en-US" altLang="zh-CN" dirty="0"/>
+              <a:t>profile</a:t>
+            </a:r>
+            <a:r>
+              <a:rPr kumimoji="1" lang="zh-CN" altLang="en-US" dirty="0"/>
+              <a:t>的语句才会返回。</a:t>
+            </a:r>
+            <a:endParaRPr kumimoji="1" lang="en-US" altLang="zh-CN" dirty="0"/>
+          </a:p>
+          <a:p>
+            <a:r>
+              <a:rPr lang="en" altLang="zh-CN" b="0" i="0" dirty="0">
+                <a:solidFill>
+                  <a:srgbClr val="333333"/>
+                </a:solidFill>
+                <a:effectLst/>
+                <a:latin typeface="Helvetica Neue" panose="02000503000000020004" pitchFamily="2" charset="0"/>
+              </a:rPr>
+              <a:t>estimated rows</a:t>
+            </a:r>
+            <a:r>
+              <a:rPr kumimoji="1" lang="zh-CN" altLang="en-US" b="0" i="0" dirty="0">
+                <a:solidFill>
+                  <a:srgbClr val="333333"/>
+                </a:solidFill>
+                <a:effectLst/>
+                <a:latin typeface="Helvetica Neue" panose="02000503000000020004" pitchFamily="2" charset="0"/>
+              </a:rPr>
+              <a:t>：</a:t>
+            </a:r>
+            <a:r>
+              <a:rPr lang="en" altLang="zh-CN" b="0" i="0" dirty="0">
+                <a:solidFill>
+                  <a:srgbClr val="4D4D4D"/>
+                </a:solidFill>
+                <a:effectLst/>
+                <a:latin typeface="-apple-system"/>
+              </a:rPr>
+              <a:t> Neo4j</a:t>
+            </a:r>
+            <a:r>
+              <a:rPr lang="zh-CN" altLang="en-US" b="0" i="0" dirty="0">
+                <a:solidFill>
+                  <a:srgbClr val="4D4D4D"/>
+                </a:solidFill>
+                <a:effectLst/>
+                <a:latin typeface="-apple-system"/>
+              </a:rPr>
+              <a:t>使用的是基于成本的优化器，可以看到由运算符产生的预估行数。编译器使用这个预估值来选择合适的执行计划。</a:t>
+            </a:r>
+            <a:endParaRPr lang="en-US" altLang="zh-CN" b="0" i="0" dirty="0">
+              <a:solidFill>
+                <a:srgbClr val="4D4D4D"/>
+              </a:solidFill>
+              <a:effectLst/>
+              <a:latin typeface="-apple-system"/>
+            </a:endParaRPr>
+          </a:p>
+          <a:p>
+            <a:r>
+              <a:rPr kumimoji="1" lang="en-US" altLang="zh-CN" dirty="0">
+                <a:solidFill>
+                  <a:srgbClr val="4D4D4D"/>
+                </a:solidFill>
+                <a:latin typeface="-apple-system"/>
+              </a:rPr>
+              <a:t>Db hits: </a:t>
+            </a:r>
+            <a:r>
+              <a:rPr kumimoji="1" lang="zh-CN" altLang="en-US" dirty="0">
+                <a:solidFill>
+                  <a:srgbClr val="4D4D4D"/>
+                </a:solidFill>
+                <a:latin typeface="-apple-system"/>
+              </a:rPr>
+              <a:t>每个运算符都会向</a:t>
+            </a:r>
+            <a:r>
+              <a:rPr kumimoji="1" lang="en-US" altLang="zh-CN" dirty="0">
+                <a:solidFill>
+                  <a:srgbClr val="4D4D4D"/>
+                </a:solidFill>
+                <a:latin typeface="-apple-system"/>
+              </a:rPr>
+              <a:t>Neo4j</a:t>
+            </a:r>
+            <a:r>
+              <a:rPr kumimoji="1" lang="zh-CN" altLang="en-US" dirty="0">
+                <a:solidFill>
+                  <a:srgbClr val="4D4D4D"/>
+                </a:solidFill>
+                <a:latin typeface="-apple-system"/>
+              </a:rPr>
+              <a:t>存储引擎请求像数据检索或者更新数据这样的工作。</a:t>
+            </a:r>
+            <a:br>
+              <a:rPr kumimoji="1" lang="en-US" altLang="zh-CN" dirty="0">
+                <a:solidFill>
+                  <a:srgbClr val="4D4D4D"/>
+                </a:solidFill>
+                <a:latin typeface="-apple-system"/>
+              </a:rPr>
+            </a:br>
+            <a:r>
+              <a:rPr kumimoji="1" lang="zh-CN" altLang="en-US" dirty="0">
+                <a:solidFill>
+                  <a:srgbClr val="4D4D4D"/>
+                </a:solidFill>
+                <a:latin typeface="-apple-system"/>
+              </a:rPr>
+              <a:t>一次</a:t>
+            </a:r>
+            <a:r>
+              <a:rPr kumimoji="1" lang="en-US" altLang="zh-CN" dirty="0">
+                <a:solidFill>
+                  <a:srgbClr val="4D4D4D"/>
+                </a:solidFill>
+                <a:latin typeface="-apple-system"/>
+              </a:rPr>
+              <a:t>db</a:t>
+            </a:r>
+            <a:r>
+              <a:rPr kumimoji="1" lang="zh-CN" altLang="en-US" dirty="0">
+                <a:solidFill>
+                  <a:srgbClr val="4D4D4D"/>
+                </a:solidFill>
+                <a:latin typeface="-apple-system"/>
+              </a:rPr>
+              <a:t> </a:t>
+            </a:r>
+            <a:r>
+              <a:rPr kumimoji="1" lang="en-US" altLang="zh-CN" dirty="0">
+                <a:solidFill>
+                  <a:srgbClr val="4D4D4D"/>
+                </a:solidFill>
+                <a:latin typeface="-apple-system"/>
+              </a:rPr>
+              <a:t>hits(</a:t>
+            </a:r>
+            <a:r>
+              <a:rPr kumimoji="1" lang="zh-CN" altLang="en-US" dirty="0">
+                <a:solidFill>
+                  <a:srgbClr val="4D4D4D"/>
+                </a:solidFill>
+                <a:latin typeface="-apple-system"/>
+              </a:rPr>
+              <a:t>数据库命中</a:t>
+            </a:r>
+            <a:r>
+              <a:rPr kumimoji="1" lang="en-US" altLang="zh-CN" dirty="0">
+                <a:solidFill>
+                  <a:srgbClr val="4D4D4D"/>
+                </a:solidFill>
+                <a:latin typeface="-apple-system"/>
+              </a:rPr>
+              <a:t>)</a:t>
+            </a:r>
+            <a:r>
+              <a:rPr kumimoji="1" lang="zh-CN" altLang="en-US" dirty="0">
+                <a:solidFill>
+                  <a:srgbClr val="4D4D4D"/>
+                </a:solidFill>
+                <a:latin typeface="-apple-system"/>
+              </a:rPr>
+              <a:t>是存储引擎工作的一个抽象单元。</a:t>
+            </a:r>
+            <a:endParaRPr kumimoji="1" lang="en-US" altLang="zh-CN" dirty="0">
+              <a:solidFill>
+                <a:srgbClr val="4D4D4D"/>
+              </a:solidFill>
+              <a:latin typeface="-apple-system"/>
+            </a:endParaRPr>
+          </a:p>
+          <a:p>
+            <a:endParaRPr kumimoji="1" lang="en-US" altLang="zh-CN" dirty="0">
+              <a:solidFill>
+                <a:srgbClr val="4D4D4D"/>
+              </a:solidFill>
+              <a:latin typeface="-apple-system"/>
+            </a:endParaRPr>
+          </a:p>
+        </p:txBody>
+      </p:sp>
+      <p:pic>
+        <p:nvPicPr>
+          <p:cNvPr id="6" name="图片 5">
+            <a:extLst>
+              <a:ext uri="{FF2B5EF4-FFF2-40B4-BE49-F238E27FC236}">
+                <a16:creationId xmlns:a16="http://schemas.microsoft.com/office/drawing/2014/main" id="{9EA8B494-BBE1-A74A-8DFD-631B7B240E77}"/>
+              </a:ext>
+            </a:extLst>
+          </p:cNvPr>
+          <p:cNvPicPr>
+            <a:picLocks noChangeAspect="1"/>
+          </p:cNvPicPr>
+          <p:nvPr/>
+        </p:nvPicPr>
+        <p:blipFill>
+          <a:blip r:embed="rId2"/>
+          <a:stretch>
+            <a:fillRect/>
+          </a:stretch>
+        </p:blipFill>
+        <p:spPr>
+          <a:xfrm>
+            <a:off x="4514400" y="3849624"/>
+            <a:ext cx="5065024" cy="2740308"/>
+          </a:xfrm>
+          <a:prstGeom prst="rect">
+            <a:avLst/>
+          </a:prstGeom>
+        </p:spPr>
+      </p:pic>
     </p:spTree>
     <p:extLst>
       <p:ext uri="{BB962C8B-B14F-4D97-AF65-F5344CB8AC3E}">
-        <p14:creationId xmlns:p14="http://schemas.microsoft.com/office/powerpoint/2010/main" val="3794740161"/>
+        <p14:creationId xmlns:p14="http://schemas.microsoft.com/office/powerpoint/2010/main" val="2449984970"/>
       </p:ext>
     </p:extLst>
   </p:cSld>
@@ -9477,6 +9916,94 @@
           <p:cNvPr id="2" name="标题 1">
             <a:extLst>
               <a:ext uri="{FF2B5EF4-FFF2-40B4-BE49-F238E27FC236}">
+                <a16:creationId xmlns:a16="http://schemas.microsoft.com/office/drawing/2014/main" id="{D080B79F-ED71-7245-B840-04A9E90E6934}"/>
+              </a:ext>
+            </a:extLst>
+          </p:cNvPr>
+          <p:cNvSpPr>
+            <a:spLocks noGrp="1"/>
+          </p:cNvSpPr>
+          <p:nvPr>
+            <p:ph type="title"/>
+          </p:nvPr>
+        </p:nvSpPr>
+        <p:spPr/>
+        <p:txBody>
+          <a:bodyPr/>
+          <a:lstStyle/>
+          <a:p>
+            <a:r>
+              <a:rPr kumimoji="1" lang="en-US" altLang="zh-CN" dirty="0"/>
+              <a:t>Neo4j</a:t>
+            </a:r>
+            <a:r>
+              <a:rPr kumimoji="1" lang="zh-CN" altLang="en-US"/>
+              <a:t>免索引邻接</a:t>
+            </a:r>
+            <a:endParaRPr kumimoji="1" lang="zh-CN" altLang="en-US" dirty="0"/>
+          </a:p>
+        </p:txBody>
+      </p:sp>
+      <p:sp>
+        <p:nvSpPr>
+          <p:cNvPr id="3" name="内容占位符 2">
+            <a:extLst>
+              <a:ext uri="{FF2B5EF4-FFF2-40B4-BE49-F238E27FC236}">
+                <a16:creationId xmlns:a16="http://schemas.microsoft.com/office/drawing/2014/main" id="{AB5601CA-7E82-6B42-9FC2-6F912481A5C7}"/>
+              </a:ext>
+            </a:extLst>
+          </p:cNvPr>
+          <p:cNvSpPr>
+            <a:spLocks noGrp="1"/>
+          </p:cNvSpPr>
+          <p:nvPr>
+            <p:ph idx="1"/>
+          </p:nvPr>
+        </p:nvSpPr>
+        <p:spPr/>
+        <p:txBody>
+          <a:bodyPr/>
+          <a:lstStyle/>
+          <a:p>
+            <a:endParaRPr kumimoji="1" lang="zh-CN" altLang="en-US" dirty="0"/>
+          </a:p>
+        </p:txBody>
+      </p:sp>
+    </p:spTree>
+    <p:extLst>
+      <p:ext uri="{BB962C8B-B14F-4D97-AF65-F5344CB8AC3E}">
+        <p14:creationId xmlns:p14="http://schemas.microsoft.com/office/powerpoint/2010/main" val="3794740161"/>
+      </p:ext>
+    </p:extLst>
+  </p:cSld>
+  <p:clrMapOvr>
+    <a:masterClrMapping/>
+  </p:clrMapOvr>
+</p:sld>
+</file>
+
+<file path=ppt/slides/slide18.xml><?xml version="1.0" encoding="utf-8"?>
+<p:sld xmlns:a="http://schemas.openxmlformats.org/drawingml/2006/main" xmlns:r="http://schemas.openxmlformats.org/officeDocument/2006/relationships" xmlns:p="http://schemas.openxmlformats.org/presentationml/2006/main">
+  <p:cSld>
+    <p:spTree>
+      <p:nvGrpSpPr>
+        <p:cNvPr id="1" name=""/>
+        <p:cNvGrpSpPr/>
+        <p:nvPr/>
+      </p:nvGrpSpPr>
+      <p:grpSpPr>
+        <a:xfrm>
+          <a:off x="0" y="0"/>
+          <a:ext cx="0" cy="0"/>
+          <a:chOff x="0" y="0"/>
+          <a:chExt cx="0" cy="0"/>
+        </a:xfrm>
+      </p:grpSpPr>
+      <p:sp>
+        <p:nvSpPr>
+          <p:cNvPr id="2" name="标题 1">
+            <a:extLst>
+              <a:ext uri="{FF2B5EF4-FFF2-40B4-BE49-F238E27FC236}">
                 <a16:creationId xmlns:a16="http://schemas.microsoft.com/office/drawing/2014/main" id="{64AA338F-5E28-8645-9FBA-8CE398797205}"/>
               </a:ext>
             </a:extLst>
@@ -9542,7 +10069,7 @@
 </p:sld>
 </file>
 
-<file path=ppt/slides/slide18.xml><?xml version="1.0" encoding="utf-8"?>
+<file path=ppt/slides/slide19.xml><?xml version="1.0" encoding="utf-8"?>
 <p:sld xmlns:a="http://schemas.openxmlformats.org/drawingml/2006/main" xmlns:r="http://schemas.openxmlformats.org/officeDocument/2006/relationships" xmlns:p="http://schemas.openxmlformats.org/presentationml/2006/main">
   <p:cSld>
     <p:spTree>

</xml_diff>

<commit_message>
文档 by qiyu 2023-03-22
</commit_message>
<xml_diff>
--- a/doc/Neo4j简介.pptx
+++ b/doc/Neo4j简介.pptx
@@ -319,7 +319,7 @@
             <a:fld id="{B61BEF0D-F0BB-DE4B-95CE-6DB70DBA9567}" type="datetimeFigureOut">
               <a:rPr lang="en-US" dirty="0"/>
               <a:pPr/>
-              <a:t>3/18/23</a:t>
+              <a:t>3/22/23</a:t>
             </a:fld>
             <a:endParaRPr lang="en-US" dirty="0"/>
           </a:p>
@@ -654,7 +654,7 @@
             <a:fld id="{B61BEF0D-F0BB-DE4B-95CE-6DB70DBA9567}" type="datetimeFigureOut">
               <a:rPr lang="en-US" dirty="0"/>
               <a:pPr/>
-              <a:t>3/18/23</a:t>
+              <a:t>3/22/23</a:t>
             </a:fld>
             <a:endParaRPr lang="en-US" dirty="0"/>
           </a:p>
@@ -1052,7 +1052,7 @@
             <a:fld id="{B61BEF0D-F0BB-DE4B-95CE-6DB70DBA9567}" type="datetimeFigureOut">
               <a:rPr lang="en-US" dirty="0"/>
               <a:pPr/>
-              <a:t>3/18/23</a:t>
+              <a:t>3/22/23</a:t>
             </a:fld>
             <a:endParaRPr lang="en-US" dirty="0"/>
           </a:p>
@@ -1385,7 +1385,7 @@
             <a:fld id="{B61BEF0D-F0BB-DE4B-95CE-6DB70DBA9567}" type="datetimeFigureOut">
               <a:rPr lang="en-US" dirty="0"/>
               <a:pPr/>
-              <a:t>3/18/23</a:t>
+              <a:t>3/22/23</a:t>
             </a:fld>
             <a:endParaRPr lang="en-US" dirty="0"/>
           </a:p>
@@ -1702,7 +1702,7 @@
             <a:fld id="{B61BEF0D-F0BB-DE4B-95CE-6DB70DBA9567}" type="datetimeFigureOut">
               <a:rPr lang="en-US" dirty="0"/>
               <a:pPr/>
-              <a:t>3/18/23</a:t>
+              <a:t>3/22/23</a:t>
             </a:fld>
             <a:endParaRPr lang="en-US" dirty="0"/>
           </a:p>
@@ -2095,7 +2095,7 @@
             <a:fld id="{B61BEF0D-F0BB-DE4B-95CE-6DB70DBA9567}" type="datetimeFigureOut">
               <a:rPr lang="en-US" dirty="0"/>
               <a:pPr/>
-              <a:t>3/18/23</a:t>
+              <a:t>3/22/23</a:t>
             </a:fld>
             <a:endParaRPr lang="en-US" dirty="0"/>
           </a:p>
@@ -2349,7 +2349,7 @@
             <a:fld id="{B61BEF0D-F0BB-DE4B-95CE-6DB70DBA9567}" type="datetimeFigureOut">
               <a:rPr lang="en-US" dirty="0"/>
               <a:pPr/>
-              <a:t>3/18/23</a:t>
+              <a:t>3/22/23</a:t>
             </a:fld>
             <a:endParaRPr lang="en-US" dirty="0"/>
           </a:p>
@@ -2608,7 +2608,7 @@
             <a:fld id="{B61BEF0D-F0BB-DE4B-95CE-6DB70DBA9567}" type="datetimeFigureOut">
               <a:rPr lang="en-US" dirty="0"/>
               <a:pPr/>
-              <a:t>3/18/23</a:t>
+              <a:t>3/22/23</a:t>
             </a:fld>
             <a:endParaRPr lang="en-US" dirty="0"/>
           </a:p>
@@ -2867,7 +2867,7 @@
             <a:fld id="{B61BEF0D-F0BB-DE4B-95CE-6DB70DBA9567}" type="datetimeFigureOut">
               <a:rPr lang="en-US" dirty="0"/>
               <a:pPr/>
-              <a:t>3/18/23</a:t>
+              <a:t>3/22/23</a:t>
             </a:fld>
             <a:endParaRPr lang="en-US" dirty="0"/>
           </a:p>
@@ -3193,7 +3193,7 @@
             <a:fld id="{B61BEF0D-F0BB-DE4B-95CE-6DB70DBA9567}" type="datetimeFigureOut">
               <a:rPr lang="en-US" dirty="0"/>
               <a:pPr/>
-              <a:t>3/18/23</a:t>
+              <a:t>3/22/23</a:t>
             </a:fld>
             <a:endParaRPr lang="en-US" dirty="0"/>
           </a:p>
@@ -3513,7 +3513,7 @@
             <a:fld id="{B61BEF0D-F0BB-DE4B-95CE-6DB70DBA9567}" type="datetimeFigureOut">
               <a:rPr lang="en-US" dirty="0"/>
               <a:pPr/>
-              <a:t>3/18/23</a:t>
+              <a:t>3/22/23</a:t>
             </a:fld>
             <a:endParaRPr lang="en-US" dirty="0"/>
           </a:p>
@@ -3967,7 +3967,7 @@
             <a:fld id="{B61BEF0D-F0BB-DE4B-95CE-6DB70DBA9567}" type="datetimeFigureOut">
               <a:rPr lang="en-US" dirty="0"/>
               <a:pPr/>
-              <a:t>3/18/23</a:t>
+              <a:t>3/22/23</a:t>
             </a:fld>
             <a:endParaRPr lang="en-US" dirty="0"/>
           </a:p>
@@ -4169,7 +4169,7 @@
             <a:fld id="{B61BEF0D-F0BB-DE4B-95CE-6DB70DBA9567}" type="datetimeFigureOut">
               <a:rPr lang="en-US" dirty="0"/>
               <a:pPr/>
-              <a:t>3/18/23</a:t>
+              <a:t>3/22/23</a:t>
             </a:fld>
             <a:endParaRPr lang="en-US" dirty="0"/>
           </a:p>
@@ -4343,7 +4343,7 @@
             <a:fld id="{B61BEF0D-F0BB-DE4B-95CE-6DB70DBA9567}" type="datetimeFigureOut">
               <a:rPr lang="en-US" dirty="0"/>
               <a:pPr/>
-              <a:t>3/18/23</a:t>
+              <a:t>3/22/23</a:t>
             </a:fld>
             <a:endParaRPr lang="en-US" dirty="0"/>
           </a:p>
@@ -4673,7 +4673,7 @@
             <a:fld id="{B61BEF0D-F0BB-DE4B-95CE-6DB70DBA9567}" type="datetimeFigureOut">
               <a:rPr lang="en-US" dirty="0"/>
               <a:pPr/>
-              <a:t>3/18/23</a:t>
+              <a:t>3/22/23</a:t>
             </a:fld>
             <a:endParaRPr lang="en-US" dirty="0"/>
           </a:p>
@@ -5015,7 +5015,7 @@
             <a:fld id="{B61BEF0D-F0BB-DE4B-95CE-6DB70DBA9567}" type="datetimeFigureOut">
               <a:rPr lang="en-US" dirty="0"/>
               <a:pPr/>
-              <a:t>3/18/23</a:t>
+              <a:t>3/22/23</a:t>
             </a:fld>
             <a:endParaRPr lang="en-US" dirty="0"/>
           </a:p>
@@ -7129,7 +7129,7 @@
             <a:fld id="{B61BEF0D-F0BB-DE4B-95CE-6DB70DBA9567}" type="datetimeFigureOut">
               <a:rPr lang="en-US" dirty="0"/>
               <a:pPr/>
-              <a:t>3/18/23</a:t>
+              <a:t>3/22/23</a:t>
             </a:fld>
             <a:endParaRPr lang="en-US" dirty="0"/>
           </a:p>
@@ -8058,7 +8058,9 @@
           </a:xfrm>
         </p:spPr>
         <p:txBody>
-          <a:bodyPr/>
+          <a:bodyPr>
+            <a:normAutofit lnSpcReduction="10000"/>
+          </a:bodyPr>
           <a:lstStyle/>
           <a:p>
             <a:r>
@@ -8182,6 +8184,37 @@
             <a:endParaRPr kumimoji="1" lang="en-US" altLang="zh-CN" dirty="0"/>
           </a:p>
           <a:p>
+            <a:r>
+              <a:rPr kumimoji="1" lang="zh-CN" altLang="en-US" dirty="0"/>
+              <a:t>注意：</a:t>
+            </a:r>
+            <a:r>
+              <a:rPr kumimoji="1" lang="en-US" altLang="zh-CN" dirty="0"/>
+              <a:t>Neo4j</a:t>
+            </a:r>
+            <a:r>
+              <a:rPr kumimoji="1" lang="zh-CN" altLang="en-US" dirty="0"/>
+              <a:t>的关系虽然是单向的，但是查询时可以忽略关系的方向。</a:t>
+            </a:r>
+            <a:br>
+              <a:rPr kumimoji="1" lang="en-US" altLang="zh-CN" dirty="0"/>
+            </a:br>
+            <a:r>
+              <a:rPr kumimoji="1" lang="zh-CN" altLang="en-US" dirty="0"/>
+              <a:t>只要在查询时不指定方向即可。</a:t>
+            </a:r>
+            <a:r>
+              <a:rPr kumimoji="1" lang="en-US" altLang="zh-CN" dirty="0"/>
+              <a:t> (p1:Person)-[</a:t>
+            </a:r>
+            <a:r>
+              <a:rPr kumimoji="1" lang="en-US" altLang="zh-CN"/>
+              <a:t>r:FRIEND]-(</a:t>
+            </a:r>
+            <a:r>
+              <a:rPr kumimoji="1" lang="en-US" altLang="zh-CN" dirty="0"/>
+              <a:t>p2:Person) </a:t>
+            </a:r>
             <a:br>
               <a:rPr kumimoji="1" lang="en-US" altLang="zh-CN" dirty="0"/>
             </a:br>
@@ -8232,8 +8265,8 @@
         </p:blipFill>
         <p:spPr>
           <a:xfrm>
-            <a:off x="3025802" y="3583029"/>
-            <a:ext cx="6140395" cy="3345041"/>
+            <a:off x="3690127" y="4069080"/>
+            <a:ext cx="4811745" cy="2621246"/>
           </a:xfrm>
           <a:prstGeom prst="rect">
             <a:avLst/>
@@ -9761,24 +9794,7 @@
                 </a:solidFill>
                 <a:latin typeface="-apple-system"/>
               </a:rPr>
-              <a:t>存储引擎请求像数据检索或者更新数据这样的工作。</a:t>
-            </a:r>
-            <a:br>
-              <a:rPr kumimoji="1" lang="en-US" altLang="zh-CN" dirty="0">
-                <a:solidFill>
-                  <a:srgbClr val="4D4D4D"/>
-                </a:solidFill>
-                <a:latin typeface="-apple-system"/>
-              </a:rPr>
-            </a:br>
-            <a:r>
-              <a:rPr kumimoji="1" lang="zh-CN" altLang="en-US" dirty="0">
-                <a:solidFill>
-                  <a:srgbClr val="4D4D4D"/>
-                </a:solidFill>
-                <a:latin typeface="-apple-system"/>
-              </a:rPr>
-              <a:t>一次</a:t>
+              <a:t>存储引擎请求像数据检索或者更新数据这样的工作。一次</a:t>
             </a:r>
             <a:r>
               <a:rPr kumimoji="1" lang="en-US" altLang="zh-CN" dirty="0">

</xml_diff>

<commit_message>
文档 by qiyu 2023-03-26
</commit_message>
<xml_diff>
--- a/doc/Neo4j简介.pptx
+++ b/doc/Neo4j简介.pptx
@@ -23,8 +23,9 @@
     <p:sldId id="274" r:id="rId17"/>
     <p:sldId id="268" r:id="rId18"/>
     <p:sldId id="267" r:id="rId19"/>
-    <p:sldId id="266" r:id="rId20"/>
-    <p:sldId id="275" r:id="rId21"/>
+    <p:sldId id="276" r:id="rId20"/>
+    <p:sldId id="266" r:id="rId21"/>
+    <p:sldId id="275" r:id="rId22"/>
   </p:sldIdLst>
   <p:sldSz cx="12192000" cy="6858000"/>
   <p:notesSz cx="6858000" cy="9144000"/>
@@ -320,7 +321,7 @@
             <a:fld id="{B61BEF0D-F0BB-DE4B-95CE-6DB70DBA9567}" type="datetimeFigureOut">
               <a:rPr lang="en-US" dirty="0"/>
               <a:pPr/>
-              <a:t>3/23/23</a:t>
+              <a:t>3/26/23</a:t>
             </a:fld>
             <a:endParaRPr lang="en-US" dirty="0"/>
           </a:p>
@@ -655,7 +656,7 @@
             <a:fld id="{B61BEF0D-F0BB-DE4B-95CE-6DB70DBA9567}" type="datetimeFigureOut">
               <a:rPr lang="en-US" dirty="0"/>
               <a:pPr/>
-              <a:t>3/23/23</a:t>
+              <a:t>3/26/23</a:t>
             </a:fld>
             <a:endParaRPr lang="en-US" dirty="0"/>
           </a:p>
@@ -1053,7 +1054,7 @@
             <a:fld id="{B61BEF0D-F0BB-DE4B-95CE-6DB70DBA9567}" type="datetimeFigureOut">
               <a:rPr lang="en-US" dirty="0"/>
               <a:pPr/>
-              <a:t>3/23/23</a:t>
+              <a:t>3/26/23</a:t>
             </a:fld>
             <a:endParaRPr lang="en-US" dirty="0"/>
           </a:p>
@@ -1386,7 +1387,7 @@
             <a:fld id="{B61BEF0D-F0BB-DE4B-95CE-6DB70DBA9567}" type="datetimeFigureOut">
               <a:rPr lang="en-US" dirty="0"/>
               <a:pPr/>
-              <a:t>3/23/23</a:t>
+              <a:t>3/26/23</a:t>
             </a:fld>
             <a:endParaRPr lang="en-US" dirty="0"/>
           </a:p>
@@ -1703,7 +1704,7 @@
             <a:fld id="{B61BEF0D-F0BB-DE4B-95CE-6DB70DBA9567}" type="datetimeFigureOut">
               <a:rPr lang="en-US" dirty="0"/>
               <a:pPr/>
-              <a:t>3/23/23</a:t>
+              <a:t>3/26/23</a:t>
             </a:fld>
             <a:endParaRPr lang="en-US" dirty="0"/>
           </a:p>
@@ -2096,7 +2097,7 @@
             <a:fld id="{B61BEF0D-F0BB-DE4B-95CE-6DB70DBA9567}" type="datetimeFigureOut">
               <a:rPr lang="en-US" dirty="0"/>
               <a:pPr/>
-              <a:t>3/23/23</a:t>
+              <a:t>3/26/23</a:t>
             </a:fld>
             <a:endParaRPr lang="en-US" dirty="0"/>
           </a:p>
@@ -2350,7 +2351,7 @@
             <a:fld id="{B61BEF0D-F0BB-DE4B-95CE-6DB70DBA9567}" type="datetimeFigureOut">
               <a:rPr lang="en-US" dirty="0"/>
               <a:pPr/>
-              <a:t>3/23/23</a:t>
+              <a:t>3/26/23</a:t>
             </a:fld>
             <a:endParaRPr lang="en-US" dirty="0"/>
           </a:p>
@@ -2609,7 +2610,7 @@
             <a:fld id="{B61BEF0D-F0BB-DE4B-95CE-6DB70DBA9567}" type="datetimeFigureOut">
               <a:rPr lang="en-US" dirty="0"/>
               <a:pPr/>
-              <a:t>3/23/23</a:t>
+              <a:t>3/26/23</a:t>
             </a:fld>
             <a:endParaRPr lang="en-US" dirty="0"/>
           </a:p>
@@ -2868,7 +2869,7 @@
             <a:fld id="{B61BEF0D-F0BB-DE4B-95CE-6DB70DBA9567}" type="datetimeFigureOut">
               <a:rPr lang="en-US" dirty="0"/>
               <a:pPr/>
-              <a:t>3/23/23</a:t>
+              <a:t>3/26/23</a:t>
             </a:fld>
             <a:endParaRPr lang="en-US" dirty="0"/>
           </a:p>
@@ -3194,7 +3195,7 @@
             <a:fld id="{B61BEF0D-F0BB-DE4B-95CE-6DB70DBA9567}" type="datetimeFigureOut">
               <a:rPr lang="en-US" dirty="0"/>
               <a:pPr/>
-              <a:t>3/23/23</a:t>
+              <a:t>3/26/23</a:t>
             </a:fld>
             <a:endParaRPr lang="en-US" dirty="0"/>
           </a:p>
@@ -3514,7 +3515,7 @@
             <a:fld id="{B61BEF0D-F0BB-DE4B-95CE-6DB70DBA9567}" type="datetimeFigureOut">
               <a:rPr lang="en-US" dirty="0"/>
               <a:pPr/>
-              <a:t>3/23/23</a:t>
+              <a:t>3/26/23</a:t>
             </a:fld>
             <a:endParaRPr lang="en-US" dirty="0"/>
           </a:p>
@@ -3968,7 +3969,7 @@
             <a:fld id="{B61BEF0D-F0BB-DE4B-95CE-6DB70DBA9567}" type="datetimeFigureOut">
               <a:rPr lang="en-US" dirty="0"/>
               <a:pPr/>
-              <a:t>3/23/23</a:t>
+              <a:t>3/26/23</a:t>
             </a:fld>
             <a:endParaRPr lang="en-US" dirty="0"/>
           </a:p>
@@ -4170,7 +4171,7 @@
             <a:fld id="{B61BEF0D-F0BB-DE4B-95CE-6DB70DBA9567}" type="datetimeFigureOut">
               <a:rPr lang="en-US" dirty="0"/>
               <a:pPr/>
-              <a:t>3/23/23</a:t>
+              <a:t>3/26/23</a:t>
             </a:fld>
             <a:endParaRPr lang="en-US" dirty="0"/>
           </a:p>
@@ -4344,7 +4345,7 @@
             <a:fld id="{B61BEF0D-F0BB-DE4B-95CE-6DB70DBA9567}" type="datetimeFigureOut">
               <a:rPr lang="en-US" dirty="0"/>
               <a:pPr/>
-              <a:t>3/23/23</a:t>
+              <a:t>3/26/23</a:t>
             </a:fld>
             <a:endParaRPr lang="en-US" dirty="0"/>
           </a:p>
@@ -4674,7 +4675,7 @@
             <a:fld id="{B61BEF0D-F0BB-DE4B-95CE-6DB70DBA9567}" type="datetimeFigureOut">
               <a:rPr lang="en-US" dirty="0"/>
               <a:pPr/>
-              <a:t>3/23/23</a:t>
+              <a:t>3/26/23</a:t>
             </a:fld>
             <a:endParaRPr lang="en-US" dirty="0"/>
           </a:p>
@@ -5016,7 +5017,7 @@
             <a:fld id="{B61BEF0D-F0BB-DE4B-95CE-6DB70DBA9567}" type="datetimeFigureOut">
               <a:rPr lang="en-US" dirty="0"/>
               <a:pPr/>
-              <a:t>3/23/23</a:t>
+              <a:t>3/26/23</a:t>
             </a:fld>
             <a:endParaRPr lang="en-US" dirty="0"/>
           </a:p>
@@ -7130,7 +7131,7 @@
             <a:fld id="{B61BEF0D-F0BB-DE4B-95CE-6DB70DBA9567}" type="datetimeFigureOut">
               <a:rPr lang="en-US" dirty="0"/>
               <a:pPr/>
-              <a:t>3/23/23</a:t>
+              <a:t>3/26/23</a:t>
             </a:fld>
             <a:endParaRPr lang="en-US" dirty="0"/>
           </a:p>
@@ -9977,7 +9978,12 @@
             <p:ph idx="1"/>
           </p:nvPr>
         </p:nvSpPr>
-        <p:spPr/>
+        <p:spPr>
+          <a:xfrm>
+            <a:off x="2589212" y="1611966"/>
+            <a:ext cx="8915400" cy="3777622"/>
+          </a:xfrm>
+        </p:spPr>
         <p:txBody>
           <a:bodyPr/>
           <a:lstStyle/>
@@ -9992,24 +9998,297 @@
               <a:t>Neo4j</a:t>
             </a:r>
             <a:r>
-              <a:rPr kumimoji="1" lang="zh-CN" altLang="en-US" dirty="0">
+              <a:rPr lang="zh-CN" altLang="en-US" b="0" i="0" dirty="0">
                 <a:solidFill>
                   <a:srgbClr val="000000"/>
                 </a:solidFill>
+                <a:effectLst/>
                 <a:latin typeface="-apple-system"/>
               </a:rPr>
-              <a:t>中，每个节点都会维护与其邻接</a:t>
-            </a:r>
-            <a:r>
-              <a:rPr kumimoji="1" lang="zh-CN" altLang="en-US">
+              <a:t>直接在点和边中保存相应点</a:t>
+            </a:r>
+            <a:r>
+              <a:rPr lang="en-US" altLang="zh-CN" b="0" i="0" dirty="0">
                 <a:solidFill>
                   <a:srgbClr val="000000"/>
                 </a:solidFill>
+                <a:effectLst/>
                 <a:latin typeface="-apple-system"/>
               </a:rPr>
-              <a:t>节点的引用。</a:t>
-            </a:r>
+              <a:t>/</a:t>
+            </a:r>
+            <a:r>
+              <a:rPr lang="zh-CN" altLang="en-US" b="0" i="0" dirty="0">
+                <a:solidFill>
+                  <a:srgbClr val="000000"/>
+                </a:solidFill>
+                <a:effectLst/>
+                <a:latin typeface="-apple-system"/>
+              </a:rPr>
+              <a:t>边</a:t>
+            </a:r>
+            <a:r>
+              <a:rPr lang="en-US" altLang="zh-CN" b="0" i="0" dirty="0">
+                <a:solidFill>
+                  <a:srgbClr val="000000"/>
+                </a:solidFill>
+                <a:effectLst/>
+                <a:latin typeface="-apple-system"/>
+              </a:rPr>
+              <a:t>/</a:t>
+            </a:r>
+            <a:r>
+              <a:rPr lang="zh-CN" altLang="en-US" b="0" i="0" dirty="0">
+                <a:solidFill>
+                  <a:srgbClr val="000000"/>
+                </a:solidFill>
+                <a:effectLst/>
+                <a:latin typeface="-apple-system"/>
+              </a:rPr>
+              <a:t>属性的引用</a:t>
+            </a:r>
+            <a:r>
+              <a:rPr kumimoji="1" lang="zh-CN" altLang="en-US" b="0" i="0" dirty="0">
+                <a:solidFill>
+                  <a:srgbClr val="000000"/>
+                </a:solidFill>
+                <a:effectLst/>
+                <a:latin typeface="-apple-system"/>
+              </a:rPr>
+              <a:t>，因此每个节点都相当于与它相邻节点的微索引。</a:t>
+            </a:r>
+            <a:r>
+              <a:rPr lang="zh-CN" altLang="en-US" b="0" i="0" dirty="0">
+                <a:solidFill>
+                  <a:srgbClr val="000000"/>
+                </a:solidFill>
+                <a:effectLst/>
+                <a:latin typeface="-apple-system"/>
+              </a:rPr>
+              <a:t>免去了基于索引进行扫描查找的开销，查询的时间和图的整体规模无关，只与节点相邻节点的数量成正比。</a:t>
+            </a:r>
+            <a:endParaRPr lang="en-US" altLang="zh-CN" b="0" i="0" dirty="0">
+              <a:solidFill>
+                <a:srgbClr val="000000"/>
+              </a:solidFill>
+              <a:effectLst/>
+              <a:latin typeface="-apple-system"/>
+            </a:endParaRPr>
+          </a:p>
+          <a:p>
+            <a:r>
+              <a:rPr lang="zh-CN" altLang="en-US" b="0" i="0" dirty="0">
+                <a:solidFill>
+                  <a:srgbClr val="000000"/>
+                </a:solidFill>
+                <a:effectLst/>
+                <a:latin typeface="-apple-system"/>
+              </a:rPr>
+              <a:t>关系型数据库一般需要中间表来表示连接关系，关系的索引查询效率为</a:t>
+            </a:r>
+            <a:r>
+              <a:rPr lang="en-US" altLang="zh-CN" b="0" i="0" dirty="0">
+                <a:solidFill>
+                  <a:srgbClr val="000000"/>
+                </a:solidFill>
+                <a:effectLst/>
+                <a:latin typeface="-apple-system"/>
+              </a:rPr>
+              <a:t>O(log(n))</a:t>
+            </a:r>
+            <a:r>
+              <a:rPr lang="zh-CN" altLang="en-US" b="0" i="0" dirty="0">
+                <a:solidFill>
+                  <a:srgbClr val="000000"/>
+                </a:solidFill>
+                <a:effectLst/>
+                <a:latin typeface="-apple-system"/>
+              </a:rPr>
+              <a:t>。</a:t>
+            </a:r>
+            <a:br>
+              <a:rPr lang="en-US" altLang="zh-CN" dirty="0">
+                <a:solidFill>
+                  <a:srgbClr val="000000"/>
+                </a:solidFill>
+                <a:latin typeface="-apple-system"/>
+              </a:rPr>
+            </a:br>
+            <a:r>
+              <a:rPr lang="zh-CN" altLang="en-US" dirty="0">
+                <a:solidFill>
+                  <a:srgbClr val="000000"/>
+                </a:solidFill>
+                <a:latin typeface="-apple-system"/>
+              </a:rPr>
+              <a:t>而且反向查询会导致索引失效，需要维护一个反向索引。</a:t>
+            </a:r>
+            <a:br>
+              <a:rPr lang="en-US" altLang="zh-CN" b="0" i="0" dirty="0">
+                <a:solidFill>
+                  <a:srgbClr val="000000"/>
+                </a:solidFill>
+                <a:effectLst/>
+                <a:latin typeface="-apple-system"/>
+              </a:rPr>
+            </a:br>
+            <a:endParaRPr lang="en-US" altLang="zh-CN" b="0" i="0" dirty="0">
+              <a:solidFill>
+                <a:srgbClr val="000000"/>
+              </a:solidFill>
+              <a:effectLst/>
+              <a:latin typeface="-apple-system"/>
+            </a:endParaRPr>
+          </a:p>
+          <a:p>
+            <a:endParaRPr lang="en-US" altLang="zh-CN" b="0" i="0" dirty="0">
+              <a:solidFill>
+                <a:srgbClr val="000000"/>
+              </a:solidFill>
+              <a:effectLst/>
+              <a:latin typeface="-apple-system"/>
+            </a:endParaRPr>
+          </a:p>
+          <a:p>
             <a:endParaRPr kumimoji="1" lang="zh-CN" altLang="en-US" dirty="0"/>
+          </a:p>
+        </p:txBody>
+      </p:sp>
+      <p:pic>
+        <p:nvPicPr>
+          <p:cNvPr id="5" name="图片 4">
+            <a:extLst>
+              <a:ext uri="{FF2B5EF4-FFF2-40B4-BE49-F238E27FC236}">
+                <a16:creationId xmlns:a16="http://schemas.microsoft.com/office/drawing/2014/main" id="{F53C6EB7-5818-9A40-965E-45CF9473A6EC}"/>
+              </a:ext>
+            </a:extLst>
+          </p:cNvPr>
+          <p:cNvPicPr>
+            <a:picLocks noChangeAspect="1"/>
+          </p:cNvPicPr>
+          <p:nvPr/>
+        </p:nvPicPr>
+        <p:blipFill>
+          <a:blip r:embed="rId2"/>
+          <a:stretch>
+            <a:fillRect/>
+          </a:stretch>
+        </p:blipFill>
+        <p:spPr>
+          <a:xfrm>
+            <a:off x="3354386" y="3168017"/>
+            <a:ext cx="6184900" cy="1079500"/>
+          </a:xfrm>
+          <a:prstGeom prst="rect">
+            <a:avLst/>
+          </a:prstGeom>
+        </p:spPr>
+      </p:pic>
+      <p:sp>
+        <p:nvSpPr>
+          <p:cNvPr id="7" name="文本框 6">
+            <a:extLst>
+              <a:ext uri="{FF2B5EF4-FFF2-40B4-BE49-F238E27FC236}">
+                <a16:creationId xmlns:a16="http://schemas.microsoft.com/office/drawing/2014/main" id="{FFAFADEB-2ACD-BA4F-B8D8-63168562515E}"/>
+              </a:ext>
+            </a:extLst>
+          </p:cNvPr>
+          <p:cNvSpPr txBox="1"/>
+          <p:nvPr/>
+        </p:nvSpPr>
+        <p:spPr>
+          <a:xfrm>
+            <a:off x="5455218" y="4195272"/>
+            <a:ext cx="1869423" cy="369332"/>
+          </a:xfrm>
+          <a:prstGeom prst="rect">
+            <a:avLst/>
+          </a:prstGeom>
+          <a:noFill/>
+        </p:spPr>
+        <p:txBody>
+          <a:bodyPr wrap="square" rtlCol="0">
+            <a:spAutoFit/>
+          </a:bodyPr>
+          <a:lstStyle/>
+          <a:p>
+            <a:r>
+              <a:rPr kumimoji="1" lang="en-US" altLang="zh-CN" dirty="0"/>
+              <a:t>rdbms</a:t>
+            </a:r>
+            <a:r>
+              <a:rPr kumimoji="1" lang="zh-CN" altLang="en-US" dirty="0"/>
+              <a:t>关系查询</a:t>
+            </a:r>
+          </a:p>
+        </p:txBody>
+      </p:sp>
+      <p:pic>
+        <p:nvPicPr>
+          <p:cNvPr id="9" name="图片 8">
+            <a:extLst>
+              <a:ext uri="{FF2B5EF4-FFF2-40B4-BE49-F238E27FC236}">
+                <a16:creationId xmlns:a16="http://schemas.microsoft.com/office/drawing/2014/main" id="{CC2CEE59-9EC8-6C40-814B-21B7056D8FBB}"/>
+              </a:ext>
+            </a:extLst>
+          </p:cNvPr>
+          <p:cNvPicPr>
+            <a:picLocks noChangeAspect="1"/>
+          </p:cNvPicPr>
+          <p:nvPr/>
+        </p:nvPicPr>
+        <p:blipFill>
+          <a:blip r:embed="rId3"/>
+          <a:stretch>
+            <a:fillRect/>
+          </a:stretch>
+        </p:blipFill>
+        <p:spPr>
+          <a:xfrm>
+            <a:off x="3290888" y="4379938"/>
+            <a:ext cx="6311900" cy="2019300"/>
+          </a:xfrm>
+          <a:prstGeom prst="rect">
+            <a:avLst/>
+          </a:prstGeom>
+        </p:spPr>
+      </p:pic>
+      <p:sp>
+        <p:nvSpPr>
+          <p:cNvPr id="10" name="文本框 9">
+            <a:extLst>
+              <a:ext uri="{FF2B5EF4-FFF2-40B4-BE49-F238E27FC236}">
+                <a16:creationId xmlns:a16="http://schemas.microsoft.com/office/drawing/2014/main" id="{4E3E1911-4D0E-6748-BD28-F12B8C562BCA}"/>
+              </a:ext>
+            </a:extLst>
+          </p:cNvPr>
+          <p:cNvSpPr txBox="1"/>
+          <p:nvPr/>
+        </p:nvSpPr>
+        <p:spPr>
+          <a:xfrm>
+            <a:off x="5569032" y="6214572"/>
+            <a:ext cx="1755609" cy="369332"/>
+          </a:xfrm>
+          <a:prstGeom prst="rect">
+            <a:avLst/>
+          </a:prstGeom>
+          <a:noFill/>
+        </p:spPr>
+        <p:txBody>
+          <a:bodyPr wrap="square" rtlCol="0">
+            <a:spAutoFit/>
+          </a:bodyPr>
+          <a:lstStyle/>
+          <a:p>
+            <a:r>
+              <a:rPr kumimoji="1" lang="en-US" altLang="zh-CN" dirty="0"/>
+              <a:t>Neo4j</a:t>
+            </a:r>
+            <a:r>
+              <a:rPr kumimoji="1" lang="zh-CN" altLang="en-US" dirty="0"/>
+              <a:t>关系查询</a:t>
+            </a:r>
           </a:p>
         </p:txBody>
       </p:sp>
@@ -10072,6 +10351,14 @@
               <a:rPr kumimoji="1" lang="zh-CN" altLang="en-US" dirty="0"/>
               <a:t>底层存储结构</a:t>
             </a:r>
+            <a:r>
+              <a:rPr kumimoji="1" lang="en-US" altLang="zh-CN" dirty="0"/>
+              <a:t>-</a:t>
+            </a:r>
+            <a:r>
+              <a:rPr kumimoji="1" lang="zh-CN" altLang="en-US" dirty="0"/>
+              <a:t>节点</a:t>
+            </a:r>
           </a:p>
         </p:txBody>
       </p:sp>
@@ -10135,7 +10422,7 @@
           <p:cNvPr id="2" name="标题 1">
             <a:extLst>
               <a:ext uri="{FF2B5EF4-FFF2-40B4-BE49-F238E27FC236}">
-                <a16:creationId xmlns:a16="http://schemas.microsoft.com/office/drawing/2014/main" id="{BA97E35E-627E-EF40-8FB8-1FB6E1A64B63}"/>
+                <a16:creationId xmlns:a16="http://schemas.microsoft.com/office/drawing/2014/main" id="{64AA338F-5E28-8645-9FBA-8CE398797205}"/>
               </a:ext>
             </a:extLst>
           </p:cNvPr>
@@ -10157,8 +10444,17 @@
             </a:r>
             <a:r>
               <a:rPr kumimoji="1" lang="zh-CN" altLang="en-US" dirty="0"/>
-              <a:t>集群</a:t>
-            </a:r>
+              <a:t>底层存储结构</a:t>
+            </a:r>
+            <a:r>
+              <a:rPr kumimoji="1" lang="en-US" altLang="zh-CN" dirty="0"/>
+              <a:t>-</a:t>
+            </a:r>
+            <a:r>
+              <a:rPr kumimoji="1" lang="zh-CN" altLang="en-US"/>
+              <a:t>关系</a:t>
+            </a:r>
+            <a:endParaRPr kumimoji="1" lang="zh-CN" altLang="en-US" dirty="0"/>
           </a:p>
         </p:txBody>
       </p:sp>
@@ -10167,7 +10463,7 @@
           <p:cNvPr id="3" name="内容占位符 2">
             <a:extLst>
               <a:ext uri="{FF2B5EF4-FFF2-40B4-BE49-F238E27FC236}">
-                <a16:creationId xmlns:a16="http://schemas.microsoft.com/office/drawing/2014/main" id="{FDEB43B0-99BE-2942-94CE-82F7E461D492}"/>
+                <a16:creationId xmlns:a16="http://schemas.microsoft.com/office/drawing/2014/main" id="{17F8453D-02AA-AE44-B99D-70F1CBCE74C6}"/>
               </a:ext>
             </a:extLst>
           </p:cNvPr>
@@ -10183,6 +10479,70 @@
           <a:bodyPr/>
           <a:lstStyle/>
           <a:p>
+            <a:endParaRPr kumimoji="1" lang="zh-CN" altLang="en-US"/>
+          </a:p>
+        </p:txBody>
+      </p:sp>
+      <p:sp>
+        <p:nvSpPr>
+          <p:cNvPr id="4" name="文本框 3">
+            <a:extLst>
+              <a:ext uri="{FF2B5EF4-FFF2-40B4-BE49-F238E27FC236}">
+                <a16:creationId xmlns:a16="http://schemas.microsoft.com/office/drawing/2014/main" id="{0D742BA6-F83D-3444-92CC-A9AEF85AF303}"/>
+              </a:ext>
+            </a:extLst>
+          </p:cNvPr>
+          <p:cNvSpPr txBox="1"/>
+          <p:nvPr/>
+        </p:nvSpPr>
+        <p:spPr>
+          <a:xfrm>
+            <a:off x="8167955" y="791110"/>
+            <a:ext cx="184731" cy="369332"/>
+          </a:xfrm>
+          <a:prstGeom prst="rect">
+            <a:avLst/>
+          </a:prstGeom>
+          <a:noFill/>
+        </p:spPr>
+        <p:txBody>
+          <a:bodyPr wrap="none" rtlCol="0">
+            <a:spAutoFit/>
+          </a:bodyPr>
+          <a:lstStyle/>
+          <a:p>
+            <a:endParaRPr kumimoji="1" lang="zh-CN" altLang="en-US" dirty="0"/>
+          </a:p>
+        </p:txBody>
+      </p:sp>
+      <p:sp>
+        <p:nvSpPr>
+          <p:cNvPr id="5" name="文本框 4">
+            <a:extLst>
+              <a:ext uri="{FF2B5EF4-FFF2-40B4-BE49-F238E27FC236}">
+                <a16:creationId xmlns:a16="http://schemas.microsoft.com/office/drawing/2014/main" id="{7ECFAB99-1CCA-6844-9D6C-78E10E472ACE}"/>
+              </a:ext>
+            </a:extLst>
+          </p:cNvPr>
+          <p:cNvSpPr txBox="1"/>
+          <p:nvPr/>
+        </p:nvSpPr>
+        <p:spPr>
+          <a:xfrm>
+            <a:off x="7839182" y="811658"/>
+            <a:ext cx="184731" cy="369332"/>
+          </a:xfrm>
+          <a:prstGeom prst="rect">
+            <a:avLst/>
+          </a:prstGeom>
+          <a:noFill/>
+        </p:spPr>
+        <p:txBody>
+          <a:bodyPr wrap="none" rtlCol="0">
+            <a:spAutoFit/>
+          </a:bodyPr>
+          <a:lstStyle/>
+          <a:p>
             <a:endParaRPr kumimoji="1" lang="zh-CN" altLang="en-US" dirty="0"/>
           </a:p>
         </p:txBody>
@@ -10190,7 +10550,7 @@
     </p:spTree>
     <p:extLst>
       <p:ext uri="{BB962C8B-B14F-4D97-AF65-F5344CB8AC3E}">
-        <p14:creationId xmlns:p14="http://schemas.microsoft.com/office/powerpoint/2010/main" val="2155202387"/>
+        <p14:creationId xmlns:p14="http://schemas.microsoft.com/office/powerpoint/2010/main" val="4034561901"/>
       </p:ext>
     </p:extLst>
   </p:cSld>
@@ -10618,6 +10978,93 @@
           <p:cNvPr id="2" name="标题 1">
             <a:extLst>
               <a:ext uri="{FF2B5EF4-FFF2-40B4-BE49-F238E27FC236}">
+                <a16:creationId xmlns:a16="http://schemas.microsoft.com/office/drawing/2014/main" id="{BA97E35E-627E-EF40-8FB8-1FB6E1A64B63}"/>
+              </a:ext>
+            </a:extLst>
+          </p:cNvPr>
+          <p:cNvSpPr>
+            <a:spLocks noGrp="1"/>
+          </p:cNvSpPr>
+          <p:nvPr>
+            <p:ph type="title"/>
+          </p:nvPr>
+        </p:nvSpPr>
+        <p:spPr/>
+        <p:txBody>
+          <a:bodyPr/>
+          <a:lstStyle/>
+          <a:p>
+            <a:r>
+              <a:rPr kumimoji="1" lang="en-US" altLang="zh-CN" dirty="0"/>
+              <a:t>Neo4j</a:t>
+            </a:r>
+            <a:r>
+              <a:rPr kumimoji="1" lang="zh-CN" altLang="en-US" dirty="0"/>
+              <a:t>集群</a:t>
+            </a:r>
+          </a:p>
+        </p:txBody>
+      </p:sp>
+      <p:sp>
+        <p:nvSpPr>
+          <p:cNvPr id="3" name="内容占位符 2">
+            <a:extLst>
+              <a:ext uri="{FF2B5EF4-FFF2-40B4-BE49-F238E27FC236}">
+                <a16:creationId xmlns:a16="http://schemas.microsoft.com/office/drawing/2014/main" id="{FDEB43B0-99BE-2942-94CE-82F7E461D492}"/>
+              </a:ext>
+            </a:extLst>
+          </p:cNvPr>
+          <p:cNvSpPr>
+            <a:spLocks noGrp="1"/>
+          </p:cNvSpPr>
+          <p:nvPr>
+            <p:ph idx="1"/>
+          </p:nvPr>
+        </p:nvSpPr>
+        <p:spPr/>
+        <p:txBody>
+          <a:bodyPr/>
+          <a:lstStyle/>
+          <a:p>
+            <a:endParaRPr kumimoji="1" lang="zh-CN" altLang="en-US" dirty="0"/>
+          </a:p>
+        </p:txBody>
+      </p:sp>
+    </p:spTree>
+    <p:extLst>
+      <p:ext uri="{BB962C8B-B14F-4D97-AF65-F5344CB8AC3E}">
+        <p14:creationId xmlns:p14="http://schemas.microsoft.com/office/powerpoint/2010/main" val="2155202387"/>
+      </p:ext>
+    </p:extLst>
+  </p:cSld>
+  <p:clrMapOvr>
+    <a:masterClrMapping/>
+  </p:clrMapOvr>
+</p:sld>
+</file>
+
+<file path=ppt/slides/slide21.xml><?xml version="1.0" encoding="utf-8"?>
+<p:sld xmlns:a="http://schemas.openxmlformats.org/drawingml/2006/main" xmlns:r="http://schemas.openxmlformats.org/officeDocument/2006/relationships" xmlns:p="http://schemas.openxmlformats.org/presentationml/2006/main">
+  <p:cSld>
+    <p:spTree>
+      <p:nvGrpSpPr>
+        <p:cNvPr id="1" name=""/>
+        <p:cNvGrpSpPr/>
+        <p:nvPr/>
+      </p:nvGrpSpPr>
+      <p:grpSpPr>
+        <a:xfrm>
+          <a:off x="0" y="0"/>
+          <a:ext cx="0" cy="0"/>
+          <a:chOff x="0" y="0"/>
+          <a:chExt cx="0" cy="0"/>
+        </a:xfrm>
+      </p:grpSpPr>
+      <p:sp>
+        <p:nvSpPr>
+          <p:cNvPr id="2" name="标题 1">
+            <a:extLst>
+              <a:ext uri="{FF2B5EF4-FFF2-40B4-BE49-F238E27FC236}">
                 <a16:creationId xmlns:a16="http://schemas.microsoft.com/office/drawing/2014/main" id="{5ED9FB76-02BD-7D40-A6E0-3DE346D556DF}"/>
               </a:ext>
             </a:extLst>
@@ -10753,6 +11200,9 @@
             </a:endParaRPr>
           </a:p>
           <a:p>
+            <a:pPr marL="0" indent="0">
+              <a:buNone/>
+            </a:pPr>
             <a:br>
               <a:rPr lang="en-US" altLang="zh-CN" b="1" i="0" dirty="0">
                 <a:solidFill>

</xml_diff>

<commit_message>
文档 by qiyu 2023-03-27
</commit_message>
<xml_diff>
--- a/doc/Neo4j简介.pptx
+++ b/doc/Neo4j简介.pptx
@@ -322,7 +322,7 @@
             <a:fld id="{B61BEF0D-F0BB-DE4B-95CE-6DB70DBA9567}" type="datetimeFigureOut">
               <a:rPr lang="en-US" dirty="0"/>
               <a:pPr/>
-              <a:t>3/26/23</a:t>
+              <a:t>3/27/23</a:t>
             </a:fld>
             <a:endParaRPr lang="en-US" dirty="0"/>
           </a:p>
@@ -657,7 +657,7 @@
             <a:fld id="{B61BEF0D-F0BB-DE4B-95CE-6DB70DBA9567}" type="datetimeFigureOut">
               <a:rPr lang="en-US" dirty="0"/>
               <a:pPr/>
-              <a:t>3/26/23</a:t>
+              <a:t>3/27/23</a:t>
             </a:fld>
             <a:endParaRPr lang="en-US" dirty="0"/>
           </a:p>
@@ -1055,7 +1055,7 @@
             <a:fld id="{B61BEF0D-F0BB-DE4B-95CE-6DB70DBA9567}" type="datetimeFigureOut">
               <a:rPr lang="en-US" dirty="0"/>
               <a:pPr/>
-              <a:t>3/26/23</a:t>
+              <a:t>3/27/23</a:t>
             </a:fld>
             <a:endParaRPr lang="en-US" dirty="0"/>
           </a:p>
@@ -1388,7 +1388,7 @@
             <a:fld id="{B61BEF0D-F0BB-DE4B-95CE-6DB70DBA9567}" type="datetimeFigureOut">
               <a:rPr lang="en-US" dirty="0"/>
               <a:pPr/>
-              <a:t>3/26/23</a:t>
+              <a:t>3/27/23</a:t>
             </a:fld>
             <a:endParaRPr lang="en-US" dirty="0"/>
           </a:p>
@@ -1705,7 +1705,7 @@
             <a:fld id="{B61BEF0D-F0BB-DE4B-95CE-6DB70DBA9567}" type="datetimeFigureOut">
               <a:rPr lang="en-US" dirty="0"/>
               <a:pPr/>
-              <a:t>3/26/23</a:t>
+              <a:t>3/27/23</a:t>
             </a:fld>
             <a:endParaRPr lang="en-US" dirty="0"/>
           </a:p>
@@ -2098,7 +2098,7 @@
             <a:fld id="{B61BEF0D-F0BB-DE4B-95CE-6DB70DBA9567}" type="datetimeFigureOut">
               <a:rPr lang="en-US" dirty="0"/>
               <a:pPr/>
-              <a:t>3/26/23</a:t>
+              <a:t>3/27/23</a:t>
             </a:fld>
             <a:endParaRPr lang="en-US" dirty="0"/>
           </a:p>
@@ -2352,7 +2352,7 @@
             <a:fld id="{B61BEF0D-F0BB-DE4B-95CE-6DB70DBA9567}" type="datetimeFigureOut">
               <a:rPr lang="en-US" dirty="0"/>
               <a:pPr/>
-              <a:t>3/26/23</a:t>
+              <a:t>3/27/23</a:t>
             </a:fld>
             <a:endParaRPr lang="en-US" dirty="0"/>
           </a:p>
@@ -2611,7 +2611,7 @@
             <a:fld id="{B61BEF0D-F0BB-DE4B-95CE-6DB70DBA9567}" type="datetimeFigureOut">
               <a:rPr lang="en-US" dirty="0"/>
               <a:pPr/>
-              <a:t>3/26/23</a:t>
+              <a:t>3/27/23</a:t>
             </a:fld>
             <a:endParaRPr lang="en-US" dirty="0"/>
           </a:p>
@@ -2870,7 +2870,7 @@
             <a:fld id="{B61BEF0D-F0BB-DE4B-95CE-6DB70DBA9567}" type="datetimeFigureOut">
               <a:rPr lang="en-US" dirty="0"/>
               <a:pPr/>
-              <a:t>3/26/23</a:t>
+              <a:t>3/27/23</a:t>
             </a:fld>
             <a:endParaRPr lang="en-US" dirty="0"/>
           </a:p>
@@ -3196,7 +3196,7 @@
             <a:fld id="{B61BEF0D-F0BB-DE4B-95CE-6DB70DBA9567}" type="datetimeFigureOut">
               <a:rPr lang="en-US" dirty="0"/>
               <a:pPr/>
-              <a:t>3/26/23</a:t>
+              <a:t>3/27/23</a:t>
             </a:fld>
             <a:endParaRPr lang="en-US" dirty="0"/>
           </a:p>
@@ -3516,7 +3516,7 @@
             <a:fld id="{B61BEF0D-F0BB-DE4B-95CE-6DB70DBA9567}" type="datetimeFigureOut">
               <a:rPr lang="en-US" dirty="0"/>
               <a:pPr/>
-              <a:t>3/26/23</a:t>
+              <a:t>3/27/23</a:t>
             </a:fld>
             <a:endParaRPr lang="en-US" dirty="0"/>
           </a:p>
@@ -3970,7 +3970,7 @@
             <a:fld id="{B61BEF0D-F0BB-DE4B-95CE-6DB70DBA9567}" type="datetimeFigureOut">
               <a:rPr lang="en-US" dirty="0"/>
               <a:pPr/>
-              <a:t>3/26/23</a:t>
+              <a:t>3/27/23</a:t>
             </a:fld>
             <a:endParaRPr lang="en-US" dirty="0"/>
           </a:p>
@@ -4172,7 +4172,7 @@
             <a:fld id="{B61BEF0D-F0BB-DE4B-95CE-6DB70DBA9567}" type="datetimeFigureOut">
               <a:rPr lang="en-US" dirty="0"/>
               <a:pPr/>
-              <a:t>3/26/23</a:t>
+              <a:t>3/27/23</a:t>
             </a:fld>
             <a:endParaRPr lang="en-US" dirty="0"/>
           </a:p>
@@ -4346,7 +4346,7 @@
             <a:fld id="{B61BEF0D-F0BB-DE4B-95CE-6DB70DBA9567}" type="datetimeFigureOut">
               <a:rPr lang="en-US" dirty="0"/>
               <a:pPr/>
-              <a:t>3/26/23</a:t>
+              <a:t>3/27/23</a:t>
             </a:fld>
             <a:endParaRPr lang="en-US" dirty="0"/>
           </a:p>
@@ -4676,7 +4676,7 @@
             <a:fld id="{B61BEF0D-F0BB-DE4B-95CE-6DB70DBA9567}" type="datetimeFigureOut">
               <a:rPr lang="en-US" dirty="0"/>
               <a:pPr/>
-              <a:t>3/26/23</a:t>
+              <a:t>3/27/23</a:t>
             </a:fld>
             <a:endParaRPr lang="en-US" dirty="0"/>
           </a:p>
@@ -5018,7 +5018,7 @@
             <a:fld id="{B61BEF0D-F0BB-DE4B-95CE-6DB70DBA9567}" type="datetimeFigureOut">
               <a:rPr lang="en-US" dirty="0"/>
               <a:pPr/>
-              <a:t>3/26/23</a:t>
+              <a:t>3/27/23</a:t>
             </a:fld>
             <a:endParaRPr lang="en-US" dirty="0"/>
           </a:p>
@@ -7132,7 +7132,7 @@
             <a:fld id="{B61BEF0D-F0BB-DE4B-95CE-6DB70DBA9567}" type="datetimeFigureOut">
               <a:rPr lang="en-US" dirty="0"/>
               <a:pPr/>
-              <a:t>3/26/23</a:t>
+              <a:t>3/27/23</a:t>
             </a:fld>
             <a:endParaRPr lang="en-US" dirty="0"/>
           </a:p>
@@ -8939,7 +8939,7 @@
         <p:spPr/>
         <p:txBody>
           <a:bodyPr>
-            <a:normAutofit lnSpcReduction="10000"/>
+            <a:normAutofit fontScale="92500"/>
           </a:bodyPr>
           <a:lstStyle/>
           <a:p>
@@ -10376,15 +10376,17 @@
           <a:bodyPr/>
           <a:lstStyle/>
           <a:p>
+            <a:pPr algn="l"/>
             <a:r>
               <a:rPr lang="en" altLang="zh-CN" b="0" i="0" dirty="0">
                 <a:solidFill>
                   <a:srgbClr val="000000"/>
                 </a:solidFill>
                 <a:effectLst/>
-                <a:latin typeface="-apple-system"/>
-              </a:rPr>
-              <a:t>neo4j</a:t>
+                <a:latin typeface="PingFang SC" panose="020B0400000000000000" pitchFamily="34" charset="-122"/>
+                <a:ea typeface="PingFang SC" panose="020B0400000000000000" pitchFamily="34" charset="-122"/>
+              </a:rPr>
+              <a:t>neo4j </a:t>
             </a:r>
             <a:r>
               <a:rPr lang="zh-CN" altLang="en-US" b="0" i="0" dirty="0">
@@ -10392,9 +10394,10 @@
                   <a:srgbClr val="000000"/>
                 </a:solidFill>
                 <a:effectLst/>
-                <a:latin typeface="-apple-system"/>
-              </a:rPr>
-              <a:t>的点、关系和属性分别保存在</a:t>
+                <a:latin typeface="PingFang SC" panose="020B0400000000000000" pitchFamily="34" charset="-122"/>
+                <a:ea typeface="PingFang SC" panose="020B0400000000000000" pitchFamily="34" charset="-122"/>
+              </a:rPr>
+              <a:t>在磁盘上会分不同的 </a:t>
             </a:r>
             <a:r>
               <a:rPr lang="en" altLang="zh-CN" b="0" i="0" dirty="0">
@@ -10402,7 +10405,36 @@
                   <a:srgbClr val="000000"/>
                 </a:solidFill>
                 <a:effectLst/>
-                <a:latin typeface="-apple-system"/>
+                <a:latin typeface="PingFang SC" panose="020B0400000000000000" pitchFamily="34" charset="-122"/>
+                <a:ea typeface="PingFang SC" panose="020B0400000000000000" pitchFamily="34" charset="-122"/>
+              </a:rPr>
+              <a:t>store file </a:t>
+            </a:r>
+            <a:r>
+              <a:rPr lang="zh-CN" altLang="en-US" b="0" i="0" dirty="0">
+                <a:solidFill>
+                  <a:srgbClr val="000000"/>
+                </a:solidFill>
+                <a:effectLst/>
+                <a:latin typeface="PingFang SC" panose="020B0400000000000000" pitchFamily="34" charset="-122"/>
+                <a:ea typeface="PingFang SC" panose="020B0400000000000000" pitchFamily="34" charset="-122"/>
+              </a:rPr>
+              <a:t>存储</a:t>
+            </a:r>
+          </a:p>
+          <a:p>
+            <a:pPr algn="l">
+              <a:buFont typeface="Arial" panose="020B0604020202020204" pitchFamily="34" charset="0"/>
+              <a:buChar char="•"/>
+            </a:pPr>
+            <a:r>
+              <a:rPr lang="en" altLang="zh-CN" b="0" i="0" dirty="0">
+                <a:solidFill>
+                  <a:srgbClr val="000000"/>
+                </a:solidFill>
+                <a:effectLst/>
+                <a:latin typeface="PingFang SC" panose="020B0400000000000000" pitchFamily="34" charset="-122"/>
+                <a:ea typeface="PingFang SC" panose="020B0400000000000000" pitchFamily="34" charset="-122"/>
               </a:rPr>
               <a:t>neostore.nodestore.db</a:t>
             </a:r>
@@ -10412,9 +10444,21 @@
                   <a:srgbClr val="000000"/>
                 </a:solidFill>
                 <a:effectLst/>
-                <a:latin typeface="-apple-system"/>
-              </a:rPr>
-              <a:t>、</a:t>
+                <a:latin typeface="PingFang SC" panose="020B0400000000000000" pitchFamily="34" charset="-122"/>
+                <a:ea typeface="PingFang SC" panose="020B0400000000000000" pitchFamily="34" charset="-122"/>
+              </a:rPr>
+              <a:t>：</a:t>
+            </a:r>
+            <a:r>
+              <a:rPr lang="zh-CN" altLang="en-US" b="0" i="0" dirty="0">
+                <a:solidFill>
+                  <a:srgbClr val="000000"/>
+                </a:solidFill>
+                <a:effectLst/>
+                <a:latin typeface="PingFang SC" panose="020B0400000000000000" pitchFamily="34" charset="-122"/>
+                <a:ea typeface="PingFang SC" panose="020B0400000000000000" pitchFamily="34" charset="-122"/>
+              </a:rPr>
+              <a:t>存储 </a:t>
             </a:r>
             <a:r>
               <a:rPr lang="en" altLang="zh-CN" b="0" i="0" dirty="0">
@@ -10422,29 +10466,136 @@
                   <a:srgbClr val="000000"/>
                 </a:solidFill>
                 <a:effectLst/>
-                <a:latin typeface="-apple-system"/>
+                <a:latin typeface="PingFang SC" panose="020B0400000000000000" pitchFamily="34" charset="-122"/>
+                <a:ea typeface="PingFang SC" panose="020B0400000000000000" pitchFamily="34" charset="-122"/>
+              </a:rPr>
+              <a:t>node</a:t>
+            </a:r>
+          </a:p>
+          <a:p>
+            <a:pPr algn="l">
+              <a:buFont typeface="Arial" panose="020B0604020202020204" pitchFamily="34" charset="0"/>
+              <a:buChar char="•"/>
+            </a:pPr>
+            <a:r>
+              <a:rPr lang="en" altLang="zh-CN" b="0" i="0" dirty="0">
+                <a:solidFill>
+                  <a:srgbClr val="000000"/>
+                </a:solidFill>
+                <a:effectLst/>
+                <a:latin typeface="PingFang SC" panose="020B0400000000000000" pitchFamily="34" charset="-122"/>
+                <a:ea typeface="PingFang SC" panose="020B0400000000000000" pitchFamily="34" charset="-122"/>
+              </a:rPr>
+              <a:t>neostore.propertystore.db</a:t>
+            </a:r>
+            <a:r>
+              <a:rPr lang="zh-CN" altLang="en" b="0" i="0" dirty="0">
+                <a:solidFill>
+                  <a:srgbClr val="000000"/>
+                </a:solidFill>
+                <a:effectLst/>
+                <a:latin typeface="PingFang SC" panose="020B0400000000000000" pitchFamily="34" charset="-122"/>
+                <a:ea typeface="PingFang SC" panose="020B0400000000000000" pitchFamily="34" charset="-122"/>
+              </a:rPr>
+              <a:t>：</a:t>
+            </a:r>
+            <a:r>
+              <a:rPr lang="zh-CN" altLang="en-US" b="0" i="0" dirty="0">
+                <a:solidFill>
+                  <a:srgbClr val="000000"/>
+                </a:solidFill>
+                <a:effectLst/>
+                <a:latin typeface="PingFang SC" panose="020B0400000000000000" pitchFamily="34" charset="-122"/>
+                <a:ea typeface="PingFang SC" panose="020B0400000000000000" pitchFamily="34" charset="-122"/>
+              </a:rPr>
+              <a:t>存储属性</a:t>
+            </a:r>
+          </a:p>
+          <a:p>
+            <a:pPr algn="l">
+              <a:buFont typeface="Arial" panose="020B0604020202020204" pitchFamily="34" charset="0"/>
+              <a:buChar char="•"/>
+            </a:pPr>
+            <a:r>
+              <a:rPr lang="en" altLang="zh-CN" b="0" i="0" dirty="0">
+                <a:solidFill>
+                  <a:srgbClr val="000000"/>
+                </a:solidFill>
+                <a:effectLst/>
+                <a:latin typeface="PingFang SC" panose="020B0400000000000000" pitchFamily="34" charset="-122"/>
+                <a:ea typeface="PingFang SC" panose="020B0400000000000000" pitchFamily="34" charset="-122"/>
               </a:rPr>
               <a:t>neostore.relationshipstore.db</a:t>
             </a:r>
             <a:r>
+              <a:rPr lang="zh-CN" altLang="en" b="0" i="0" dirty="0">
+                <a:solidFill>
+                  <a:srgbClr val="000000"/>
+                </a:solidFill>
+                <a:effectLst/>
+                <a:latin typeface="PingFang SC" panose="020B0400000000000000" pitchFamily="34" charset="-122"/>
+                <a:ea typeface="PingFang SC" panose="020B0400000000000000" pitchFamily="34" charset="-122"/>
+              </a:rPr>
+              <a:t>：</a:t>
+            </a:r>
+            <a:r>
               <a:rPr lang="zh-CN" altLang="en-US" b="0" i="0" dirty="0">
                 <a:solidFill>
                   <a:srgbClr val="000000"/>
                 </a:solidFill>
                 <a:effectLst/>
-                <a:latin typeface="-apple-system"/>
-              </a:rPr>
-              <a:t>和</a:t>
-            </a:r>
+                <a:latin typeface="PingFang SC" panose="020B0400000000000000" pitchFamily="34" charset="-122"/>
+                <a:ea typeface="PingFang SC" panose="020B0400000000000000" pitchFamily="34" charset="-122"/>
+              </a:rPr>
+              <a:t>存储关系</a:t>
+            </a:r>
+          </a:p>
+          <a:p>
             <a:r>
               <a:rPr lang="en" altLang="zh-CN" b="0" i="0" dirty="0">
                 <a:solidFill>
                   <a:srgbClr val="000000"/>
                 </a:solidFill>
                 <a:effectLst/>
-                <a:latin typeface="-apple-system"/>
-              </a:rPr>
-              <a:t>neostore.propertystore.db</a:t>
+                <a:latin typeface="PingFang SC" panose="020B0400000000000000" pitchFamily="34" charset="-122"/>
+                <a:ea typeface="PingFang SC" panose="020B0400000000000000" pitchFamily="34" charset="-122"/>
+              </a:rPr>
+              <a:t>neostore.xxx</a:t>
+            </a:r>
+            <a:r>
+              <a:rPr lang="en" altLang="zh-CN" dirty="0">
+                <a:solidFill>
+                  <a:srgbClr val="000000"/>
+                </a:solidFill>
+                <a:latin typeface="PingFang SC" panose="020B0400000000000000" pitchFamily="34" charset="-122"/>
+                <a:ea typeface="PingFang SC" panose="020B0400000000000000" pitchFamily="34" charset="-122"/>
+              </a:rPr>
+              <a:t>.db</a:t>
+            </a:r>
+            <a:r>
+              <a:rPr lang="en-US" altLang="zh-CN" dirty="0">
+                <a:solidFill>
+                  <a:srgbClr val="000000"/>
+                </a:solidFill>
+                <a:latin typeface="PingFang SC" panose="020B0400000000000000" pitchFamily="34" charset="-122"/>
+                <a:ea typeface="PingFang SC" panose="020B0400000000000000" pitchFamily="34" charset="-122"/>
+              </a:rPr>
+              <a:t>.id</a:t>
+            </a:r>
+            <a:r>
+              <a:rPr lang="zh-CN" altLang="en" b="0" i="0" dirty="0">
+                <a:solidFill>
+                  <a:srgbClr val="000000"/>
+                </a:solidFill>
+                <a:effectLst/>
+                <a:latin typeface="PingFang SC" panose="020B0400000000000000" pitchFamily="34" charset="-122"/>
+                <a:ea typeface="PingFang SC" panose="020B0400000000000000" pitchFamily="34" charset="-122"/>
+              </a:rPr>
+              <a:t>：</a:t>
+            </a:r>
+            <a:r>
+              <a:rPr kumimoji="1" lang="zh-CN" altLang="en-US" dirty="0"/>
+              <a:t>存储</a:t>
             </a:r>
             <a:r>
               <a:rPr lang="zh-CN" altLang="en-US" b="0" i="0" dirty="0">
@@ -10452,20 +10603,67 @@
                   <a:srgbClr val="000000"/>
                 </a:solidFill>
                 <a:effectLst/>
-                <a:latin typeface="-apple-system"/>
-              </a:rPr>
-              <a:t>文件中</a:t>
-            </a:r>
-            <a:endParaRPr lang="en-US" altLang="zh-CN" b="0" i="0">
-              <a:solidFill>
-                <a:srgbClr val="000000"/>
-              </a:solidFill>
-              <a:effectLst/>
-              <a:latin typeface="-apple-system"/>
-            </a:endParaRPr>
-          </a:p>
-          <a:p>
-            <a:endParaRPr kumimoji="1" lang="zh-CN" altLang="en-US"/>
+                <a:latin typeface="PingFang SC" panose="020B0400000000000000" pitchFamily="34" charset="-122"/>
+                <a:ea typeface="PingFang SC" panose="020B0400000000000000" pitchFamily="34" charset="-122"/>
+              </a:rPr>
+              <a:t>最大的</a:t>
+            </a:r>
+            <a:r>
+              <a:rPr lang="en" altLang="zh-CN" b="0" i="0" dirty="0">
+                <a:solidFill>
+                  <a:srgbClr val="000000"/>
+                </a:solidFill>
+                <a:effectLst/>
+                <a:latin typeface="PingFang SC" panose="020B0400000000000000" pitchFamily="34" charset="-122"/>
+                <a:ea typeface="PingFang SC" panose="020B0400000000000000" pitchFamily="34" charset="-122"/>
+              </a:rPr>
+              <a:t>ID </a:t>
+            </a:r>
+            <a:r>
+              <a:rPr lang="zh-CN" altLang="en-US" b="0" i="0" dirty="0">
+                <a:solidFill>
+                  <a:srgbClr val="000000"/>
+                </a:solidFill>
+                <a:effectLst/>
+                <a:latin typeface="PingFang SC" panose="020B0400000000000000" pitchFamily="34" charset="-122"/>
+                <a:ea typeface="PingFang SC" panose="020B0400000000000000" pitchFamily="34" charset="-122"/>
+              </a:rPr>
+              <a:t>及已经</a:t>
+            </a:r>
+            <a:r>
+              <a:rPr lang="en" altLang="zh-CN" b="0" i="0" dirty="0">
+                <a:solidFill>
+                  <a:srgbClr val="000000"/>
+                </a:solidFill>
+                <a:effectLst/>
+                <a:latin typeface="PingFang SC" panose="020B0400000000000000" pitchFamily="34" charset="-122"/>
+                <a:ea typeface="PingFang SC" panose="020B0400000000000000" pitchFamily="34" charset="-122"/>
+              </a:rPr>
+              <a:t>free</a:t>
+            </a:r>
+            <a:r>
+              <a:rPr lang="zh-CN" altLang="en-US" b="0" i="0" dirty="0">
+                <a:solidFill>
+                  <a:srgbClr val="000000"/>
+                </a:solidFill>
+                <a:effectLst/>
+                <a:latin typeface="PingFang SC" panose="020B0400000000000000" pitchFamily="34" charset="-122"/>
+                <a:ea typeface="PingFang SC" panose="020B0400000000000000" pitchFamily="34" charset="-122"/>
+              </a:rPr>
+              <a:t>的</a:t>
+            </a:r>
+            <a:r>
+              <a:rPr lang="en" altLang="zh-CN" b="0" i="0" dirty="0">
+                <a:solidFill>
+                  <a:srgbClr val="000000"/>
+                </a:solidFill>
+                <a:effectLst/>
+                <a:latin typeface="PingFang SC" panose="020B0400000000000000" pitchFamily="34" charset="-122"/>
+                <a:ea typeface="PingFang SC" panose="020B0400000000000000" pitchFamily="34" charset="-122"/>
+              </a:rPr>
+              <a:t>ID</a:t>
+            </a:r>
+            <a:endParaRPr kumimoji="1" lang="zh-CN" altLang="en-US" dirty="0"/>
           </a:p>
         </p:txBody>
       </p:sp>
@@ -10539,31 +10737,55 @@
           </a:p>
         </p:txBody>
       </p:sp>
-      <p:sp>
-        <p:nvSpPr>
-          <p:cNvPr id="3" name="内容占位符 2">
+      <p:pic>
+        <p:nvPicPr>
+          <p:cNvPr id="1036" name="Picture 12">
             <a:extLst>
               <a:ext uri="{FF2B5EF4-FFF2-40B4-BE49-F238E27FC236}">
-                <a16:creationId xmlns:a16="http://schemas.microsoft.com/office/drawing/2014/main" id="{17F8453D-02AA-AE44-B99D-70F1CBCE74C6}"/>
+                <a16:creationId xmlns:a16="http://schemas.microsoft.com/office/drawing/2014/main" id="{EE667846-15B8-264D-94D3-2D9B419A339A}"/>
               </a:ext>
             </a:extLst>
           </p:cNvPr>
-          <p:cNvSpPr>
-            <a:spLocks noGrp="1"/>
-          </p:cNvSpPr>
+          <p:cNvPicPr>
+            <a:picLocks noGrp="1" noChangeAspect="1" noChangeArrowheads="1"/>
+          </p:cNvPicPr>
           <p:nvPr>
             <p:ph idx="1"/>
           </p:nvPr>
-        </p:nvSpPr>
-        <p:spPr/>
-        <p:txBody>
-          <a:bodyPr/>
-          <a:lstStyle/>
-          <a:p>
-            <a:endParaRPr kumimoji="1" lang="zh-CN" altLang="en-US" dirty="0"/>
-          </a:p>
-        </p:txBody>
-      </p:sp>
+        </p:nvPicPr>
+        <p:blipFill>
+          <a:blip r:embed="rId2">
+            <a:extLst>
+              <a:ext uri="{28A0092B-C50C-407E-A947-70E740481C1C}">
+                <a14:useLocalDpi xmlns:a14="http://schemas.microsoft.com/office/drawing/2010/main" val="0"/>
+              </a:ext>
+            </a:extLst>
+          </a:blip>
+          <a:srcRect/>
+          <a:stretch>
+            <a:fillRect/>
+          </a:stretch>
+        </p:blipFill>
+        <p:spPr bwMode="auto">
+          <a:xfrm>
+            <a:off x="2592925" y="2700853"/>
+            <a:ext cx="8915400" cy="3533037"/>
+          </a:xfrm>
+          <a:prstGeom prst="rect">
+            <a:avLst/>
+          </a:prstGeom>
+          <a:noFill/>
+          <a:extLst>
+            <a:ext uri="{909E8E84-426E-40DD-AFC4-6F175D3DCCD1}">
+              <a14:hiddenFill xmlns:a14="http://schemas.microsoft.com/office/drawing/2010/main">
+                <a:solidFill>
+                  <a:srgbClr val="FFFFFF"/>
+                </a:solidFill>
+              </a14:hiddenFill>
+            </a:ext>
+          </a:extLst>
+        </p:spPr>
+      </p:pic>
     </p:spTree>
     <p:extLst>
       <p:ext uri="{BB962C8B-B14F-4D97-AF65-F5344CB8AC3E}">

</xml_diff>

<commit_message>
文档 by qiyu 2023-03-31
</commit_message>
<xml_diff>
--- a/doc/Neo4j简介.pptx
+++ b/doc/Neo4j简介.pptx
@@ -23,10 +23,11 @@
     <p:sldId id="274" r:id="rId17"/>
     <p:sldId id="268" r:id="rId18"/>
     <p:sldId id="277" r:id="rId19"/>
-    <p:sldId id="267" r:id="rId20"/>
-    <p:sldId id="276" r:id="rId21"/>
-    <p:sldId id="266" r:id="rId22"/>
-    <p:sldId id="275" r:id="rId23"/>
+    <p:sldId id="279" r:id="rId20"/>
+    <p:sldId id="278" r:id="rId21"/>
+    <p:sldId id="276" r:id="rId22"/>
+    <p:sldId id="266" r:id="rId23"/>
+    <p:sldId id="275" r:id="rId24"/>
   </p:sldIdLst>
   <p:sldSz cx="12192000" cy="6858000"/>
   <p:notesSz cx="6858000" cy="9144000"/>
@@ -322,7 +323,7 @@
             <a:fld id="{B61BEF0D-F0BB-DE4B-95CE-6DB70DBA9567}" type="datetimeFigureOut">
               <a:rPr lang="en-US" dirty="0"/>
               <a:pPr/>
-              <a:t>3/30/23</a:t>
+              <a:t>3/31/23</a:t>
             </a:fld>
             <a:endParaRPr lang="en-US" dirty="0"/>
           </a:p>
@@ -657,7 +658,7 @@
             <a:fld id="{B61BEF0D-F0BB-DE4B-95CE-6DB70DBA9567}" type="datetimeFigureOut">
               <a:rPr lang="en-US" dirty="0"/>
               <a:pPr/>
-              <a:t>3/30/23</a:t>
+              <a:t>3/31/23</a:t>
             </a:fld>
             <a:endParaRPr lang="en-US" dirty="0"/>
           </a:p>
@@ -1055,7 +1056,7 @@
             <a:fld id="{B61BEF0D-F0BB-DE4B-95CE-6DB70DBA9567}" type="datetimeFigureOut">
               <a:rPr lang="en-US" dirty="0"/>
               <a:pPr/>
-              <a:t>3/30/23</a:t>
+              <a:t>3/31/23</a:t>
             </a:fld>
             <a:endParaRPr lang="en-US" dirty="0"/>
           </a:p>
@@ -1388,7 +1389,7 @@
             <a:fld id="{B61BEF0D-F0BB-DE4B-95CE-6DB70DBA9567}" type="datetimeFigureOut">
               <a:rPr lang="en-US" dirty="0"/>
               <a:pPr/>
-              <a:t>3/30/23</a:t>
+              <a:t>3/31/23</a:t>
             </a:fld>
             <a:endParaRPr lang="en-US" dirty="0"/>
           </a:p>
@@ -1705,7 +1706,7 @@
             <a:fld id="{B61BEF0D-F0BB-DE4B-95CE-6DB70DBA9567}" type="datetimeFigureOut">
               <a:rPr lang="en-US" dirty="0"/>
               <a:pPr/>
-              <a:t>3/30/23</a:t>
+              <a:t>3/31/23</a:t>
             </a:fld>
             <a:endParaRPr lang="en-US" dirty="0"/>
           </a:p>
@@ -2098,7 +2099,7 @@
             <a:fld id="{B61BEF0D-F0BB-DE4B-95CE-6DB70DBA9567}" type="datetimeFigureOut">
               <a:rPr lang="en-US" dirty="0"/>
               <a:pPr/>
-              <a:t>3/30/23</a:t>
+              <a:t>3/31/23</a:t>
             </a:fld>
             <a:endParaRPr lang="en-US" dirty="0"/>
           </a:p>
@@ -2352,7 +2353,7 @@
             <a:fld id="{B61BEF0D-F0BB-DE4B-95CE-6DB70DBA9567}" type="datetimeFigureOut">
               <a:rPr lang="en-US" dirty="0"/>
               <a:pPr/>
-              <a:t>3/30/23</a:t>
+              <a:t>3/31/23</a:t>
             </a:fld>
             <a:endParaRPr lang="en-US" dirty="0"/>
           </a:p>
@@ -2611,7 +2612,7 @@
             <a:fld id="{B61BEF0D-F0BB-DE4B-95CE-6DB70DBA9567}" type="datetimeFigureOut">
               <a:rPr lang="en-US" dirty="0"/>
               <a:pPr/>
-              <a:t>3/30/23</a:t>
+              <a:t>3/31/23</a:t>
             </a:fld>
             <a:endParaRPr lang="en-US" dirty="0"/>
           </a:p>
@@ -2870,7 +2871,7 @@
             <a:fld id="{B61BEF0D-F0BB-DE4B-95CE-6DB70DBA9567}" type="datetimeFigureOut">
               <a:rPr lang="en-US" dirty="0"/>
               <a:pPr/>
-              <a:t>3/30/23</a:t>
+              <a:t>3/31/23</a:t>
             </a:fld>
             <a:endParaRPr lang="en-US" dirty="0"/>
           </a:p>
@@ -3196,7 +3197,7 @@
             <a:fld id="{B61BEF0D-F0BB-DE4B-95CE-6DB70DBA9567}" type="datetimeFigureOut">
               <a:rPr lang="en-US" dirty="0"/>
               <a:pPr/>
-              <a:t>3/30/23</a:t>
+              <a:t>3/31/23</a:t>
             </a:fld>
             <a:endParaRPr lang="en-US" dirty="0"/>
           </a:p>
@@ -3516,7 +3517,7 @@
             <a:fld id="{B61BEF0D-F0BB-DE4B-95CE-6DB70DBA9567}" type="datetimeFigureOut">
               <a:rPr lang="en-US" dirty="0"/>
               <a:pPr/>
-              <a:t>3/30/23</a:t>
+              <a:t>3/31/23</a:t>
             </a:fld>
             <a:endParaRPr lang="en-US" dirty="0"/>
           </a:p>
@@ -3970,7 +3971,7 @@
             <a:fld id="{B61BEF0D-F0BB-DE4B-95CE-6DB70DBA9567}" type="datetimeFigureOut">
               <a:rPr lang="en-US" dirty="0"/>
               <a:pPr/>
-              <a:t>3/30/23</a:t>
+              <a:t>3/31/23</a:t>
             </a:fld>
             <a:endParaRPr lang="en-US" dirty="0"/>
           </a:p>
@@ -4172,7 +4173,7 @@
             <a:fld id="{B61BEF0D-F0BB-DE4B-95CE-6DB70DBA9567}" type="datetimeFigureOut">
               <a:rPr lang="en-US" dirty="0"/>
               <a:pPr/>
-              <a:t>3/30/23</a:t>
+              <a:t>3/31/23</a:t>
             </a:fld>
             <a:endParaRPr lang="en-US" dirty="0"/>
           </a:p>
@@ -4346,7 +4347,7 @@
             <a:fld id="{B61BEF0D-F0BB-DE4B-95CE-6DB70DBA9567}" type="datetimeFigureOut">
               <a:rPr lang="en-US" dirty="0"/>
               <a:pPr/>
-              <a:t>3/30/23</a:t>
+              <a:t>3/31/23</a:t>
             </a:fld>
             <a:endParaRPr lang="en-US" dirty="0"/>
           </a:p>
@@ -4676,7 +4677,7 @@
             <a:fld id="{B61BEF0D-F0BB-DE4B-95CE-6DB70DBA9567}" type="datetimeFigureOut">
               <a:rPr lang="en-US" dirty="0"/>
               <a:pPr/>
-              <a:t>3/30/23</a:t>
+              <a:t>3/31/23</a:t>
             </a:fld>
             <a:endParaRPr lang="en-US" dirty="0"/>
           </a:p>
@@ -5018,7 +5019,7 @@
             <a:fld id="{B61BEF0D-F0BB-DE4B-95CE-6DB70DBA9567}" type="datetimeFigureOut">
               <a:rPr lang="en-US" dirty="0"/>
               <a:pPr/>
-              <a:t>3/30/23</a:t>
+              <a:t>3/31/23</a:t>
             </a:fld>
             <a:endParaRPr lang="en-US" dirty="0"/>
           </a:p>
@@ -7132,7 +7133,7 @@
             <a:fld id="{B61BEF0D-F0BB-DE4B-95CE-6DB70DBA9567}" type="datetimeFigureOut">
               <a:rPr lang="en-US" dirty="0"/>
               <a:pPr/>
-              <a:t>3/30/23</a:t>
+              <a:t>3/31/23</a:t>
             </a:fld>
             <a:endParaRPr lang="en-US" dirty="0"/>
           </a:p>
@@ -8939,7 +8940,7 @@
         <p:spPr/>
         <p:txBody>
           <a:bodyPr>
-            <a:normAutofit lnSpcReduction="10000"/>
+            <a:normAutofit fontScale="92500"/>
           </a:bodyPr>
           <a:lstStyle/>
           <a:p>
@@ -10352,6 +10353,14 @@
               <a:rPr kumimoji="1" lang="zh-CN" altLang="en-US" dirty="0"/>
               <a:t>底层存储结构</a:t>
             </a:r>
+            <a:r>
+              <a:rPr kumimoji="1" lang="en-US" altLang="zh-CN" dirty="0"/>
+              <a:t>-</a:t>
+            </a:r>
+            <a:r>
+              <a:rPr kumimoji="1" lang="zh-CN" altLang="en-US" dirty="0"/>
+              <a:t>文件</a:t>
+            </a:r>
           </a:p>
         </p:txBody>
       </p:sp>
@@ -10371,7 +10380,12 @@
             <p:ph idx="1"/>
           </p:nvPr>
         </p:nvSpPr>
-        <p:spPr/>
+        <p:spPr>
+          <a:xfrm>
+            <a:off x="2589212" y="1600200"/>
+            <a:ext cx="8915400" cy="4311022"/>
+          </a:xfrm>
+        </p:spPr>
         <p:txBody>
           <a:bodyPr/>
           <a:lstStyle/>
@@ -10421,12 +10435,16 @@
               </a:rPr>
               <a:t>存储</a:t>
             </a:r>
-          </a:p>
-          <a:p>
-            <a:pPr algn="l">
-              <a:buFont typeface="Arial" panose="020B0604020202020204" pitchFamily="34" charset="0"/>
-              <a:buChar char="•"/>
-            </a:pPr>
+            <a:endParaRPr lang="en-US" altLang="zh-CN" b="0" i="0" dirty="0">
+              <a:solidFill>
+                <a:srgbClr val="000000"/>
+              </a:solidFill>
+              <a:effectLst/>
+              <a:latin typeface="PingFang SC" panose="020B0400000000000000" pitchFamily="34" charset="-122"/>
+              <a:ea typeface="PingFang SC" panose="020B0400000000000000" pitchFamily="34" charset="-122"/>
+            </a:endParaRPr>
+          </a:p>
+          <a:p>
             <a:r>
               <a:rPr lang="en" altLang="zh-CN" b="0" i="0" dirty="0">
                 <a:solidFill>
@@ -10458,8 +10476,18 @@
                 <a:latin typeface="PingFang SC" panose="020B0400000000000000" pitchFamily="34" charset="-122"/>
                 <a:ea typeface="PingFang SC" panose="020B0400000000000000" pitchFamily="34" charset="-122"/>
               </a:rPr>
-              <a:t>存储 </a:t>
-            </a:r>
+              <a:t>存储节点</a:t>
+            </a:r>
+            <a:endParaRPr lang="en-US" altLang="zh-CN" b="0" i="0" dirty="0">
+              <a:solidFill>
+                <a:srgbClr val="000000"/>
+              </a:solidFill>
+              <a:effectLst/>
+              <a:latin typeface="PingFang SC" panose="020B0400000000000000" pitchFamily="34" charset="-122"/>
+              <a:ea typeface="PingFang SC" panose="020B0400000000000000" pitchFamily="34" charset="-122"/>
+            </a:endParaRPr>
+          </a:p>
+          <a:p>
             <a:r>
               <a:rPr lang="en" altLang="zh-CN" b="0" i="0" dirty="0">
                 <a:solidFill>
@@ -10469,16 +10497,10 @@
                 <a:latin typeface="PingFang SC" panose="020B0400000000000000" pitchFamily="34" charset="-122"/>
                 <a:ea typeface="PingFang SC" panose="020B0400000000000000" pitchFamily="34" charset="-122"/>
               </a:rPr>
-              <a:t>node</a:t>
-            </a:r>
-          </a:p>
-          <a:p>
-            <a:pPr algn="l">
-              <a:buFont typeface="Arial" panose="020B0604020202020204" pitchFamily="34" charset="0"/>
-              <a:buChar char="•"/>
-            </a:pPr>
-            <a:r>
-              <a:rPr lang="en" altLang="zh-CN" b="0" i="0" dirty="0">
+              <a:t>neostore.relationshipstore.db</a:t>
+            </a:r>
+            <a:r>
+              <a:rPr lang="zh-CN" altLang="en" b="0" i="0" dirty="0">
                 <a:solidFill>
                   <a:srgbClr val="000000"/>
                 </a:solidFill>
@@ -10486,10 +10508,10 @@
                 <a:latin typeface="PingFang SC" panose="020B0400000000000000" pitchFamily="34" charset="-122"/>
                 <a:ea typeface="PingFang SC" panose="020B0400000000000000" pitchFamily="34" charset="-122"/>
               </a:rPr>
-              <a:t>neostore.propertystore.db</a:t>
-            </a:r>
-            <a:r>
-              <a:rPr lang="zh-CN" altLang="en" b="0" i="0" dirty="0">
+              <a:t>：</a:t>
+            </a:r>
+            <a:r>
+              <a:rPr lang="zh-CN" altLang="en-US" b="0" i="0" dirty="0">
                 <a:solidFill>
                   <a:srgbClr val="000000"/>
                 </a:solidFill>
@@ -10497,10 +10519,12 @@
                 <a:latin typeface="PingFang SC" panose="020B0400000000000000" pitchFamily="34" charset="-122"/>
                 <a:ea typeface="PingFang SC" panose="020B0400000000000000" pitchFamily="34" charset="-122"/>
               </a:rPr>
-              <a:t>：</a:t>
-            </a:r>
-            <a:r>
-              <a:rPr lang="zh-CN" altLang="en-US" b="0" i="0" dirty="0">
+              <a:t>存储关系</a:t>
+            </a:r>
+          </a:p>
+          <a:p>
+            <a:r>
+              <a:rPr lang="en" altLang="zh-CN" b="0" i="0" dirty="0">
                 <a:solidFill>
                   <a:srgbClr val="000000"/>
                 </a:solidFill>
@@ -10508,16 +10532,10 @@
                 <a:latin typeface="PingFang SC" panose="020B0400000000000000" pitchFamily="34" charset="-122"/>
                 <a:ea typeface="PingFang SC" panose="020B0400000000000000" pitchFamily="34" charset="-122"/>
               </a:rPr>
-              <a:t>存储属性</a:t>
-            </a:r>
-          </a:p>
-          <a:p>
-            <a:pPr algn="l">
-              <a:buFont typeface="Arial" panose="020B0604020202020204" pitchFamily="34" charset="0"/>
-              <a:buChar char="•"/>
-            </a:pPr>
-            <a:r>
-              <a:rPr lang="en" altLang="zh-CN" b="0" i="0" dirty="0">
+              <a:t>neostore.propertystore.db</a:t>
+            </a:r>
+            <a:r>
+              <a:rPr lang="zh-CN" altLang="en" b="0" i="0" dirty="0">
                 <a:solidFill>
                   <a:srgbClr val="000000"/>
                 </a:solidFill>
@@ -10525,10 +10543,10 @@
                 <a:latin typeface="PingFang SC" panose="020B0400000000000000" pitchFamily="34" charset="-122"/>
                 <a:ea typeface="PingFang SC" panose="020B0400000000000000" pitchFamily="34" charset="-122"/>
               </a:rPr>
-              <a:t>neostore.relationshipstore.db</a:t>
-            </a:r>
-            <a:r>
-              <a:rPr lang="zh-CN" altLang="en" b="0" i="0" dirty="0">
+              <a:t>：</a:t>
+            </a:r>
+            <a:r>
+              <a:rPr lang="zh-CN" altLang="en-US" b="0" i="0" dirty="0">
                 <a:solidFill>
                   <a:srgbClr val="000000"/>
                 </a:solidFill>
@@ -10536,10 +10554,12 @@
                 <a:latin typeface="PingFang SC" panose="020B0400000000000000" pitchFamily="34" charset="-122"/>
                 <a:ea typeface="PingFang SC" panose="020B0400000000000000" pitchFamily="34" charset="-122"/>
               </a:rPr>
-              <a:t>：</a:t>
-            </a:r>
-            <a:r>
-              <a:rPr lang="zh-CN" altLang="en-US" b="0" i="0" dirty="0">
+              <a:t>存储属性</a:t>
+            </a:r>
+          </a:p>
+          <a:p>
+            <a:r>
+              <a:rPr lang="en" altLang="zh-CN" b="0" i="0" dirty="0">
                 <a:solidFill>
                   <a:srgbClr val="000000"/>
                 </a:solidFill>
@@ -10547,43 +10567,45 @@
                 <a:latin typeface="PingFang SC" panose="020B0400000000000000" pitchFamily="34" charset="-122"/>
                 <a:ea typeface="PingFang SC" panose="020B0400000000000000" pitchFamily="34" charset="-122"/>
               </a:rPr>
-              <a:t>存储关系</a:t>
-            </a:r>
-          </a:p>
-          <a:p>
-            <a:r>
-              <a:rPr lang="en" altLang="zh-CN" b="0" i="0" dirty="0">
+              <a:t>neostore.xxx</a:t>
+            </a:r>
+            <a:r>
+              <a:rPr lang="en" altLang="zh-CN" dirty="0">
                 <a:solidFill>
                   <a:srgbClr val="000000"/>
                 </a:solidFill>
-                <a:effectLst/>
                 <a:latin typeface="PingFang SC" panose="020B0400000000000000" pitchFamily="34" charset="-122"/>
                 <a:ea typeface="PingFang SC" panose="020B0400000000000000" pitchFamily="34" charset="-122"/>
               </a:rPr>
-              <a:t>neostore.xxx</a:t>
-            </a:r>
-            <a:r>
-              <a:rPr lang="en" altLang="zh-CN" dirty="0">
+              <a:t>.db</a:t>
+            </a:r>
+            <a:r>
+              <a:rPr lang="en-US" altLang="zh-CN" dirty="0">
                 <a:solidFill>
                   <a:srgbClr val="000000"/>
                 </a:solidFill>
                 <a:latin typeface="PingFang SC" panose="020B0400000000000000" pitchFamily="34" charset="-122"/>
                 <a:ea typeface="PingFang SC" panose="020B0400000000000000" pitchFamily="34" charset="-122"/>
               </a:rPr>
-              <a:t>.db</a:t>
-            </a:r>
-            <a:r>
-              <a:rPr lang="en-US" altLang="zh-CN" dirty="0">
+              <a:t>.id</a:t>
+            </a:r>
+            <a:r>
+              <a:rPr lang="zh-CN" altLang="en" b="0" i="0" dirty="0">
                 <a:solidFill>
                   <a:srgbClr val="000000"/>
                 </a:solidFill>
+                <a:effectLst/>
                 <a:latin typeface="PingFang SC" panose="020B0400000000000000" pitchFamily="34" charset="-122"/>
                 <a:ea typeface="PingFang SC" panose="020B0400000000000000" pitchFamily="34" charset="-122"/>
               </a:rPr>
-              <a:t>.id</a:t>
-            </a:r>
-            <a:r>
-              <a:rPr lang="zh-CN" altLang="en" b="0" i="0" dirty="0">
+              <a:t>：</a:t>
+            </a:r>
+            <a:r>
+              <a:rPr kumimoji="1" lang="zh-CN" altLang="en-US" dirty="0"/>
+              <a:t>存储</a:t>
+            </a:r>
+            <a:r>
+              <a:rPr lang="zh-CN" altLang="en-US" b="0" i="0" dirty="0">
                 <a:solidFill>
                   <a:srgbClr val="000000"/>
                 </a:solidFill>
@@ -10591,14 +10613,10 @@
                 <a:latin typeface="PingFang SC" panose="020B0400000000000000" pitchFamily="34" charset="-122"/>
                 <a:ea typeface="PingFang SC" panose="020B0400000000000000" pitchFamily="34" charset="-122"/>
               </a:rPr>
-              <a:t>：</a:t>
-            </a:r>
-            <a:r>
-              <a:rPr kumimoji="1" lang="zh-CN" altLang="en-US" dirty="0"/>
-              <a:t>存储</a:t>
-            </a:r>
-            <a:r>
-              <a:rPr lang="zh-CN" altLang="en-US" b="0" i="0" dirty="0">
+              <a:t>最大的</a:t>
+            </a:r>
+            <a:r>
+              <a:rPr lang="en" altLang="zh-CN" b="0" i="0" dirty="0">
                 <a:solidFill>
                   <a:srgbClr val="000000"/>
                 </a:solidFill>
@@ -10606,10 +10624,10 @@
                 <a:latin typeface="PingFang SC" panose="020B0400000000000000" pitchFamily="34" charset="-122"/>
                 <a:ea typeface="PingFang SC" panose="020B0400000000000000" pitchFamily="34" charset="-122"/>
               </a:rPr>
-              <a:t>最大的</a:t>
-            </a:r>
-            <a:r>
-              <a:rPr lang="en" altLang="zh-CN" b="0" i="0" dirty="0">
+              <a:t>ID </a:t>
+            </a:r>
+            <a:r>
+              <a:rPr lang="zh-CN" altLang="en-US" b="0" i="0" dirty="0">
                 <a:solidFill>
                   <a:srgbClr val="000000"/>
                 </a:solidFill>
@@ -10617,10 +10635,10 @@
                 <a:latin typeface="PingFang SC" panose="020B0400000000000000" pitchFamily="34" charset="-122"/>
                 <a:ea typeface="PingFang SC" panose="020B0400000000000000" pitchFamily="34" charset="-122"/>
               </a:rPr>
-              <a:t>ID </a:t>
-            </a:r>
-            <a:r>
-              <a:rPr lang="zh-CN" altLang="en-US" b="0" i="0" dirty="0">
+              <a:t>及已经</a:t>
+            </a:r>
+            <a:r>
+              <a:rPr lang="en" altLang="zh-CN" b="0" i="0" dirty="0">
                 <a:solidFill>
                   <a:srgbClr val="000000"/>
                 </a:solidFill>
@@ -10628,10 +10646,10 @@
                 <a:latin typeface="PingFang SC" panose="020B0400000000000000" pitchFamily="34" charset="-122"/>
                 <a:ea typeface="PingFang SC" panose="020B0400000000000000" pitchFamily="34" charset="-122"/>
               </a:rPr>
-              <a:t>及已经</a:t>
-            </a:r>
-            <a:r>
-              <a:rPr lang="en" altLang="zh-CN" b="0" i="0" dirty="0">
+              <a:t>free</a:t>
+            </a:r>
+            <a:r>
+              <a:rPr lang="zh-CN" altLang="en-US" b="0" i="0" dirty="0">
                 <a:solidFill>
                   <a:srgbClr val="000000"/>
                 </a:solidFill>
@@ -10639,10 +10657,10 @@
                 <a:latin typeface="PingFang SC" panose="020B0400000000000000" pitchFamily="34" charset="-122"/>
                 <a:ea typeface="PingFang SC" panose="020B0400000000000000" pitchFamily="34" charset="-122"/>
               </a:rPr>
-              <a:t>free</a:t>
-            </a:r>
-            <a:r>
-              <a:rPr lang="zh-CN" altLang="en-US" b="0" i="0" dirty="0">
+              <a:t>的</a:t>
+            </a:r>
+            <a:r>
+              <a:rPr lang="en" altLang="zh-CN" b="0" i="0" dirty="0">
                 <a:solidFill>
                   <a:srgbClr val="000000"/>
                 </a:solidFill>
@@ -10650,7 +10668,19 @@
                 <a:latin typeface="PingFang SC" panose="020B0400000000000000" pitchFamily="34" charset="-122"/>
                 <a:ea typeface="PingFang SC" panose="020B0400000000000000" pitchFamily="34" charset="-122"/>
               </a:rPr>
-              <a:t>的</a:t>
+              <a:t>ID</a:t>
+            </a:r>
+          </a:p>
+          <a:p>
+            <a:r>
+              <a:rPr lang="zh-CN" altLang="en-US" b="0" i="0" dirty="0">
+                <a:solidFill>
+                  <a:srgbClr val="000000"/>
+                </a:solidFill>
+                <a:effectLst/>
+                <a:latin typeface="-apple-system"/>
+              </a:rPr>
+              <a:t>在</a:t>
             </a:r>
             <a:r>
               <a:rPr lang="en" altLang="zh-CN" b="0" i="0" dirty="0">
@@ -10658,15 +10688,193 @@
                   <a:srgbClr val="000000"/>
                 </a:solidFill>
                 <a:effectLst/>
-                <a:latin typeface="PingFang SC" panose="020B0400000000000000" pitchFamily="34" charset="-122"/>
-                <a:ea typeface="PingFang SC" panose="020B0400000000000000" pitchFamily="34" charset="-122"/>
+                <a:latin typeface="-apple-system"/>
+              </a:rPr>
+              <a:t>neo4j</a:t>
+            </a:r>
+            <a:r>
+              <a:rPr lang="zh-CN" altLang="en-US" b="0" i="0" dirty="0">
+                <a:solidFill>
+                  <a:srgbClr val="000000"/>
+                </a:solidFill>
+                <a:effectLst/>
+                <a:latin typeface="-apple-system"/>
+              </a:rPr>
+              <a:t>中，点、关系和属性等图的组成元素都是基于</a:t>
+            </a:r>
+            <a:r>
+              <a:rPr lang="en" altLang="zh-CN" b="0" i="0" dirty="0">
+                <a:solidFill>
+                  <a:srgbClr val="000000"/>
+                </a:solidFill>
+                <a:effectLst/>
+                <a:latin typeface="-apple-system"/>
+              </a:rPr>
+              <a:t>neo4j</a:t>
+            </a:r>
+            <a:r>
+              <a:rPr lang="zh-CN" altLang="en-US" b="0" i="0" dirty="0">
+                <a:solidFill>
+                  <a:srgbClr val="000000"/>
+                </a:solidFill>
+                <a:effectLst/>
+                <a:latin typeface="-apple-system"/>
+              </a:rPr>
+              <a:t>内部维护的</a:t>
+            </a:r>
+            <a:r>
+              <a:rPr lang="en" altLang="zh-CN" b="0" i="0" dirty="0">
+                <a:solidFill>
+                  <a:srgbClr val="000000"/>
+                </a:solidFill>
+                <a:effectLst/>
+                <a:latin typeface="-apple-system"/>
               </a:rPr>
               <a:t>ID</a:t>
             </a:r>
+            <a:r>
+              <a:rPr lang="zh-CN" altLang="en-US" b="0" i="0" dirty="0">
+                <a:solidFill>
+                  <a:srgbClr val="000000"/>
+                </a:solidFill>
+                <a:effectLst/>
+                <a:latin typeface="-apple-system"/>
+              </a:rPr>
+              <a:t>进行访问的，而且这些元素的定长存储的。知道了点</a:t>
+            </a:r>
+            <a:r>
+              <a:rPr lang="en-US" altLang="zh-CN" b="0" i="0" dirty="0">
+                <a:solidFill>
+                  <a:srgbClr val="000000"/>
+                </a:solidFill>
+                <a:effectLst/>
+                <a:latin typeface="-apple-system"/>
+              </a:rPr>
+              <a:t>/</a:t>
+            </a:r>
+            <a:r>
+              <a:rPr lang="zh-CN" altLang="en-US" b="0" i="0" dirty="0">
+                <a:solidFill>
+                  <a:srgbClr val="000000"/>
+                </a:solidFill>
+                <a:effectLst/>
+                <a:latin typeface="-apple-system"/>
+              </a:rPr>
+              <a:t>关系</a:t>
+            </a:r>
+            <a:r>
+              <a:rPr lang="en-US" altLang="zh-CN" b="0" i="0" dirty="0">
+                <a:solidFill>
+                  <a:srgbClr val="000000"/>
+                </a:solidFill>
+                <a:effectLst/>
+                <a:latin typeface="-apple-system"/>
+              </a:rPr>
+              <a:t>/</a:t>
+            </a:r>
+            <a:r>
+              <a:rPr lang="zh-CN" altLang="en-US" b="0" i="0" dirty="0">
+                <a:solidFill>
+                  <a:srgbClr val="000000"/>
+                </a:solidFill>
+                <a:effectLst/>
+                <a:latin typeface="-apple-system"/>
+              </a:rPr>
+              <a:t>属性的</a:t>
+            </a:r>
+            <a:r>
+              <a:rPr lang="en" altLang="zh-CN" b="0" i="0" dirty="0">
+                <a:solidFill>
+                  <a:srgbClr val="000000"/>
+                </a:solidFill>
+                <a:effectLst/>
+                <a:latin typeface="-apple-system"/>
+              </a:rPr>
+              <a:t>ID</a:t>
+            </a:r>
+            <a:r>
+              <a:rPr lang="zh-CN" altLang="en" b="0" i="0" dirty="0">
+                <a:solidFill>
+                  <a:srgbClr val="000000"/>
+                </a:solidFill>
+                <a:effectLst/>
+                <a:latin typeface="-apple-system"/>
+              </a:rPr>
+              <a:t>，</a:t>
+            </a:r>
+            <a:r>
+              <a:rPr lang="zh-CN" altLang="en-US" b="0" i="0" dirty="0">
+                <a:solidFill>
+                  <a:srgbClr val="000000"/>
+                </a:solidFill>
+                <a:effectLst/>
+                <a:latin typeface="-apple-system"/>
+              </a:rPr>
+              <a:t>就能直接算出该</a:t>
+            </a:r>
+            <a:r>
+              <a:rPr lang="en" altLang="zh-CN" b="0" i="0" dirty="0">
+                <a:solidFill>
+                  <a:srgbClr val="000000"/>
+                </a:solidFill>
+                <a:effectLst/>
+                <a:latin typeface="-apple-system"/>
+              </a:rPr>
+              <a:t>ID</a:t>
+            </a:r>
+            <a:r>
+              <a:rPr lang="zh-CN" altLang="en-US" b="0" i="0" dirty="0">
+                <a:solidFill>
+                  <a:srgbClr val="000000"/>
+                </a:solidFill>
+                <a:effectLst/>
+                <a:latin typeface="-apple-system"/>
+              </a:rPr>
+              <a:t>在对应文件中的偏移位置，直接进行访问。</a:t>
+            </a:r>
+            <a:endParaRPr lang="en-US" altLang="zh-CN" b="0" i="0" dirty="0">
+              <a:solidFill>
+                <a:srgbClr val="000000"/>
+              </a:solidFill>
+              <a:effectLst/>
+              <a:latin typeface="-apple-system"/>
+            </a:endParaRPr>
+          </a:p>
+          <a:p>
             <a:endParaRPr kumimoji="1" lang="zh-CN" altLang="en-US" dirty="0"/>
           </a:p>
         </p:txBody>
       </p:sp>
+      <p:pic>
+        <p:nvPicPr>
+          <p:cNvPr id="5" name="图片 4">
+            <a:extLst>
+              <a:ext uri="{FF2B5EF4-FFF2-40B4-BE49-F238E27FC236}">
+                <a16:creationId xmlns:a16="http://schemas.microsoft.com/office/drawing/2014/main" id="{30D6E822-747A-DE4A-84E0-84A4A72188E3}"/>
+              </a:ext>
+            </a:extLst>
+          </p:cNvPr>
+          <p:cNvPicPr>
+            <a:picLocks noChangeAspect="1"/>
+          </p:cNvPicPr>
+          <p:nvPr/>
+        </p:nvPicPr>
+        <p:blipFill>
+          <a:blip r:embed="rId2"/>
+          <a:stretch>
+            <a:fillRect/>
+          </a:stretch>
+        </p:blipFill>
+        <p:spPr>
+          <a:xfrm>
+            <a:off x="2809748" y="4584326"/>
+            <a:ext cx="5054600" cy="1574800"/>
+          </a:xfrm>
+          <a:prstGeom prst="rect">
+            <a:avLst/>
+          </a:prstGeom>
+        </p:spPr>
+      </p:pic>
     </p:spTree>
     <p:extLst>
       <p:ext uri="{BB962C8B-B14F-4D97-AF65-F5344CB8AC3E}">
@@ -10739,10 +10947,10 @@
       </p:sp>
       <p:sp>
         <p:nvSpPr>
-          <p:cNvPr id="5" name="内容占位符 4">
+          <p:cNvPr id="6" name="内容占位符 5">
             <a:extLst>
               <a:ext uri="{FF2B5EF4-FFF2-40B4-BE49-F238E27FC236}">
-                <a16:creationId xmlns:a16="http://schemas.microsoft.com/office/drawing/2014/main" id="{1DE1CB89-D004-6C4A-86CB-DFD219724A1E}"/>
+                <a16:creationId xmlns:a16="http://schemas.microsoft.com/office/drawing/2014/main" id="{3515F2ED-80D6-A64E-950B-642CCE2D13C8}"/>
               </a:ext>
             </a:extLst>
           </p:cNvPr>
@@ -10755,8 +10963,8 @@
         </p:nvSpPr>
         <p:spPr>
           <a:xfrm>
-            <a:off x="2589212" y="1435608"/>
-            <a:ext cx="8915400" cy="3777622"/>
+            <a:off x="2589212" y="1591056"/>
+            <a:ext cx="8915400" cy="4320166"/>
           </a:xfrm>
         </p:spPr>
         <p:txBody>
@@ -10764,204 +10972,106 @@
           <a:lstStyle/>
           <a:p>
             <a:r>
-              <a:rPr kumimoji="1" lang="en-US" altLang="zh-CN" sz="1600" dirty="0"/>
-              <a:t>InUse: 1</a:t>
-            </a:r>
-            <a:r>
-              <a:rPr kumimoji="1" lang="zh-CN" altLang="en-US" sz="1600" dirty="0"/>
-              <a:t>字节，代表节点是否在使用，</a:t>
-            </a:r>
-            <a:r>
-              <a:rPr kumimoji="1" lang="en-US" altLang="zh-CN" sz="1600" dirty="0"/>
-              <a:t>1</a:t>
-            </a:r>
-            <a:r>
-              <a:rPr kumimoji="1" lang="zh-CN" altLang="en-US" sz="1600" dirty="0"/>
-              <a:t>代表使用中，</a:t>
-            </a:r>
-            <a:r>
-              <a:rPr kumimoji="1" lang="en-US" altLang="zh-CN" sz="1600" dirty="0"/>
-              <a:t>0</a:t>
-            </a:r>
-            <a:r>
-              <a:rPr kumimoji="1" lang="zh-CN" altLang="en-US" sz="1600" dirty="0"/>
-              <a:t>代表被删除</a:t>
-            </a:r>
-            <a:endParaRPr kumimoji="1" lang="en-US" altLang="zh-CN" sz="1600" dirty="0"/>
-          </a:p>
-          <a:p>
-            <a:r>
-              <a:rPr kumimoji="1" lang="en-US" altLang="zh-CN" sz="1600" dirty="0"/>
-              <a:t>NextRelId</a:t>
-            </a:r>
-            <a:r>
-              <a:rPr kumimoji="1" lang="zh-CN" altLang="en-US" sz="1600" dirty="0"/>
-              <a:t>：</a:t>
-            </a:r>
-            <a:r>
-              <a:rPr kumimoji="1" lang="en-US" altLang="zh-CN" sz="1600" dirty="0"/>
-              <a:t>4</a:t>
-            </a:r>
-            <a:r>
-              <a:rPr kumimoji="1" lang="zh-CN" altLang="en-US" sz="1600" dirty="0"/>
-              <a:t>字节，节点的第一个关系</a:t>
-            </a:r>
-            <a:r>
-              <a:rPr kumimoji="1" lang="en-US" altLang="zh-CN" sz="1600" dirty="0"/>
+              <a:rPr lang="zh-CN" altLang="en-US" dirty="0"/>
+              <a:t>节点结构为固定长度</a:t>
+            </a:r>
+            <a:r>
+              <a:rPr lang="en-US" altLang="zh-CN" dirty="0"/>
+              <a:t>15byte</a:t>
+            </a:r>
+          </a:p>
+          <a:p>
+            <a:r>
+              <a:rPr kumimoji="1" lang="zh-CN" altLang="en-US" sz="1800" dirty="0"/>
+              <a:t>注：</a:t>
+            </a:r>
+            <a:r>
+              <a:rPr kumimoji="1" lang="en-US" altLang="zh-CN" sz="1800" dirty="0"/>
+              <a:t>Neo4j</a:t>
+            </a:r>
+            <a:r>
+              <a:rPr kumimoji="1" lang="zh-CN" altLang="en-US" sz="1800" dirty="0"/>
+              <a:t>中的</a:t>
+            </a:r>
+            <a:r>
+              <a:rPr kumimoji="1" lang="en-US" altLang="zh-CN" sz="1800" dirty="0"/>
               <a:t>id</a:t>
             </a:r>
             <a:r>
-              <a:rPr kumimoji="1" lang="zh-CN" altLang="en-US" sz="1600" dirty="0"/>
-              <a:t>（</a:t>
-            </a:r>
-            <a:r>
-              <a:rPr kumimoji="1" lang="en-US" altLang="zh-CN" sz="1600" dirty="0"/>
-              <a:t>-1</a:t>
-            </a:r>
-            <a:r>
-              <a:rPr kumimoji="1" lang="zh-CN" altLang="en-US" sz="1600" dirty="0"/>
-              <a:t>表示没有）</a:t>
-            </a:r>
-            <a:endParaRPr kumimoji="1" lang="en-US" altLang="zh-CN" sz="1600" dirty="0"/>
-          </a:p>
-          <a:p>
-            <a:r>
-              <a:rPr kumimoji="1" lang="en-US" altLang="zh-CN" sz="1600" dirty="0"/>
-              <a:t>NextRelId</a:t>
-            </a:r>
-            <a:r>
-              <a:rPr kumimoji="1" lang="zh-CN" altLang="en-US" sz="1600" dirty="0"/>
-              <a:t>：</a:t>
-            </a:r>
-            <a:r>
-              <a:rPr kumimoji="1" lang="en-US" altLang="zh-CN" sz="1600" dirty="0"/>
-              <a:t>4</a:t>
-            </a:r>
-            <a:r>
-              <a:rPr kumimoji="1" lang="zh-CN" altLang="en-US" sz="1600" dirty="0"/>
-              <a:t>字节，节点的第一个属性</a:t>
-            </a:r>
-            <a:r>
-              <a:rPr kumimoji="1" lang="en-US" altLang="zh-CN" sz="1600" dirty="0"/>
-              <a:t>id</a:t>
-            </a:r>
-            <a:r>
-              <a:rPr kumimoji="1" lang="zh-CN" altLang="en-US" sz="1600" dirty="0"/>
-              <a:t>（</a:t>
-            </a:r>
-            <a:r>
-              <a:rPr kumimoji="1" lang="en-US" altLang="zh-CN" sz="1600" dirty="0"/>
-              <a:t>-1</a:t>
-            </a:r>
-            <a:r>
-              <a:rPr kumimoji="1" lang="zh-CN" altLang="en-US" sz="1600" dirty="0"/>
-              <a:t>表示没有）</a:t>
-            </a:r>
-            <a:endParaRPr kumimoji="1" lang="en-US" altLang="zh-CN" sz="1600" dirty="0"/>
-          </a:p>
-          <a:p>
-            <a:r>
-              <a:rPr kumimoji="1" lang="en-US" altLang="zh-CN" sz="1600" dirty="0"/>
-              <a:t>Labels</a:t>
-            </a:r>
-            <a:r>
-              <a:rPr kumimoji="1" lang="zh-CN" altLang="en-US" sz="1600" dirty="0"/>
-              <a:t>：</a:t>
-            </a:r>
-            <a:r>
-              <a:rPr kumimoji="1" lang="en-US" altLang="zh-CN" sz="1600" dirty="0"/>
-              <a:t>5</a:t>
-            </a:r>
-            <a:r>
-              <a:rPr kumimoji="1" lang="zh-CN" altLang="en-US" sz="1600" dirty="0"/>
-              <a:t>字节，节点的标签信息</a:t>
-            </a:r>
-            <a:endParaRPr kumimoji="1" lang="en-US" altLang="zh-CN" sz="1600" dirty="0"/>
-          </a:p>
-          <a:p>
-            <a:r>
-              <a:rPr kumimoji="1" lang="en-US" altLang="zh-CN" sz="1600" dirty="0"/>
-              <a:t>Extra</a:t>
-            </a:r>
-            <a:r>
-              <a:rPr kumimoji="1" lang="zh-CN" altLang="en-US" sz="1600" dirty="0"/>
-              <a:t>：</a:t>
-            </a:r>
-            <a:r>
-              <a:rPr kumimoji="1" lang="en-US" altLang="zh-CN" sz="1600" dirty="0"/>
-              <a:t>1</a:t>
-            </a:r>
-            <a:r>
-              <a:rPr kumimoji="1" lang="zh-CN" altLang="en-US" sz="1600" dirty="0"/>
-              <a:t>字节，保留字段，表示节点是否是</a:t>
-            </a:r>
-            <a:r>
-              <a:rPr kumimoji="1" lang="en-US" altLang="zh-CN" sz="1600" dirty="0"/>
-              <a:t>dense</a:t>
-            </a:r>
-            <a:r>
-              <a:rPr kumimoji="1" lang="zh-CN" altLang="en-US" sz="1600" dirty="0"/>
-              <a:t>节点（有很多边的节点）</a:t>
-            </a:r>
-            <a:endParaRPr kumimoji="1" lang="en-US" altLang="zh-CN" sz="1600" dirty="0"/>
-          </a:p>
-          <a:p>
-            <a:r>
-              <a:rPr kumimoji="1" lang="zh-CN" altLang="en-US" sz="1600" dirty="0"/>
-              <a:t>注：</a:t>
-            </a:r>
-            <a:r>
-              <a:rPr kumimoji="1" lang="en-US" altLang="zh-CN" sz="1600" dirty="0"/>
-              <a:t>Neo4j</a:t>
-            </a:r>
-            <a:r>
-              <a:rPr kumimoji="1" lang="zh-CN" altLang="en-US" sz="1600" dirty="0"/>
-              <a:t>中的</a:t>
-            </a:r>
-            <a:r>
-              <a:rPr kumimoji="1" lang="en-US" altLang="zh-CN" sz="1600" dirty="0"/>
-              <a:t>id</a:t>
-            </a:r>
-            <a:r>
-              <a:rPr kumimoji="1" lang="zh-CN" altLang="en-US" sz="1600" dirty="0"/>
+              <a:rPr kumimoji="1" lang="zh-CN" altLang="en-US" sz="1800" dirty="0"/>
               <a:t>是</a:t>
             </a:r>
             <a:r>
-              <a:rPr kumimoji="1" lang="en-US" altLang="zh-CN" sz="1600" dirty="0"/>
+              <a:rPr kumimoji="1" lang="en-US" altLang="zh-CN" sz="1800" dirty="0"/>
               <a:t>Long</a:t>
             </a:r>
             <a:r>
-              <a:rPr kumimoji="1" lang="zh-CN" altLang="en-US" sz="1600" dirty="0"/>
-              <a:t>型，参考代码</a:t>
-            </a:r>
-            <a:br>
-              <a:rPr kumimoji="1" lang="en-US" altLang="zh-CN" sz="1600" dirty="0"/>
-            </a:br>
-            <a:r>
-              <a:rPr kumimoji="1" lang="en-US" altLang="zh-CN" sz="1600" dirty="0"/>
+              <a:rPr kumimoji="1" lang="zh-CN" altLang="en-US" sz="1800" dirty="0"/>
+              <a:t>型</a:t>
+            </a:r>
+            <a:endParaRPr kumimoji="1" lang="en-US" altLang="zh-CN" sz="1800" dirty="0"/>
+          </a:p>
+          <a:p>
+            <a:r>
+              <a:rPr kumimoji="1" lang="zh-CN" altLang="en-US" sz="1800" dirty="0"/>
+              <a:t>代码</a:t>
+            </a:r>
+            <a:r>
+              <a:rPr kumimoji="1" lang="zh-CN" altLang="en-US" dirty="0"/>
+              <a:t>在</a:t>
+            </a:r>
+            <a:r>
+              <a:rPr kumimoji="1" lang="en-US" altLang="zh-CN" sz="1800" dirty="0"/>
               <a:t>org.neo4j.kernel.impl.store.format.standard.NodeRecordFormat</a:t>
             </a:r>
           </a:p>
           <a:p>
-            <a:endParaRPr kumimoji="1" lang="en-US" altLang="zh-CN" dirty="0"/>
-          </a:p>
-          <a:p>
-            <a:endParaRPr kumimoji="1" lang="en-US" altLang="zh-CN" dirty="0"/>
-          </a:p>
-          <a:p>
-            <a:endParaRPr kumimoji="1" lang="en-US" altLang="zh-CN" dirty="0"/>
-          </a:p>
-          <a:p>
-            <a:endParaRPr kumimoji="1" lang="zh-CN" altLang="en-US" dirty="0"/>
+            <a:endParaRPr lang="en-US" altLang="zh-CN" dirty="0"/>
+          </a:p>
+          <a:p>
+            <a:endParaRPr lang="en-US" altLang="zh-CN" dirty="0"/>
+          </a:p>
+          <a:p>
+            <a:endParaRPr lang="zh-CN" altLang="en-US" dirty="0"/>
           </a:p>
         </p:txBody>
       </p:sp>
       <p:pic>
         <p:nvPicPr>
-          <p:cNvPr id="7" name="Picture 12">
+          <p:cNvPr id="8" name="图片 7">
             <a:extLst>
               <a:ext uri="{FF2B5EF4-FFF2-40B4-BE49-F238E27FC236}">
-                <a16:creationId xmlns:a16="http://schemas.microsoft.com/office/drawing/2014/main" id="{C659BEAB-76BE-DB4F-94D1-87FC06F0F808}"/>
+                <a16:creationId xmlns:a16="http://schemas.microsoft.com/office/drawing/2014/main" id="{C08840DA-1BDB-014B-8580-C35FEA162EEB}"/>
+              </a:ext>
+            </a:extLst>
+          </p:cNvPr>
+          <p:cNvPicPr>
+            <a:picLocks noChangeAspect="1"/>
+          </p:cNvPicPr>
+          <p:nvPr/>
+        </p:nvPicPr>
+        <p:blipFill>
+          <a:blip r:embed="rId2"/>
+          <a:stretch>
+            <a:fillRect/>
+          </a:stretch>
+        </p:blipFill>
+        <p:spPr>
+          <a:xfrm>
+            <a:off x="2589212" y="3332039"/>
+            <a:ext cx="8661400" cy="838200"/>
+          </a:xfrm>
+          <a:prstGeom prst="rect">
+            <a:avLst/>
+          </a:prstGeom>
+        </p:spPr>
+      </p:pic>
+      <p:pic>
+        <p:nvPicPr>
+          <p:cNvPr id="9" name="Picture 12">
+            <a:extLst>
+              <a:ext uri="{FF2B5EF4-FFF2-40B4-BE49-F238E27FC236}">
+                <a16:creationId xmlns:a16="http://schemas.microsoft.com/office/drawing/2014/main" id="{62E6FE00-C81B-3940-967C-9E5852BC83E1}"/>
               </a:ext>
             </a:extLst>
           </p:cNvPr>
@@ -10971,7 +11081,7 @@
           <p:nvPr/>
         </p:nvPicPr>
         <p:blipFill>
-          <a:blip r:embed="rId2">
+          <a:blip r:embed="rId3">
             <a:extLst>
               <a:ext uri="{28A0092B-C50C-407E-A947-70E740481C1C}">
                 <a14:useLocalDpi xmlns:a14="http://schemas.microsoft.com/office/drawing/2010/main" val="0"/>
@@ -10985,8 +11095,8 @@
         </p:blipFill>
         <p:spPr bwMode="auto">
           <a:xfrm>
-            <a:off x="2589212" y="3857552"/>
-            <a:ext cx="7897554" cy="3129680"/>
+            <a:off x="2589212" y="4113542"/>
+            <a:ext cx="6976364" cy="2764626"/>
           </a:xfrm>
           <a:prstGeom prst="rect">
             <a:avLst/>
@@ -11006,7 +11116,7 @@
     </p:spTree>
     <p:extLst>
       <p:ext uri="{BB962C8B-B14F-4D97-AF65-F5344CB8AC3E}">
-        <p14:creationId xmlns:p14="http://schemas.microsoft.com/office/powerpoint/2010/main" val="4079489057"/>
+        <p14:creationId xmlns:p14="http://schemas.microsoft.com/office/powerpoint/2010/main" val="1232241868"/>
       </p:ext>
     </p:extLst>
   </p:cSld>
@@ -11413,6 +11523,607 @@
 </file>
 
 <file path=ppt/slides/slide20.xml><?xml version="1.0" encoding="utf-8"?>
+<p:sld xmlns:a="http://schemas.openxmlformats.org/drawingml/2006/main" xmlns:r="http://schemas.openxmlformats.org/officeDocument/2006/relationships" xmlns:p="http://schemas.openxmlformats.org/presentationml/2006/main">
+  <p:cSld>
+    <p:spTree>
+      <p:nvGrpSpPr>
+        <p:cNvPr id="1" name=""/>
+        <p:cNvGrpSpPr/>
+        <p:nvPr/>
+      </p:nvGrpSpPr>
+      <p:grpSpPr>
+        <a:xfrm>
+          <a:off x="0" y="0"/>
+          <a:ext cx="0" cy="0"/>
+          <a:chOff x="0" y="0"/>
+          <a:chExt cx="0" cy="0"/>
+        </a:xfrm>
+      </p:grpSpPr>
+      <p:sp>
+        <p:nvSpPr>
+          <p:cNvPr id="2" name="标题 1">
+            <a:extLst>
+              <a:ext uri="{FF2B5EF4-FFF2-40B4-BE49-F238E27FC236}">
+                <a16:creationId xmlns:a16="http://schemas.microsoft.com/office/drawing/2014/main" id="{64AA338F-5E28-8645-9FBA-8CE398797205}"/>
+              </a:ext>
+            </a:extLst>
+          </p:cNvPr>
+          <p:cNvSpPr>
+            <a:spLocks noGrp="1"/>
+          </p:cNvSpPr>
+          <p:nvPr>
+            <p:ph type="title"/>
+          </p:nvPr>
+        </p:nvSpPr>
+        <p:spPr/>
+        <p:txBody>
+          <a:bodyPr/>
+          <a:lstStyle/>
+          <a:p>
+            <a:r>
+              <a:rPr kumimoji="1" lang="en-US" altLang="zh-CN" dirty="0"/>
+              <a:t>Neo4j</a:t>
+            </a:r>
+            <a:r>
+              <a:rPr kumimoji="1" lang="zh-CN" altLang="en-US" dirty="0"/>
+              <a:t>底层存储结构</a:t>
+            </a:r>
+            <a:r>
+              <a:rPr kumimoji="1" lang="en-US" altLang="zh-CN" dirty="0"/>
+              <a:t>-</a:t>
+            </a:r>
+            <a:r>
+              <a:rPr kumimoji="1" lang="zh-CN" altLang="en-US" dirty="0"/>
+              <a:t>节点</a:t>
+            </a:r>
+          </a:p>
+        </p:txBody>
+      </p:sp>
+      <p:sp>
+        <p:nvSpPr>
+          <p:cNvPr id="5" name="内容占位符 4">
+            <a:extLst>
+              <a:ext uri="{FF2B5EF4-FFF2-40B4-BE49-F238E27FC236}">
+                <a16:creationId xmlns:a16="http://schemas.microsoft.com/office/drawing/2014/main" id="{1DE1CB89-D004-6C4A-86CB-DFD219724A1E}"/>
+              </a:ext>
+            </a:extLst>
+          </p:cNvPr>
+          <p:cNvSpPr>
+            <a:spLocks noGrp="1"/>
+          </p:cNvSpPr>
+          <p:nvPr>
+            <p:ph idx="1"/>
+          </p:nvPr>
+        </p:nvSpPr>
+        <p:spPr>
+          <a:xfrm>
+            <a:off x="2589212" y="1435608"/>
+            <a:ext cx="8915400" cy="3777622"/>
+          </a:xfrm>
+        </p:spPr>
+        <p:txBody>
+          <a:bodyPr>
+            <a:normAutofit/>
+          </a:bodyPr>
+          <a:lstStyle/>
+          <a:p>
+            <a:r>
+              <a:rPr kumimoji="1" lang="zh-CN" altLang="en-US" dirty="0"/>
+              <a:t>第</a:t>
+            </a:r>
+            <a:r>
+              <a:rPr kumimoji="1" lang="en-US" altLang="zh-CN" dirty="0"/>
+              <a:t>1</a:t>
+            </a:r>
+            <a:r>
+              <a:rPr kumimoji="1" lang="zh-CN" altLang="en-US" dirty="0"/>
+              <a:t>个字节存储</a:t>
+            </a:r>
+            <a:r>
+              <a:rPr kumimoji="1" lang="en-US" altLang="zh-CN" dirty="0"/>
+              <a:t>in_use(</a:t>
+            </a:r>
+            <a:r>
+              <a:rPr kumimoji="1" lang="zh-CN" altLang="en-US" sz="1800" dirty="0"/>
+              <a:t>节点是否在使用，</a:t>
+            </a:r>
+            <a:r>
+              <a:rPr kumimoji="1" lang="en-US" altLang="zh-CN" sz="1800" dirty="0"/>
+              <a:t>1</a:t>
+            </a:r>
+            <a:r>
+              <a:rPr kumimoji="1" lang="zh-CN" altLang="en-US" sz="1800" dirty="0"/>
+              <a:t>代表使用中，</a:t>
+            </a:r>
+            <a:r>
+              <a:rPr kumimoji="1" lang="en-US" altLang="zh-CN" sz="1800" dirty="0"/>
+              <a:t>0</a:t>
+            </a:r>
+            <a:r>
+              <a:rPr kumimoji="1" lang="zh-CN" altLang="en-US" sz="1800" dirty="0"/>
+              <a:t>代表被删除</a:t>
+            </a:r>
+            <a:r>
+              <a:rPr kumimoji="1" lang="en-US" altLang="zh-CN" dirty="0"/>
+              <a:t>)+</a:t>
+            </a:r>
+            <a:r>
+              <a:rPr kumimoji="1" lang="zh-CN" altLang="en-US" dirty="0"/>
+              <a:t>第</a:t>
+            </a:r>
+            <a:r>
+              <a:rPr kumimoji="1" lang="en-US" altLang="zh-CN" dirty="0"/>
+              <a:t>1</a:t>
+            </a:r>
+            <a:r>
+              <a:rPr kumimoji="1" lang="zh-CN" altLang="en-US" dirty="0"/>
+              <a:t>个关系的</a:t>
+            </a:r>
+            <a:r>
+              <a:rPr kumimoji="1" lang="en-US" altLang="zh-CN" dirty="0"/>
+              <a:t>3</a:t>
+            </a:r>
+            <a:r>
+              <a:rPr kumimoji="1" lang="zh-CN" altLang="en-US" dirty="0"/>
+              <a:t>位高位信息（第</a:t>
+            </a:r>
+            <a:r>
+              <a:rPr kumimoji="1" lang="en-US" altLang="zh-CN" dirty="0"/>
+              <a:t>33</a:t>
+            </a:r>
+            <a:r>
+              <a:rPr kumimoji="1" lang="zh-CN" altLang="en-US" dirty="0"/>
+              <a:t>位到</a:t>
+            </a:r>
+            <a:r>
+              <a:rPr kumimoji="1" lang="en-US" altLang="zh-CN" dirty="0"/>
+              <a:t>35</a:t>
+            </a:r>
+            <a:r>
+              <a:rPr kumimoji="1" lang="zh-CN" altLang="en-US" dirty="0"/>
+              <a:t>位）</a:t>
+            </a:r>
+            <a:r>
+              <a:rPr kumimoji="1" lang="en-US" altLang="zh-CN" dirty="0"/>
+              <a:t>+</a:t>
+            </a:r>
+            <a:r>
+              <a:rPr kumimoji="1" lang="zh-CN" altLang="en-US" dirty="0"/>
+              <a:t>第</a:t>
+            </a:r>
+            <a:r>
+              <a:rPr kumimoji="1" lang="en-US" altLang="zh-CN" dirty="0"/>
+              <a:t>1</a:t>
+            </a:r>
+            <a:r>
+              <a:rPr kumimoji="1" lang="zh-CN" altLang="en-US" dirty="0"/>
+              <a:t>个属性的</a:t>
+            </a:r>
+            <a:r>
+              <a:rPr kumimoji="1" lang="en-US" altLang="zh-CN" dirty="0"/>
+              <a:t>4</a:t>
+            </a:r>
+            <a:r>
+              <a:rPr kumimoji="1" lang="zh-CN" altLang="en-US" dirty="0"/>
+              <a:t>位高位信息（第</a:t>
+            </a:r>
+            <a:r>
+              <a:rPr kumimoji="1" lang="en-US" altLang="zh-CN" dirty="0"/>
+              <a:t>33</a:t>
+            </a:r>
+            <a:r>
+              <a:rPr kumimoji="1" lang="zh-CN" altLang="en-US" dirty="0"/>
+              <a:t>位到</a:t>
+            </a:r>
+            <a:r>
+              <a:rPr kumimoji="1" lang="en-US" altLang="zh-CN" dirty="0"/>
+              <a:t>36</a:t>
+            </a:r>
+            <a:r>
+              <a:rPr kumimoji="1" lang="zh-CN" altLang="en-US" dirty="0"/>
+              <a:t>位），可以看出</a:t>
+            </a:r>
+            <a:r>
+              <a:rPr kumimoji="1" lang="en-US" altLang="zh-CN" dirty="0"/>
+              <a:t>Neo4j</a:t>
+            </a:r>
+            <a:r>
+              <a:rPr kumimoji="1" lang="zh-CN" altLang="en-US" dirty="0"/>
+              <a:t>使用</a:t>
+            </a:r>
+            <a:r>
+              <a:rPr kumimoji="1" lang="en-US" altLang="zh-CN" dirty="0"/>
+              <a:t>35</a:t>
+            </a:r>
+            <a:r>
+              <a:rPr kumimoji="1" lang="zh-CN" altLang="en-US" dirty="0"/>
+              <a:t>位保存关系</a:t>
+            </a:r>
+            <a:r>
+              <a:rPr kumimoji="1" lang="en-US" altLang="zh-CN" dirty="0"/>
+              <a:t>id</a:t>
+            </a:r>
+            <a:r>
+              <a:rPr kumimoji="1" lang="zh-CN" altLang="en-US" dirty="0"/>
+              <a:t>，使用</a:t>
+            </a:r>
+            <a:r>
+              <a:rPr kumimoji="1" lang="en-US" altLang="zh-CN" dirty="0"/>
+              <a:t>36</a:t>
+            </a:r>
+            <a:r>
+              <a:rPr kumimoji="1" lang="zh-CN" altLang="en-US" dirty="0"/>
+              <a:t>位保存属性</a:t>
+            </a:r>
+            <a:r>
+              <a:rPr kumimoji="1" lang="en-US" altLang="zh-CN" dirty="0"/>
+              <a:t>id</a:t>
+            </a:r>
+            <a:r>
+              <a:rPr kumimoji="1" lang="zh-CN" altLang="en-US" dirty="0"/>
+              <a:t>。</a:t>
+            </a:r>
+            <a:br>
+              <a:rPr kumimoji="1" lang="en-US" altLang="zh-CN" dirty="0"/>
+            </a:br>
+            <a:r>
+              <a:rPr lang="en-US" altLang="zh-CN" dirty="0"/>
+              <a:t>2^35 = 34,359,738,368</a:t>
+            </a:r>
+            <a:br>
+              <a:rPr lang="en-US" altLang="zh-CN" dirty="0"/>
+            </a:br>
+            <a:r>
+              <a:rPr lang="en-US" altLang="zh-CN" dirty="0"/>
+              <a:t>2^36 = 68,719,476,7362</a:t>
+            </a:r>
+            <a:br>
+              <a:rPr lang="en-US" altLang="zh-CN" dirty="0"/>
+            </a:br>
+            <a:r>
+              <a:rPr lang="zh-CN" altLang="en-US" dirty="0"/>
+              <a:t>可以推导出</a:t>
+            </a:r>
+            <a:r>
+              <a:rPr lang="en-US" altLang="zh-CN" dirty="0"/>
+              <a:t>Neo4j</a:t>
+            </a:r>
+            <a:r>
+              <a:rPr lang="zh-CN" altLang="en-US" dirty="0"/>
+              <a:t>社区版最大支持</a:t>
+            </a:r>
+            <a:r>
+              <a:rPr lang="en-US" altLang="zh-CN" dirty="0"/>
+              <a:t>340</a:t>
+            </a:r>
+            <a:r>
+              <a:rPr lang="zh-CN" altLang="en-US" dirty="0"/>
+              <a:t>亿的关系和</a:t>
+            </a:r>
+            <a:r>
+              <a:rPr lang="en-US" altLang="zh-CN" dirty="0"/>
+              <a:t>680</a:t>
+            </a:r>
+            <a:r>
+              <a:rPr lang="zh-CN" altLang="en-US" dirty="0"/>
+              <a:t>亿的属性。</a:t>
+            </a:r>
+            <a:endParaRPr lang="en-US" altLang="zh-CN" dirty="0"/>
+          </a:p>
+          <a:p>
+            <a:r>
+              <a:rPr kumimoji="1" lang="zh-CN" altLang="en-US" dirty="0"/>
+              <a:t>第</a:t>
+            </a:r>
+            <a:r>
+              <a:rPr kumimoji="1" lang="en-US" altLang="zh-CN" dirty="0"/>
+              <a:t>2</a:t>
+            </a:r>
+            <a:r>
+              <a:rPr kumimoji="1" lang="zh-CN" altLang="en-US" dirty="0"/>
+              <a:t>到</a:t>
+            </a:r>
+            <a:r>
+              <a:rPr kumimoji="1" lang="en-US" altLang="zh-CN" dirty="0"/>
+              <a:t>5</a:t>
+            </a:r>
+            <a:r>
+              <a:rPr kumimoji="1" lang="zh-CN" altLang="en-US" dirty="0"/>
+              <a:t>共</a:t>
+            </a:r>
+            <a:r>
+              <a:rPr kumimoji="1" lang="en-US" altLang="zh-CN" dirty="0"/>
+              <a:t>4</a:t>
+            </a:r>
+            <a:r>
+              <a:rPr kumimoji="1" lang="zh-CN" altLang="en-US" dirty="0"/>
+              <a:t>个字节，代表</a:t>
+            </a:r>
+            <a:r>
+              <a:rPr kumimoji="1" lang="en-US" altLang="zh-CN" sz="1800" dirty="0"/>
+              <a:t>NextRelId</a:t>
+            </a:r>
+            <a:r>
+              <a:rPr kumimoji="1" lang="zh-CN" altLang="en-US" sz="1800" dirty="0"/>
+              <a:t>，节点的第一个关系</a:t>
+            </a:r>
+            <a:r>
+              <a:rPr kumimoji="1" lang="en-US" altLang="zh-CN" sz="1800" dirty="0"/>
+              <a:t>id</a:t>
+            </a:r>
+            <a:r>
+              <a:rPr kumimoji="1" lang="zh-CN" altLang="en-US" sz="1800" dirty="0"/>
+              <a:t>（</a:t>
+            </a:r>
+            <a:r>
+              <a:rPr kumimoji="1" lang="en-US" altLang="zh-CN" sz="1800" dirty="0"/>
+              <a:t>-1</a:t>
+            </a:r>
+            <a:r>
+              <a:rPr kumimoji="1" lang="zh-CN" altLang="en-US" sz="1800" dirty="0"/>
+              <a:t>表示没有）</a:t>
+            </a:r>
+            <a:endParaRPr kumimoji="1" lang="en-US" altLang="zh-CN" sz="1800" dirty="0"/>
+          </a:p>
+          <a:p>
+            <a:r>
+              <a:rPr kumimoji="1" lang="zh-CN" altLang="en-US" dirty="0"/>
+              <a:t>第</a:t>
+            </a:r>
+            <a:r>
+              <a:rPr kumimoji="1" lang="en-US" altLang="zh-CN" dirty="0"/>
+              <a:t>6</a:t>
+            </a:r>
+            <a:r>
+              <a:rPr kumimoji="1" lang="zh-CN" altLang="en-US" dirty="0"/>
+              <a:t>到</a:t>
+            </a:r>
+            <a:r>
+              <a:rPr kumimoji="1" lang="en-US" altLang="zh-CN" dirty="0"/>
+              <a:t>9</a:t>
+            </a:r>
+            <a:r>
+              <a:rPr kumimoji="1" lang="zh-CN" altLang="en-US" dirty="0"/>
+              <a:t>共</a:t>
+            </a:r>
+            <a:r>
+              <a:rPr kumimoji="1" lang="en-US" altLang="zh-CN" dirty="0"/>
+              <a:t>4</a:t>
+            </a:r>
+            <a:r>
+              <a:rPr kumimoji="1" lang="zh-CN" altLang="en-US" dirty="0"/>
+              <a:t>个字节，代表</a:t>
+            </a:r>
+            <a:r>
+              <a:rPr kumimoji="1" lang="en-US" altLang="zh-CN" sz="1800" dirty="0"/>
+              <a:t>NextPropId</a:t>
+            </a:r>
+            <a:r>
+              <a:rPr kumimoji="1" lang="zh-CN" altLang="en-US" sz="1800" dirty="0"/>
+              <a:t>，节点的第一个属性</a:t>
+            </a:r>
+            <a:r>
+              <a:rPr kumimoji="1" lang="en-US" altLang="zh-CN" sz="1800" dirty="0"/>
+              <a:t>id</a:t>
+            </a:r>
+            <a:r>
+              <a:rPr kumimoji="1" lang="zh-CN" altLang="en-US" sz="1800" dirty="0"/>
+              <a:t>（</a:t>
+            </a:r>
+            <a:r>
+              <a:rPr kumimoji="1" lang="en-US" altLang="zh-CN" sz="1800" dirty="0"/>
+              <a:t>-1</a:t>
+            </a:r>
+            <a:r>
+              <a:rPr kumimoji="1" lang="zh-CN" altLang="en-US" sz="1800" dirty="0"/>
+              <a:t>表示没有）</a:t>
+            </a:r>
+            <a:endParaRPr kumimoji="1" lang="en-US" altLang="zh-CN" sz="1800" dirty="0"/>
+          </a:p>
+          <a:p>
+            <a:r>
+              <a:rPr kumimoji="1" lang="zh-CN" altLang="en-US" dirty="0"/>
+              <a:t>第</a:t>
+            </a:r>
+            <a:r>
+              <a:rPr kumimoji="1" lang="en-US" altLang="zh-CN" dirty="0"/>
+              <a:t>10</a:t>
+            </a:r>
+            <a:r>
+              <a:rPr kumimoji="1" lang="zh-CN" altLang="en-US" dirty="0"/>
+              <a:t>到</a:t>
+            </a:r>
+            <a:r>
+              <a:rPr kumimoji="1" lang="en-US" altLang="zh-CN" dirty="0"/>
+              <a:t>13</a:t>
+            </a:r>
+            <a:r>
+              <a:rPr kumimoji="1" lang="zh-CN" altLang="en-US" dirty="0"/>
+              <a:t>共</a:t>
+            </a:r>
+            <a:r>
+              <a:rPr kumimoji="1" lang="en-US" altLang="zh-CN" dirty="0"/>
+              <a:t>4</a:t>
+            </a:r>
+            <a:r>
+              <a:rPr kumimoji="1" lang="zh-CN" altLang="en-US" dirty="0"/>
+              <a:t>个字节，代表</a:t>
+            </a:r>
+            <a:r>
+              <a:rPr kumimoji="1" lang="en-US" altLang="zh-CN" dirty="0"/>
+              <a:t>LsbLabels</a:t>
+            </a:r>
+            <a:r>
+              <a:rPr kumimoji="1" lang="zh-CN" altLang="en-US" sz="1800" dirty="0"/>
+              <a:t>，标签</a:t>
+            </a:r>
+            <a:r>
+              <a:rPr kumimoji="1" lang="en-US" altLang="zh-CN" sz="1800" dirty="0"/>
+              <a:t>id</a:t>
+            </a:r>
+            <a:r>
+              <a:rPr kumimoji="1" lang="zh-CN" altLang="en-US" sz="1800" dirty="0"/>
+              <a:t>的最低有效位（后</a:t>
+            </a:r>
+            <a:r>
+              <a:rPr kumimoji="1" lang="en-US" altLang="zh-CN" sz="1800" dirty="0"/>
+              <a:t>32</a:t>
+            </a:r>
+            <a:r>
+              <a:rPr kumimoji="1" lang="zh-CN" altLang="en-US" sz="1800" dirty="0"/>
+              <a:t>位）</a:t>
+            </a:r>
+            <a:endParaRPr kumimoji="1" lang="en-US" altLang="zh-CN" sz="1800" dirty="0"/>
+          </a:p>
+          <a:p>
+            <a:r>
+              <a:rPr kumimoji="1" lang="zh-CN" altLang="en-US" dirty="0"/>
+              <a:t>第</a:t>
+            </a:r>
+            <a:r>
+              <a:rPr kumimoji="1" lang="en-US" altLang="zh-CN" dirty="0"/>
+              <a:t>14</a:t>
+            </a:r>
+            <a:r>
+              <a:rPr kumimoji="1" lang="zh-CN" altLang="en-US" dirty="0"/>
+              <a:t>个字节，代表</a:t>
+            </a:r>
+            <a:r>
+              <a:rPr kumimoji="1" lang="en-US" altLang="zh-CN" dirty="0"/>
+              <a:t>MsbLabels</a:t>
+            </a:r>
+            <a:r>
+              <a:rPr kumimoji="1" lang="zh-CN" altLang="en-US" dirty="0"/>
+              <a:t>，</a:t>
+            </a:r>
+            <a:r>
+              <a:rPr kumimoji="1" lang="zh-CN" altLang="en-US" sz="1800" dirty="0"/>
+              <a:t>标签</a:t>
+            </a:r>
+            <a:r>
+              <a:rPr kumimoji="1" lang="en-US" altLang="zh-CN" sz="1800" dirty="0"/>
+              <a:t>id</a:t>
+            </a:r>
+            <a:r>
+              <a:rPr kumimoji="1" lang="zh-CN" altLang="en-US" sz="1800" dirty="0"/>
+              <a:t>的最高有效位（第</a:t>
+            </a:r>
+            <a:r>
+              <a:rPr kumimoji="1" lang="en-US" altLang="zh-CN" sz="1800" dirty="0"/>
+              <a:t>33-40</a:t>
+            </a:r>
+            <a:r>
+              <a:rPr kumimoji="1" lang="zh-CN" altLang="en-US" sz="1800" dirty="0"/>
+              <a:t>位共</a:t>
+            </a:r>
+            <a:r>
+              <a:rPr kumimoji="1" lang="en-US" altLang="zh-CN" sz="1800" dirty="0"/>
+              <a:t>8</a:t>
+            </a:r>
+            <a:r>
+              <a:rPr kumimoji="1" lang="zh-CN" altLang="en-US" sz="1800" dirty="0"/>
+              <a:t>位）</a:t>
+            </a:r>
+            <a:endParaRPr kumimoji="1" lang="en-US" altLang="zh-CN" sz="1800" dirty="0"/>
+          </a:p>
+          <a:p>
+            <a:r>
+              <a:rPr kumimoji="1" lang="zh-CN" altLang="en-US" dirty="0"/>
+              <a:t>第</a:t>
+            </a:r>
+            <a:r>
+              <a:rPr kumimoji="1" lang="en-US" altLang="zh-CN" dirty="0"/>
+              <a:t>15</a:t>
+            </a:r>
+            <a:r>
+              <a:rPr kumimoji="1" lang="zh-CN" altLang="en-US" dirty="0"/>
+              <a:t>个字节，代表</a:t>
+            </a:r>
+            <a:r>
+              <a:rPr kumimoji="1" lang="en-US" altLang="zh-CN" sz="1800" dirty="0"/>
+              <a:t>Extra</a:t>
+            </a:r>
+            <a:r>
+              <a:rPr kumimoji="1" lang="zh-CN" altLang="en-US" sz="1800" dirty="0"/>
+              <a:t>，保留字段，表示节点是否是</a:t>
+            </a:r>
+            <a:r>
+              <a:rPr kumimoji="1" lang="en-US" altLang="zh-CN" sz="1800" dirty="0"/>
+              <a:t>dense</a:t>
+            </a:r>
+            <a:r>
+              <a:rPr kumimoji="1" lang="zh-CN" altLang="en-US" sz="1800" dirty="0"/>
+              <a:t>节点（有很多边的节点）</a:t>
+            </a:r>
+            <a:endParaRPr kumimoji="1" lang="en-US" altLang="zh-CN" sz="1800" dirty="0"/>
+          </a:p>
+          <a:p>
+            <a:endParaRPr kumimoji="1" lang="en-US" altLang="zh-CN" sz="1800" dirty="0"/>
+          </a:p>
+          <a:p>
+            <a:endParaRPr kumimoji="1" lang="en-US" altLang="zh-CN" sz="1800" dirty="0"/>
+          </a:p>
+          <a:p>
+            <a:endParaRPr kumimoji="1" lang="en-US" altLang="zh-CN" sz="1800" dirty="0"/>
+          </a:p>
+          <a:p>
+            <a:endParaRPr kumimoji="1" lang="en-US" altLang="zh-CN" sz="1800" dirty="0"/>
+          </a:p>
+          <a:p>
+            <a:endParaRPr kumimoji="1" lang="en-US" altLang="zh-CN" dirty="0"/>
+          </a:p>
+          <a:p>
+            <a:endParaRPr kumimoji="1" lang="en-US" altLang="zh-CN" dirty="0"/>
+          </a:p>
+          <a:p>
+            <a:endParaRPr kumimoji="1" lang="zh-CN" altLang="en-US" dirty="0"/>
+          </a:p>
+        </p:txBody>
+      </p:sp>
+      <p:pic>
+        <p:nvPicPr>
+          <p:cNvPr id="4" name="图片 3">
+            <a:extLst>
+              <a:ext uri="{FF2B5EF4-FFF2-40B4-BE49-F238E27FC236}">
+                <a16:creationId xmlns:a16="http://schemas.microsoft.com/office/drawing/2014/main" id="{B84916DE-3BCC-2D4E-886F-F14A1F39D579}"/>
+              </a:ext>
+            </a:extLst>
+          </p:cNvPr>
+          <p:cNvPicPr>
+            <a:picLocks noChangeAspect="1"/>
+          </p:cNvPicPr>
+          <p:nvPr/>
+        </p:nvPicPr>
+        <p:blipFill>
+          <a:blip r:embed="rId2"/>
+          <a:stretch>
+            <a:fillRect/>
+          </a:stretch>
+        </p:blipFill>
+        <p:spPr>
+          <a:xfrm>
+            <a:off x="2853436" y="5213230"/>
+            <a:ext cx="5003800" cy="1155700"/>
+          </a:xfrm>
+          <a:prstGeom prst="rect">
+            <a:avLst/>
+          </a:prstGeom>
+        </p:spPr>
+      </p:pic>
+    </p:spTree>
+    <p:extLst>
+      <p:ext uri="{BB962C8B-B14F-4D97-AF65-F5344CB8AC3E}">
+        <p14:creationId xmlns:p14="http://schemas.microsoft.com/office/powerpoint/2010/main" val="1911345657"/>
+      </p:ext>
+    </p:extLst>
+  </p:cSld>
+  <p:clrMapOvr>
+    <a:masterClrMapping/>
+  </p:clrMapOvr>
+</p:sld>
+</file>
+
+<file path=ppt/slides/slide21.xml><?xml version="1.0" encoding="utf-8"?>
 <p:sld xmlns:a="http://schemas.openxmlformats.org/drawingml/2006/main" xmlns:r="http://schemas.openxmlformats.org/officeDocument/2006/relationships" xmlns:p="http://schemas.openxmlformats.org/presentationml/2006/main">
   <p:cSld>
     <p:spTree>
@@ -11581,7 +12292,7 @@
 </p:sld>
 </file>
 
-<file path=ppt/slides/slide21.xml><?xml version="1.0" encoding="utf-8"?>
+<file path=ppt/slides/slide22.xml><?xml version="1.0" encoding="utf-8"?>
 <p:sld xmlns:a="http://schemas.openxmlformats.org/drawingml/2006/main" xmlns:r="http://schemas.openxmlformats.org/officeDocument/2006/relationships" xmlns:p="http://schemas.openxmlformats.org/presentationml/2006/main">
   <p:cSld>
     <p:spTree>
@@ -11668,7 +12379,7 @@
 </p:sld>
 </file>
 
-<file path=ppt/slides/slide22.xml><?xml version="1.0" encoding="utf-8"?>
+<file path=ppt/slides/slide23.xml><?xml version="1.0" encoding="utf-8"?>
 <p:sld xmlns:a="http://schemas.openxmlformats.org/drawingml/2006/main" xmlns:r="http://schemas.openxmlformats.org/officeDocument/2006/relationships" xmlns:p="http://schemas.openxmlformats.org/presentationml/2006/main">
   <p:cSld>
     <p:spTree>

</xml_diff>

<commit_message>
文档 by qiyu 2023-04-01
</commit_message>
<xml_diff>
--- a/doc/Neo4j简介.pptx
+++ b/doc/Neo4j简介.pptx
@@ -26,8 +26,11 @@
     <p:sldId id="279" r:id="rId20"/>
     <p:sldId id="278" r:id="rId21"/>
     <p:sldId id="276" r:id="rId22"/>
-    <p:sldId id="266" r:id="rId23"/>
-    <p:sldId id="275" r:id="rId24"/>
+    <p:sldId id="280" r:id="rId23"/>
+    <p:sldId id="282" r:id="rId24"/>
+    <p:sldId id="281" r:id="rId25"/>
+    <p:sldId id="266" r:id="rId26"/>
+    <p:sldId id="275" r:id="rId27"/>
   </p:sldIdLst>
   <p:sldSz cx="12192000" cy="6858000"/>
   <p:notesSz cx="6858000" cy="9144000"/>
@@ -323,7 +326,7 @@
             <a:fld id="{B61BEF0D-F0BB-DE4B-95CE-6DB70DBA9567}" type="datetimeFigureOut">
               <a:rPr lang="en-US" dirty="0"/>
               <a:pPr/>
-              <a:t>3/31/23</a:t>
+              <a:t>4/1/23</a:t>
             </a:fld>
             <a:endParaRPr lang="en-US" dirty="0"/>
           </a:p>
@@ -658,7 +661,7 @@
             <a:fld id="{B61BEF0D-F0BB-DE4B-95CE-6DB70DBA9567}" type="datetimeFigureOut">
               <a:rPr lang="en-US" dirty="0"/>
               <a:pPr/>
-              <a:t>3/31/23</a:t>
+              <a:t>4/1/23</a:t>
             </a:fld>
             <a:endParaRPr lang="en-US" dirty="0"/>
           </a:p>
@@ -1056,7 +1059,7 @@
             <a:fld id="{B61BEF0D-F0BB-DE4B-95CE-6DB70DBA9567}" type="datetimeFigureOut">
               <a:rPr lang="en-US" dirty="0"/>
               <a:pPr/>
-              <a:t>3/31/23</a:t>
+              <a:t>4/1/23</a:t>
             </a:fld>
             <a:endParaRPr lang="en-US" dirty="0"/>
           </a:p>
@@ -1389,7 +1392,7 @@
             <a:fld id="{B61BEF0D-F0BB-DE4B-95CE-6DB70DBA9567}" type="datetimeFigureOut">
               <a:rPr lang="en-US" dirty="0"/>
               <a:pPr/>
-              <a:t>3/31/23</a:t>
+              <a:t>4/1/23</a:t>
             </a:fld>
             <a:endParaRPr lang="en-US" dirty="0"/>
           </a:p>
@@ -1706,7 +1709,7 @@
             <a:fld id="{B61BEF0D-F0BB-DE4B-95CE-6DB70DBA9567}" type="datetimeFigureOut">
               <a:rPr lang="en-US" dirty="0"/>
               <a:pPr/>
-              <a:t>3/31/23</a:t>
+              <a:t>4/1/23</a:t>
             </a:fld>
             <a:endParaRPr lang="en-US" dirty="0"/>
           </a:p>
@@ -2099,7 +2102,7 @@
             <a:fld id="{B61BEF0D-F0BB-DE4B-95CE-6DB70DBA9567}" type="datetimeFigureOut">
               <a:rPr lang="en-US" dirty="0"/>
               <a:pPr/>
-              <a:t>3/31/23</a:t>
+              <a:t>4/1/23</a:t>
             </a:fld>
             <a:endParaRPr lang="en-US" dirty="0"/>
           </a:p>
@@ -2353,7 +2356,7 @@
             <a:fld id="{B61BEF0D-F0BB-DE4B-95CE-6DB70DBA9567}" type="datetimeFigureOut">
               <a:rPr lang="en-US" dirty="0"/>
               <a:pPr/>
-              <a:t>3/31/23</a:t>
+              <a:t>4/1/23</a:t>
             </a:fld>
             <a:endParaRPr lang="en-US" dirty="0"/>
           </a:p>
@@ -2612,7 +2615,7 @@
             <a:fld id="{B61BEF0D-F0BB-DE4B-95CE-6DB70DBA9567}" type="datetimeFigureOut">
               <a:rPr lang="en-US" dirty="0"/>
               <a:pPr/>
-              <a:t>3/31/23</a:t>
+              <a:t>4/1/23</a:t>
             </a:fld>
             <a:endParaRPr lang="en-US" dirty="0"/>
           </a:p>
@@ -2871,7 +2874,7 @@
             <a:fld id="{B61BEF0D-F0BB-DE4B-95CE-6DB70DBA9567}" type="datetimeFigureOut">
               <a:rPr lang="en-US" dirty="0"/>
               <a:pPr/>
-              <a:t>3/31/23</a:t>
+              <a:t>4/1/23</a:t>
             </a:fld>
             <a:endParaRPr lang="en-US" dirty="0"/>
           </a:p>
@@ -3197,7 +3200,7 @@
             <a:fld id="{B61BEF0D-F0BB-DE4B-95CE-6DB70DBA9567}" type="datetimeFigureOut">
               <a:rPr lang="en-US" dirty="0"/>
               <a:pPr/>
-              <a:t>3/31/23</a:t>
+              <a:t>4/1/23</a:t>
             </a:fld>
             <a:endParaRPr lang="en-US" dirty="0"/>
           </a:p>
@@ -3517,7 +3520,7 @@
             <a:fld id="{B61BEF0D-F0BB-DE4B-95CE-6DB70DBA9567}" type="datetimeFigureOut">
               <a:rPr lang="en-US" dirty="0"/>
               <a:pPr/>
-              <a:t>3/31/23</a:t>
+              <a:t>4/1/23</a:t>
             </a:fld>
             <a:endParaRPr lang="en-US" dirty="0"/>
           </a:p>
@@ -3971,7 +3974,7 @@
             <a:fld id="{B61BEF0D-F0BB-DE4B-95CE-6DB70DBA9567}" type="datetimeFigureOut">
               <a:rPr lang="en-US" dirty="0"/>
               <a:pPr/>
-              <a:t>3/31/23</a:t>
+              <a:t>4/1/23</a:t>
             </a:fld>
             <a:endParaRPr lang="en-US" dirty="0"/>
           </a:p>
@@ -4173,7 +4176,7 @@
             <a:fld id="{B61BEF0D-F0BB-DE4B-95CE-6DB70DBA9567}" type="datetimeFigureOut">
               <a:rPr lang="en-US" dirty="0"/>
               <a:pPr/>
-              <a:t>3/31/23</a:t>
+              <a:t>4/1/23</a:t>
             </a:fld>
             <a:endParaRPr lang="en-US" dirty="0"/>
           </a:p>
@@ -4347,7 +4350,7 @@
             <a:fld id="{B61BEF0D-F0BB-DE4B-95CE-6DB70DBA9567}" type="datetimeFigureOut">
               <a:rPr lang="en-US" dirty="0"/>
               <a:pPr/>
-              <a:t>3/31/23</a:t>
+              <a:t>4/1/23</a:t>
             </a:fld>
             <a:endParaRPr lang="en-US" dirty="0"/>
           </a:p>
@@ -4677,7 +4680,7 @@
             <a:fld id="{B61BEF0D-F0BB-DE4B-95CE-6DB70DBA9567}" type="datetimeFigureOut">
               <a:rPr lang="en-US" dirty="0"/>
               <a:pPr/>
-              <a:t>3/31/23</a:t>
+              <a:t>4/1/23</a:t>
             </a:fld>
             <a:endParaRPr lang="en-US" dirty="0"/>
           </a:p>
@@ -5019,7 +5022,7 @@
             <a:fld id="{B61BEF0D-F0BB-DE4B-95CE-6DB70DBA9567}" type="datetimeFigureOut">
               <a:rPr lang="en-US" dirty="0"/>
               <a:pPr/>
-              <a:t>3/31/23</a:t>
+              <a:t>4/1/23</a:t>
             </a:fld>
             <a:endParaRPr lang="en-US" dirty="0"/>
           </a:p>
@@ -7133,7 +7136,7 @@
             <a:fld id="{B61BEF0D-F0BB-DE4B-95CE-6DB70DBA9567}" type="datetimeFigureOut">
               <a:rPr lang="en-US" dirty="0"/>
               <a:pPr/>
-              <a:t>3/31/23</a:t>
+              <a:t>4/1/23</a:t>
             </a:fld>
             <a:endParaRPr lang="en-US" dirty="0"/>
           </a:p>
@@ -8940,7 +8943,7 @@
         <p:spPr/>
         <p:txBody>
           <a:bodyPr>
-            <a:normAutofit fontScale="92500"/>
+            <a:normAutofit lnSpcReduction="10000"/>
           </a:bodyPr>
           <a:lstStyle/>
           <a:p>
@@ -11645,7 +11648,7 @@
             </a:r>
             <a:r>
               <a:rPr kumimoji="1" lang="en-US" altLang="zh-CN" dirty="0"/>
-              <a:t>)+</a:t>
+              <a:t>) + </a:t>
             </a:r>
             <a:r>
               <a:rPr kumimoji="1" lang="zh-CN" altLang="en-US" dirty="0"/>
@@ -11685,7 +11688,7 @@
             </a:r>
             <a:r>
               <a:rPr kumimoji="1" lang="en-US" altLang="zh-CN" dirty="0"/>
-              <a:t>+</a:t>
+              <a:t>+ </a:t>
             </a:r>
             <a:r>
               <a:rPr kumimoji="1" lang="zh-CN" altLang="en-US" dirty="0"/>
@@ -12198,8 +12201,8 @@
         </p:nvSpPr>
         <p:spPr>
           <a:xfrm>
-            <a:off x="2589212" y="1580322"/>
-            <a:ext cx="8915400" cy="4330900"/>
+            <a:off x="2589212" y="1600200"/>
+            <a:ext cx="9005380" cy="4311022"/>
           </a:xfrm>
         </p:spPr>
         <p:txBody>
@@ -12209,36 +12212,26 @@
           <a:lstStyle/>
           <a:p>
             <a:r>
-              <a:rPr kumimoji="1" lang="en" altLang="zh-CN" dirty="0"/>
-              <a:t>InUse: 1</a:t>
-            </a:r>
-            <a:r>
-              <a:rPr kumimoji="1" lang="zh-CN" altLang="en-US" dirty="0"/>
-              <a:t>字节</a:t>
-            </a:r>
-            <a:r>
-              <a:rPr kumimoji="1" lang="zh-CN" altLang="en-US"/>
-              <a:t>，代表关系是否</a:t>
-            </a:r>
-            <a:r>
-              <a:rPr kumimoji="1" lang="zh-CN" altLang="en-US" dirty="0"/>
-              <a:t>在使用，</a:t>
-            </a:r>
-            <a:r>
-              <a:rPr kumimoji="1" lang="en-US" altLang="zh-CN" dirty="0"/>
-              <a:t>1</a:t>
-            </a:r>
-            <a:r>
-              <a:rPr kumimoji="1" lang="zh-CN" altLang="en-US" dirty="0"/>
-              <a:t>代表使用中，</a:t>
-            </a:r>
-            <a:r>
-              <a:rPr kumimoji="1" lang="en-US" altLang="zh-CN" dirty="0"/>
-              <a:t>0</a:t>
-            </a:r>
-            <a:r>
-              <a:rPr kumimoji="1" lang="zh-CN" altLang="en-US" dirty="0"/>
-              <a:t>代表被删除</a:t>
+              <a:rPr lang="zh-CN" altLang="en-US" dirty="0"/>
+              <a:t>关系结构为固定长度</a:t>
+            </a:r>
+            <a:r>
+              <a:rPr lang="en-US" altLang="zh-CN" dirty="0"/>
+              <a:t>34byte</a:t>
+            </a:r>
+          </a:p>
+          <a:p>
+            <a:r>
+              <a:rPr kumimoji="1" lang="zh-CN" altLang="en-US" sz="1800" dirty="0"/>
+              <a:t>代码</a:t>
+            </a:r>
+            <a:r>
+              <a:rPr kumimoji="1" lang="zh-CN" altLang="en-US" dirty="0"/>
+              <a:t>在</a:t>
+            </a:r>
+            <a:r>
+              <a:rPr kumimoji="1" lang="en-US" altLang="zh-CN" sz="1800" dirty="0"/>
+              <a:t>org.neo4j.kernel.impl.store.format.standard.RelationshipRecordFormat</a:t>
             </a:r>
           </a:p>
           <a:p>
@@ -12271,8 +12264,38 @@
         </p:blipFill>
         <p:spPr>
           <a:xfrm>
-            <a:off x="3066290" y="4480643"/>
+            <a:off x="2589212" y="4450160"/>
             <a:ext cx="7280345" cy="2260848"/>
+          </a:xfrm>
+          <a:prstGeom prst="rect">
+            <a:avLst/>
+          </a:prstGeom>
+        </p:spPr>
+      </p:pic>
+      <p:pic>
+        <p:nvPicPr>
+          <p:cNvPr id="3" name="图片 2">
+            <a:extLst>
+              <a:ext uri="{FF2B5EF4-FFF2-40B4-BE49-F238E27FC236}">
+                <a16:creationId xmlns:a16="http://schemas.microsoft.com/office/drawing/2014/main" id="{B7578AE8-9E30-3D49-ABF2-F9B0FB0177AC}"/>
+              </a:ext>
+            </a:extLst>
+          </p:cNvPr>
+          <p:cNvPicPr>
+            <a:picLocks noChangeAspect="1"/>
+          </p:cNvPicPr>
+          <p:nvPr/>
+        </p:nvPicPr>
+        <p:blipFill>
+          <a:blip r:embed="rId3"/>
+          <a:stretch>
+            <a:fillRect/>
+          </a:stretch>
+        </p:blipFill>
+        <p:spPr>
+          <a:xfrm>
+            <a:off x="2589212" y="2546350"/>
+            <a:ext cx="8686800" cy="1765300"/>
           </a:xfrm>
           <a:prstGeom prst="rect">
             <a:avLst/>
@@ -12314,7 +12337,7 @@
           <p:cNvPr id="2" name="标题 1">
             <a:extLst>
               <a:ext uri="{FF2B5EF4-FFF2-40B4-BE49-F238E27FC236}">
-                <a16:creationId xmlns:a16="http://schemas.microsoft.com/office/drawing/2014/main" id="{BA97E35E-627E-EF40-8FB8-1FB6E1A64B63}"/>
+                <a16:creationId xmlns:a16="http://schemas.microsoft.com/office/drawing/2014/main" id="{64AA338F-5E28-8645-9FBA-8CE398797205}"/>
               </a:ext>
             </a:extLst>
           </p:cNvPr>
@@ -12336,17 +12359,25 @@
             </a:r>
             <a:r>
               <a:rPr kumimoji="1" lang="zh-CN" altLang="en-US" dirty="0"/>
-              <a:t>集群</a:t>
+              <a:t>底层存储结构</a:t>
+            </a:r>
+            <a:r>
+              <a:rPr kumimoji="1" lang="en-US" altLang="zh-CN" dirty="0"/>
+              <a:t>-</a:t>
+            </a:r>
+            <a:r>
+              <a:rPr kumimoji="1" lang="zh-CN" altLang="en-US" dirty="0"/>
+              <a:t>关系</a:t>
             </a:r>
           </a:p>
         </p:txBody>
       </p:sp>
       <p:sp>
         <p:nvSpPr>
-          <p:cNvPr id="3" name="内容占位符 2">
+          <p:cNvPr id="4" name="内容占位符 3">
             <a:extLst>
               <a:ext uri="{FF2B5EF4-FFF2-40B4-BE49-F238E27FC236}">
-                <a16:creationId xmlns:a16="http://schemas.microsoft.com/office/drawing/2014/main" id="{FDEB43B0-99BE-2942-94CE-82F7E461D492}"/>
+                <a16:creationId xmlns:a16="http://schemas.microsoft.com/office/drawing/2014/main" id="{47CFA6BC-9496-6643-A056-F7357D391627}"/>
               </a:ext>
             </a:extLst>
           </p:cNvPr>
@@ -12357,19 +12388,603 @@
             <p:ph idx="1"/>
           </p:nvPr>
         </p:nvSpPr>
-        <p:spPr/>
+        <p:spPr>
+          <a:xfrm>
+            <a:off x="2589212" y="1580322"/>
+            <a:ext cx="8915400" cy="4330900"/>
+          </a:xfrm>
+        </p:spPr>
         <p:txBody>
-          <a:bodyPr/>
+          <a:bodyPr>
+            <a:normAutofit/>
+          </a:bodyPr>
           <a:lstStyle/>
           <a:p>
+            <a:r>
+              <a:rPr kumimoji="1" lang="zh-CN" altLang="en-US" sz="1400" dirty="0"/>
+              <a:t>第</a:t>
+            </a:r>
+            <a:r>
+              <a:rPr kumimoji="1" lang="en-US" altLang="zh-CN" sz="1400" dirty="0"/>
+              <a:t>1</a:t>
+            </a:r>
+            <a:r>
+              <a:rPr kumimoji="1" lang="zh-CN" altLang="en-US" sz="1400" dirty="0"/>
+              <a:t>个字节存储</a:t>
+            </a:r>
+            <a:r>
+              <a:rPr kumimoji="1" lang="en-US" altLang="zh-CN" sz="1400" dirty="0"/>
+              <a:t>in_use(</a:t>
+            </a:r>
+            <a:r>
+              <a:rPr kumimoji="1" lang="zh-CN" altLang="en-US" sz="1400" dirty="0"/>
+              <a:t>关系是否在使用，</a:t>
+            </a:r>
+            <a:r>
+              <a:rPr kumimoji="1" lang="en-US" altLang="zh-CN" sz="1400" dirty="0"/>
+              <a:t>1</a:t>
+            </a:r>
+            <a:r>
+              <a:rPr kumimoji="1" lang="zh-CN" altLang="en-US" sz="1400" dirty="0"/>
+              <a:t>代表使用中，</a:t>
+            </a:r>
+            <a:r>
+              <a:rPr kumimoji="1" lang="en-US" altLang="zh-CN" sz="1400" dirty="0"/>
+              <a:t>0</a:t>
+            </a:r>
+            <a:r>
+              <a:rPr kumimoji="1" lang="zh-CN" altLang="en-US" sz="1400" dirty="0"/>
+              <a:t>代表被删除</a:t>
+            </a:r>
+            <a:r>
+              <a:rPr kumimoji="1" lang="en-US" altLang="zh-CN" sz="1400" dirty="0"/>
+              <a:t>) + </a:t>
+            </a:r>
+            <a:r>
+              <a:rPr kumimoji="1" lang="zh-CN" altLang="en-US" sz="1400" dirty="0"/>
+              <a:t>关系起始节点的</a:t>
+            </a:r>
+            <a:r>
+              <a:rPr kumimoji="1" lang="en-US" altLang="zh-CN" sz="1400" dirty="0"/>
+              <a:t>3</a:t>
+            </a:r>
+            <a:r>
+              <a:rPr kumimoji="1" lang="zh-CN" altLang="en-US" sz="1400" dirty="0"/>
+              <a:t>位高位信息（第</a:t>
+            </a:r>
+            <a:r>
+              <a:rPr kumimoji="1" lang="en-US" altLang="zh-CN" sz="1400" dirty="0"/>
+              <a:t>33</a:t>
+            </a:r>
+            <a:r>
+              <a:rPr kumimoji="1" lang="zh-CN" altLang="en-US" sz="1400" dirty="0"/>
+              <a:t>位到</a:t>
+            </a:r>
+            <a:r>
+              <a:rPr kumimoji="1" lang="en-US" altLang="zh-CN" sz="1400" dirty="0"/>
+              <a:t>35</a:t>
+            </a:r>
+            <a:r>
+              <a:rPr kumimoji="1" lang="zh-CN" altLang="en-US" sz="1400" dirty="0"/>
+              <a:t>位）</a:t>
+            </a:r>
+            <a:r>
+              <a:rPr kumimoji="1" lang="en-US" altLang="zh-CN" sz="1400" dirty="0"/>
+              <a:t>+ </a:t>
+            </a:r>
+            <a:r>
+              <a:rPr kumimoji="1" lang="zh-CN" altLang="en-US" sz="1400" dirty="0"/>
+              <a:t>第</a:t>
+            </a:r>
+            <a:r>
+              <a:rPr kumimoji="1" lang="en-US" altLang="zh-CN" sz="1400" dirty="0"/>
+              <a:t>1</a:t>
+            </a:r>
+            <a:r>
+              <a:rPr kumimoji="1" lang="zh-CN" altLang="en-US" sz="1400" dirty="0"/>
+              <a:t>个属性的</a:t>
+            </a:r>
+            <a:r>
+              <a:rPr kumimoji="1" lang="en-US" altLang="zh-CN" sz="1400" dirty="0"/>
+              <a:t>4</a:t>
+            </a:r>
+            <a:r>
+              <a:rPr kumimoji="1" lang="zh-CN" altLang="en-US" sz="1400" dirty="0"/>
+              <a:t>位高位信息（第</a:t>
+            </a:r>
+            <a:r>
+              <a:rPr kumimoji="1" lang="en-US" altLang="zh-CN" sz="1400" dirty="0"/>
+              <a:t>33</a:t>
+            </a:r>
+            <a:r>
+              <a:rPr kumimoji="1" lang="zh-CN" altLang="en-US" sz="1400" dirty="0"/>
+              <a:t>位到</a:t>
+            </a:r>
+            <a:r>
+              <a:rPr kumimoji="1" lang="en-US" altLang="zh-CN" sz="1400" dirty="0"/>
+              <a:t>36</a:t>
+            </a:r>
+            <a:r>
+              <a:rPr kumimoji="1" lang="zh-CN" altLang="en-US" sz="1400" dirty="0"/>
+              <a:t>位），可以看出</a:t>
+            </a:r>
+            <a:r>
+              <a:rPr kumimoji="1" lang="en-US" altLang="zh-CN" sz="1400" dirty="0"/>
+              <a:t>Neo4j</a:t>
+            </a:r>
+            <a:r>
+              <a:rPr kumimoji="1" lang="zh-CN" altLang="en-US" sz="1400" dirty="0"/>
+              <a:t>使用</a:t>
+            </a:r>
+            <a:r>
+              <a:rPr kumimoji="1" lang="en-US" altLang="zh-CN" sz="1400" dirty="0"/>
+              <a:t>35</a:t>
+            </a:r>
+            <a:r>
+              <a:rPr kumimoji="1" lang="zh-CN" altLang="en-US" sz="1400" dirty="0"/>
+              <a:t>位保存节点</a:t>
+            </a:r>
+            <a:r>
+              <a:rPr kumimoji="1" lang="en-US" altLang="zh-CN" sz="1400" dirty="0"/>
+              <a:t>id</a:t>
+            </a:r>
+            <a:r>
+              <a:rPr kumimoji="1" lang="zh-CN" altLang="en-US" sz="1400" dirty="0"/>
+              <a:t>。</a:t>
+            </a:r>
+            <a:br>
+              <a:rPr kumimoji="1" lang="en-US" altLang="zh-CN" sz="1400" dirty="0"/>
+            </a:br>
+            <a:r>
+              <a:rPr lang="en-US" altLang="zh-CN" sz="1400" dirty="0"/>
+              <a:t>2^35 = 34,359,738,368</a:t>
+            </a:r>
+            <a:br>
+              <a:rPr lang="en-US" altLang="zh-CN" sz="1400" dirty="0"/>
+            </a:br>
+            <a:r>
+              <a:rPr lang="zh-CN" altLang="en-US" sz="1400" dirty="0"/>
+              <a:t>可以推导出</a:t>
+            </a:r>
+            <a:r>
+              <a:rPr lang="en-US" altLang="zh-CN" sz="1400" dirty="0"/>
+              <a:t>Neo4j</a:t>
+            </a:r>
+            <a:r>
+              <a:rPr lang="zh-CN" altLang="en-US" sz="1400" dirty="0"/>
+              <a:t>社区版最大支持</a:t>
+            </a:r>
+            <a:r>
+              <a:rPr lang="en-US" altLang="zh-CN" sz="1400" dirty="0"/>
+              <a:t>340</a:t>
+            </a:r>
+            <a:r>
+              <a:rPr lang="zh-CN" altLang="en-US" sz="1400" dirty="0"/>
+              <a:t>亿的节点。</a:t>
+            </a:r>
+            <a:endParaRPr lang="en-US" altLang="zh-CN" sz="1400" dirty="0"/>
+          </a:p>
+          <a:p>
+            <a:r>
+              <a:rPr kumimoji="1" lang="zh-CN" altLang="en-US" sz="1400" dirty="0"/>
+              <a:t>第</a:t>
+            </a:r>
+            <a:r>
+              <a:rPr kumimoji="1" lang="en-US" altLang="zh-CN" sz="1400" dirty="0"/>
+              <a:t>2</a:t>
+            </a:r>
+            <a:r>
+              <a:rPr kumimoji="1" lang="zh-CN" altLang="en-US" sz="1400" dirty="0"/>
+              <a:t>到</a:t>
+            </a:r>
+            <a:r>
+              <a:rPr kumimoji="1" lang="en-US" altLang="zh-CN" sz="1400" dirty="0"/>
+              <a:t>5</a:t>
+            </a:r>
+            <a:r>
+              <a:rPr kumimoji="1" lang="zh-CN" altLang="en-US" sz="1400" dirty="0"/>
+              <a:t>共</a:t>
+            </a:r>
+            <a:r>
+              <a:rPr kumimoji="1" lang="en-US" altLang="zh-CN" sz="1400" dirty="0"/>
+              <a:t>4</a:t>
+            </a:r>
+            <a:r>
+              <a:rPr kumimoji="1" lang="zh-CN" altLang="en-US" sz="1400" dirty="0"/>
+              <a:t>个字节，代表</a:t>
+            </a:r>
+            <a:r>
+              <a:rPr kumimoji="1" lang="en-US" altLang="zh-CN" sz="1400" dirty="0"/>
+              <a:t>FirstNode</a:t>
+            </a:r>
+            <a:r>
+              <a:rPr kumimoji="1" lang="zh-CN" altLang="en-US" sz="1400" dirty="0"/>
+              <a:t>，关系的起点</a:t>
+            </a:r>
+            <a:endParaRPr kumimoji="1" lang="en-US" altLang="zh-CN" sz="1400" dirty="0"/>
+          </a:p>
+          <a:p>
+            <a:r>
+              <a:rPr kumimoji="1" lang="zh-CN" altLang="en-US" sz="1400" dirty="0"/>
+              <a:t>第</a:t>
+            </a:r>
+            <a:r>
+              <a:rPr kumimoji="1" lang="en-US" altLang="zh-CN" sz="1400" dirty="0"/>
+              <a:t>6</a:t>
+            </a:r>
+            <a:r>
+              <a:rPr kumimoji="1" lang="zh-CN" altLang="en-US" sz="1400" dirty="0"/>
+              <a:t>到</a:t>
+            </a:r>
+            <a:r>
+              <a:rPr kumimoji="1" lang="en-US" altLang="zh-CN" sz="1400" dirty="0"/>
+              <a:t>9</a:t>
+            </a:r>
+            <a:r>
+              <a:rPr kumimoji="1" lang="zh-CN" altLang="en-US" sz="1400" dirty="0"/>
+              <a:t>共</a:t>
+            </a:r>
+            <a:r>
+              <a:rPr kumimoji="1" lang="en-US" altLang="zh-CN" sz="1400" dirty="0"/>
+              <a:t>4</a:t>
+            </a:r>
+            <a:r>
+              <a:rPr kumimoji="1" lang="zh-CN" altLang="en-US" sz="1400" dirty="0"/>
+              <a:t>个字节，代表</a:t>
+            </a:r>
+            <a:r>
+              <a:rPr kumimoji="1" lang="en-US" altLang="zh-CN" sz="1400" dirty="0"/>
+              <a:t>SecondNode </a:t>
+            </a:r>
+            <a:r>
+              <a:rPr kumimoji="1" lang="zh-CN" altLang="en-US" sz="1400" dirty="0"/>
+              <a:t>，关系的终点</a:t>
+            </a:r>
+            <a:endParaRPr kumimoji="1" lang="en-US" altLang="zh-CN" sz="1400" dirty="0"/>
+          </a:p>
+          <a:p>
+            <a:r>
+              <a:rPr kumimoji="1" lang="zh-CN" altLang="en-US" sz="1400" dirty="0"/>
+              <a:t>第</a:t>
+            </a:r>
+            <a:r>
+              <a:rPr kumimoji="1" lang="en-US" altLang="zh-CN" sz="1400" dirty="0"/>
+              <a:t>10</a:t>
+            </a:r>
+            <a:r>
+              <a:rPr kumimoji="1" lang="zh-CN" altLang="en-US" sz="1400" dirty="0"/>
+              <a:t>到</a:t>
+            </a:r>
+            <a:r>
+              <a:rPr kumimoji="1" lang="en-US" altLang="zh-CN" sz="1400" dirty="0"/>
+              <a:t>13</a:t>
+            </a:r>
+            <a:r>
+              <a:rPr kumimoji="1" lang="zh-CN" altLang="en-US" sz="1400" dirty="0"/>
+              <a:t>共</a:t>
+            </a:r>
+            <a:r>
+              <a:rPr kumimoji="1" lang="en-US" altLang="zh-CN" sz="1400" dirty="0"/>
+              <a:t>4</a:t>
+            </a:r>
+            <a:r>
+              <a:rPr kumimoji="1" lang="zh-CN" altLang="en-US" sz="1400" dirty="0"/>
+              <a:t>个字节，代表</a:t>
+            </a:r>
+            <a:r>
+              <a:rPr kumimoji="1" lang="en-US" altLang="zh-CN" sz="1400" dirty="0"/>
+              <a:t>RelType</a:t>
+            </a:r>
+            <a:r>
+              <a:rPr kumimoji="1" lang="zh-CN" altLang="en-US" sz="1400" dirty="0"/>
+              <a:t>，关系类型</a:t>
+            </a:r>
+            <a:r>
+              <a:rPr kumimoji="1" lang="en-US" altLang="zh-CN" sz="1400" dirty="0"/>
+              <a:t> + </a:t>
+            </a:r>
+            <a:r>
+              <a:rPr kumimoji="1" lang="zh-CN" altLang="en-US" sz="1400" dirty="0"/>
+              <a:t>关系终点的</a:t>
+            </a:r>
+            <a:r>
+              <a:rPr kumimoji="1" lang="en-US" altLang="zh-CN" sz="1400" dirty="0"/>
+              <a:t>3</a:t>
+            </a:r>
+            <a:r>
+              <a:rPr kumimoji="1" lang="zh-CN" altLang="en-US" sz="1400" dirty="0"/>
+              <a:t>位</a:t>
+            </a:r>
+            <a:r>
+              <a:rPr kumimoji="1" lang="en-US" altLang="zh-CN" sz="1400" dirty="0"/>
+              <a:t>msb + </a:t>
+            </a:r>
+            <a:r>
+              <a:rPr kumimoji="1" lang="zh-CN" altLang="en-US" sz="1400" dirty="0"/>
+              <a:t>起点上一个关系的</a:t>
+            </a:r>
+            <a:r>
+              <a:rPr kumimoji="1" lang="en-US" altLang="zh-CN" sz="1400" dirty="0"/>
+              <a:t>3</a:t>
+            </a:r>
+            <a:r>
+              <a:rPr kumimoji="1" lang="zh-CN" altLang="en-US" sz="1400" dirty="0"/>
+              <a:t>位</a:t>
+            </a:r>
+            <a:r>
+              <a:rPr kumimoji="1" lang="en-US" altLang="zh-CN" sz="1400" dirty="0"/>
+              <a:t>msb + </a:t>
+            </a:r>
+            <a:r>
+              <a:rPr kumimoji="1" lang="zh-CN" altLang="en-US" sz="1400" dirty="0"/>
+              <a:t>起点下一个关系的</a:t>
+            </a:r>
+            <a:r>
+              <a:rPr kumimoji="1" lang="en-US" altLang="zh-CN" sz="1400" dirty="0"/>
+              <a:t>3</a:t>
+            </a:r>
+            <a:r>
+              <a:rPr kumimoji="1" lang="zh-CN" altLang="en-US" sz="1400" dirty="0"/>
+              <a:t>位</a:t>
+            </a:r>
+            <a:r>
+              <a:rPr kumimoji="1" lang="en-US" altLang="zh-CN" sz="1400" dirty="0"/>
+              <a:t>msb</a:t>
+            </a:r>
+            <a:r>
+              <a:rPr kumimoji="1" lang="zh-CN" altLang="en-US" sz="1400" dirty="0"/>
+              <a:t> </a:t>
+            </a:r>
+            <a:r>
+              <a:rPr kumimoji="1" lang="en-US" altLang="zh-CN" sz="1400" dirty="0"/>
+              <a:t>+</a:t>
+            </a:r>
+            <a:r>
+              <a:rPr kumimoji="1" lang="zh-CN" altLang="en-US" sz="1400" dirty="0"/>
+              <a:t> 终点上一个关系的</a:t>
+            </a:r>
+            <a:r>
+              <a:rPr kumimoji="1" lang="en-US" altLang="zh-CN" sz="1400" dirty="0"/>
+              <a:t>3</a:t>
+            </a:r>
+            <a:r>
+              <a:rPr kumimoji="1" lang="zh-CN" altLang="en-US" sz="1400" dirty="0"/>
+              <a:t>位</a:t>
+            </a:r>
+            <a:r>
+              <a:rPr kumimoji="1" lang="en-US" altLang="zh-CN" sz="1400" dirty="0"/>
+              <a:t>msb</a:t>
+            </a:r>
+            <a:r>
+              <a:rPr kumimoji="1" lang="zh-CN" altLang="en-US" sz="1400" dirty="0"/>
+              <a:t> </a:t>
+            </a:r>
+            <a:r>
+              <a:rPr kumimoji="1" lang="en-US" altLang="zh-CN" sz="1400" dirty="0"/>
+              <a:t>+</a:t>
+            </a:r>
+            <a:r>
+              <a:rPr kumimoji="1" lang="zh-CN" altLang="en-US" sz="1400" dirty="0"/>
+              <a:t> 终点下一个关系的</a:t>
+            </a:r>
+            <a:r>
+              <a:rPr kumimoji="1" lang="en-US" altLang="zh-CN" sz="1400" dirty="0"/>
+              <a:t>3</a:t>
+            </a:r>
+            <a:r>
+              <a:rPr kumimoji="1" lang="zh-CN" altLang="en-US" sz="1400" dirty="0"/>
+              <a:t>位</a:t>
+            </a:r>
+            <a:r>
+              <a:rPr kumimoji="1" lang="en-US" altLang="zh-CN" sz="1400" dirty="0"/>
+              <a:t>msb</a:t>
+            </a:r>
+            <a:r>
+              <a:rPr kumimoji="1" lang="zh-CN" altLang="en-US" sz="1400" dirty="0"/>
+              <a:t>。</a:t>
+            </a:r>
+            <a:endParaRPr kumimoji="1" lang="en-US" altLang="zh-CN" sz="1400" dirty="0"/>
+          </a:p>
+          <a:p>
+            <a:r>
+              <a:rPr kumimoji="1" lang="zh-CN" altLang="en-US" sz="1400" dirty="0"/>
+              <a:t>第</a:t>
+            </a:r>
+            <a:r>
+              <a:rPr kumimoji="1" lang="en-US" altLang="zh-CN" sz="1400" dirty="0"/>
+              <a:t>14</a:t>
+            </a:r>
+            <a:r>
+              <a:rPr kumimoji="1" lang="zh-CN" altLang="en-US" sz="1400" dirty="0"/>
+              <a:t>到</a:t>
+            </a:r>
+            <a:r>
+              <a:rPr kumimoji="1" lang="en-US" altLang="zh-CN" sz="1400" dirty="0"/>
+              <a:t>17</a:t>
+            </a:r>
+            <a:r>
+              <a:rPr kumimoji="1" lang="zh-CN" altLang="en-US" sz="1400" dirty="0"/>
+              <a:t>共</a:t>
+            </a:r>
+            <a:r>
+              <a:rPr kumimoji="1" lang="en-US" altLang="zh-CN" sz="1400" dirty="0"/>
+              <a:t>4</a:t>
+            </a:r>
+            <a:r>
+              <a:rPr kumimoji="1" lang="zh-CN" altLang="en-US" sz="1400" dirty="0"/>
+              <a:t>个字节，代表</a:t>
+            </a:r>
+            <a:r>
+              <a:rPr kumimoji="1" lang="en-US" altLang="zh-CN" sz="1400" dirty="0"/>
+              <a:t>FirstPrevRelId</a:t>
+            </a:r>
+            <a:r>
+              <a:rPr kumimoji="1" lang="zh-CN" altLang="en-US" sz="1400" dirty="0"/>
+              <a:t>，关系起点的上一个关系</a:t>
+            </a:r>
+            <a:r>
+              <a:rPr kumimoji="1" lang="en-US" altLang="zh-CN" sz="1400" dirty="0"/>
+              <a:t>id</a:t>
+            </a:r>
+            <a:r>
+              <a:rPr kumimoji="1" lang="zh-CN" altLang="en-US" sz="1400" dirty="0"/>
+              <a:t>（</a:t>
+            </a:r>
+            <a:r>
+              <a:rPr kumimoji="1" lang="en-US" altLang="zh-CN" sz="1400" dirty="0"/>
+              <a:t>-1</a:t>
+            </a:r>
+            <a:r>
+              <a:rPr kumimoji="1" lang="zh-CN" altLang="en-US" sz="1400" dirty="0"/>
+              <a:t>表示没有）</a:t>
+            </a:r>
+            <a:endParaRPr kumimoji="1" lang="en-US" altLang="zh-CN" sz="1400" dirty="0"/>
+          </a:p>
+          <a:p>
+            <a:r>
+              <a:rPr kumimoji="1" lang="zh-CN" altLang="en-US" sz="1400" dirty="0"/>
+              <a:t>第</a:t>
+            </a:r>
+            <a:r>
+              <a:rPr kumimoji="1" lang="en-US" altLang="zh-CN" sz="1400" dirty="0"/>
+              <a:t>18</a:t>
+            </a:r>
+            <a:r>
+              <a:rPr kumimoji="1" lang="zh-CN" altLang="en-US" sz="1400" dirty="0"/>
+              <a:t>到</a:t>
+            </a:r>
+            <a:r>
+              <a:rPr kumimoji="1" lang="en-US" altLang="zh-CN" sz="1400" dirty="0"/>
+              <a:t>21</a:t>
+            </a:r>
+            <a:r>
+              <a:rPr kumimoji="1" lang="zh-CN" altLang="en-US" sz="1400" dirty="0"/>
+              <a:t>共</a:t>
+            </a:r>
+            <a:r>
+              <a:rPr kumimoji="1" lang="en-US" altLang="zh-CN" sz="1400" dirty="0"/>
+              <a:t>4</a:t>
+            </a:r>
+            <a:r>
+              <a:rPr kumimoji="1" lang="zh-CN" altLang="en-US" sz="1400" dirty="0"/>
+              <a:t>个字节，代表</a:t>
+            </a:r>
+            <a:r>
+              <a:rPr kumimoji="1" lang="en-US" altLang="zh-CN" sz="1400" dirty="0"/>
+              <a:t>FirstNextRelId</a:t>
+            </a:r>
+            <a:r>
+              <a:rPr kumimoji="1" lang="zh-CN" altLang="en-US" sz="1400" dirty="0"/>
+              <a:t>，关系起点的下一个关系</a:t>
+            </a:r>
+            <a:r>
+              <a:rPr kumimoji="1" lang="en-US" altLang="zh-CN" sz="1400" dirty="0"/>
+              <a:t>id</a:t>
+            </a:r>
+            <a:r>
+              <a:rPr kumimoji="1" lang="zh-CN" altLang="en-US" sz="1400" dirty="0"/>
+              <a:t>（</a:t>
+            </a:r>
+            <a:r>
+              <a:rPr kumimoji="1" lang="en-US" altLang="zh-CN" sz="1400" dirty="0"/>
+              <a:t>-1</a:t>
+            </a:r>
+            <a:r>
+              <a:rPr kumimoji="1" lang="zh-CN" altLang="en-US" sz="1400" dirty="0"/>
+              <a:t>表示没有）</a:t>
+            </a:r>
+            <a:endParaRPr kumimoji="1" lang="en-US" altLang="zh-CN" sz="1400" dirty="0"/>
+          </a:p>
+          <a:p>
+            <a:endParaRPr kumimoji="1" lang="en-US" altLang="zh-CN" sz="1400" dirty="0"/>
+          </a:p>
+          <a:p>
+            <a:endParaRPr kumimoji="1" lang="en-US" altLang="zh-CN" sz="1400" dirty="0"/>
+          </a:p>
+          <a:p>
+            <a:endParaRPr kumimoji="1" lang="en-US" altLang="zh-CN" sz="1800" dirty="0"/>
+          </a:p>
+          <a:p>
+            <a:endParaRPr kumimoji="1" lang="en-US" altLang="zh-CN" sz="1800" dirty="0"/>
+          </a:p>
+          <a:p>
+            <a:endParaRPr kumimoji="1" lang="en-US" altLang="zh-CN" sz="1800" dirty="0"/>
+          </a:p>
+          <a:p>
+            <a:endParaRPr kumimoji="1" lang="en-US" altLang="zh-CN" dirty="0"/>
+          </a:p>
+          <a:p>
+            <a:endParaRPr kumimoji="1" lang="en-US" altLang="zh-CN" dirty="0"/>
+          </a:p>
+          <a:p>
             <a:endParaRPr kumimoji="1" lang="zh-CN" altLang="en-US" dirty="0"/>
           </a:p>
         </p:txBody>
       </p:sp>
+      <p:pic>
+        <p:nvPicPr>
+          <p:cNvPr id="3" name="图片 2">
+            <a:extLst>
+              <a:ext uri="{FF2B5EF4-FFF2-40B4-BE49-F238E27FC236}">
+                <a16:creationId xmlns:a16="http://schemas.microsoft.com/office/drawing/2014/main" id="{CB0F43DE-F940-4142-BD86-30BE076D53D5}"/>
+              </a:ext>
+            </a:extLst>
+          </p:cNvPr>
+          <p:cNvPicPr>
+            <a:picLocks noChangeAspect="1"/>
+          </p:cNvPicPr>
+          <p:nvPr/>
+        </p:nvPicPr>
+        <p:blipFill>
+          <a:blip r:embed="rId2"/>
+          <a:stretch>
+            <a:fillRect/>
+          </a:stretch>
+        </p:blipFill>
+        <p:spPr>
+          <a:xfrm>
+            <a:off x="7888478" y="2166352"/>
+            <a:ext cx="4931410" cy="976866"/>
+          </a:xfrm>
+          <a:prstGeom prst="rect">
+            <a:avLst/>
+          </a:prstGeom>
+        </p:spPr>
+      </p:pic>
+      <p:pic>
+        <p:nvPicPr>
+          <p:cNvPr id="6" name="图片 5">
+            <a:extLst>
+              <a:ext uri="{FF2B5EF4-FFF2-40B4-BE49-F238E27FC236}">
+                <a16:creationId xmlns:a16="http://schemas.microsoft.com/office/drawing/2014/main" id="{509B146E-F61A-E14E-861A-B6BEFF452939}"/>
+              </a:ext>
+            </a:extLst>
+          </p:cNvPr>
+          <p:cNvPicPr>
+            <a:picLocks noChangeAspect="1"/>
+          </p:cNvPicPr>
+          <p:nvPr/>
+        </p:nvPicPr>
+        <p:blipFill>
+          <a:blip r:embed="rId3"/>
+          <a:stretch>
+            <a:fillRect/>
+          </a:stretch>
+        </p:blipFill>
+        <p:spPr>
+          <a:xfrm>
+            <a:off x="2488628" y="4414390"/>
+            <a:ext cx="10046906" cy="1920556"/>
+          </a:xfrm>
+          <a:prstGeom prst="rect">
+            <a:avLst/>
+          </a:prstGeom>
+        </p:spPr>
+      </p:pic>
     </p:spTree>
     <p:extLst>
       <p:ext uri="{BB962C8B-B14F-4D97-AF65-F5344CB8AC3E}">
-        <p14:creationId xmlns:p14="http://schemas.microsoft.com/office/powerpoint/2010/main" val="2155202387"/>
+        <p14:creationId xmlns:p14="http://schemas.microsoft.com/office/powerpoint/2010/main" val="2816724421"/>
       </p:ext>
     </p:extLst>
   </p:cSld>
@@ -12401,6 +13016,531 @@
           <p:cNvPr id="2" name="标题 1">
             <a:extLst>
               <a:ext uri="{FF2B5EF4-FFF2-40B4-BE49-F238E27FC236}">
+                <a16:creationId xmlns:a16="http://schemas.microsoft.com/office/drawing/2014/main" id="{64AA338F-5E28-8645-9FBA-8CE398797205}"/>
+              </a:ext>
+            </a:extLst>
+          </p:cNvPr>
+          <p:cNvSpPr>
+            <a:spLocks noGrp="1"/>
+          </p:cNvSpPr>
+          <p:nvPr>
+            <p:ph type="title"/>
+          </p:nvPr>
+        </p:nvSpPr>
+        <p:spPr/>
+        <p:txBody>
+          <a:bodyPr/>
+          <a:lstStyle/>
+          <a:p>
+            <a:r>
+              <a:rPr kumimoji="1" lang="en-US" altLang="zh-CN" dirty="0"/>
+              <a:t>Neo4j</a:t>
+            </a:r>
+            <a:r>
+              <a:rPr kumimoji="1" lang="zh-CN" altLang="en-US" dirty="0"/>
+              <a:t>底层存储结构</a:t>
+            </a:r>
+            <a:r>
+              <a:rPr kumimoji="1" lang="en-US" altLang="zh-CN" dirty="0"/>
+              <a:t>-</a:t>
+            </a:r>
+            <a:r>
+              <a:rPr kumimoji="1" lang="zh-CN" altLang="en-US" dirty="0"/>
+              <a:t>关系</a:t>
+            </a:r>
+          </a:p>
+        </p:txBody>
+      </p:sp>
+      <p:sp>
+        <p:nvSpPr>
+          <p:cNvPr id="4" name="内容占位符 3">
+            <a:extLst>
+              <a:ext uri="{FF2B5EF4-FFF2-40B4-BE49-F238E27FC236}">
+                <a16:creationId xmlns:a16="http://schemas.microsoft.com/office/drawing/2014/main" id="{47CFA6BC-9496-6643-A056-F7357D391627}"/>
+              </a:ext>
+            </a:extLst>
+          </p:cNvPr>
+          <p:cNvSpPr>
+            <a:spLocks noGrp="1"/>
+          </p:cNvSpPr>
+          <p:nvPr>
+            <p:ph idx="1"/>
+          </p:nvPr>
+        </p:nvSpPr>
+        <p:spPr>
+          <a:xfrm>
+            <a:off x="2589212" y="1580322"/>
+            <a:ext cx="8915400" cy="4330900"/>
+          </a:xfrm>
+        </p:spPr>
+        <p:txBody>
+          <a:bodyPr>
+            <a:normAutofit/>
+          </a:bodyPr>
+          <a:lstStyle/>
+          <a:p>
+            <a:r>
+              <a:rPr kumimoji="1" lang="zh-CN" altLang="en-US" sz="1800" dirty="0"/>
+              <a:t>第</a:t>
+            </a:r>
+            <a:r>
+              <a:rPr kumimoji="1" lang="en-US" altLang="zh-CN" sz="1800" dirty="0"/>
+              <a:t>22</a:t>
+            </a:r>
+            <a:r>
+              <a:rPr kumimoji="1" lang="zh-CN" altLang="en-US" sz="1800" dirty="0"/>
+              <a:t>到</a:t>
+            </a:r>
+            <a:r>
+              <a:rPr kumimoji="1" lang="en-US" altLang="zh-CN" sz="1800" dirty="0"/>
+              <a:t>25</a:t>
+            </a:r>
+            <a:r>
+              <a:rPr kumimoji="1" lang="zh-CN" altLang="en-US" sz="1800" dirty="0"/>
+              <a:t>共</a:t>
+            </a:r>
+            <a:r>
+              <a:rPr kumimoji="1" lang="en-US" altLang="zh-CN" sz="1800" dirty="0"/>
+              <a:t>4</a:t>
+            </a:r>
+            <a:r>
+              <a:rPr kumimoji="1" lang="zh-CN" altLang="en-US" sz="1800" dirty="0"/>
+              <a:t>个字节，代表</a:t>
+            </a:r>
+            <a:r>
+              <a:rPr kumimoji="1" lang="en-US" altLang="zh-CN" dirty="0"/>
+              <a:t>Second</a:t>
+            </a:r>
+            <a:r>
+              <a:rPr kumimoji="1" lang="en-US" altLang="zh-CN" sz="1800" dirty="0"/>
+              <a:t>PrevRelId</a:t>
+            </a:r>
+            <a:r>
+              <a:rPr kumimoji="1" lang="zh-CN" altLang="en-US" sz="1800" dirty="0"/>
+              <a:t>，关系终点的上一个关系</a:t>
+            </a:r>
+            <a:r>
+              <a:rPr kumimoji="1" lang="en-US" altLang="zh-CN" sz="1800" dirty="0"/>
+              <a:t>id</a:t>
+            </a:r>
+            <a:r>
+              <a:rPr kumimoji="1" lang="zh-CN" altLang="en-US" sz="1800" dirty="0"/>
+              <a:t>（</a:t>
+            </a:r>
+            <a:r>
+              <a:rPr kumimoji="1" lang="en-US" altLang="zh-CN" sz="1800" dirty="0"/>
+              <a:t>-1</a:t>
+            </a:r>
+            <a:r>
+              <a:rPr kumimoji="1" lang="zh-CN" altLang="en-US" sz="1800" dirty="0"/>
+              <a:t>表示没有）</a:t>
+            </a:r>
+            <a:endParaRPr kumimoji="1" lang="en-US" altLang="zh-CN" sz="1800" dirty="0"/>
+          </a:p>
+          <a:p>
+            <a:r>
+              <a:rPr kumimoji="1" lang="zh-CN" altLang="en-US" sz="1800" dirty="0"/>
+              <a:t>第</a:t>
+            </a:r>
+            <a:r>
+              <a:rPr kumimoji="1" lang="en-US" altLang="zh-CN" dirty="0"/>
+              <a:t>26</a:t>
+            </a:r>
+            <a:r>
+              <a:rPr kumimoji="1" lang="zh-CN" altLang="en-US" sz="1800" dirty="0"/>
+              <a:t>到</a:t>
+            </a:r>
+            <a:r>
+              <a:rPr kumimoji="1" lang="en-US" altLang="zh-CN" sz="1800" dirty="0"/>
+              <a:t>29</a:t>
+            </a:r>
+            <a:r>
+              <a:rPr kumimoji="1" lang="zh-CN" altLang="en-US" sz="1800" dirty="0"/>
+              <a:t>共</a:t>
+            </a:r>
+            <a:r>
+              <a:rPr kumimoji="1" lang="en-US" altLang="zh-CN" sz="1800" dirty="0"/>
+              <a:t>4</a:t>
+            </a:r>
+            <a:r>
+              <a:rPr kumimoji="1" lang="zh-CN" altLang="en-US" sz="1800" dirty="0"/>
+              <a:t>个字节，代表</a:t>
+            </a:r>
+            <a:r>
+              <a:rPr kumimoji="1" lang="en-US" altLang="zh-CN" dirty="0"/>
+              <a:t>Second</a:t>
+            </a:r>
+            <a:r>
+              <a:rPr kumimoji="1" lang="en-US" altLang="zh-CN" sz="1800" dirty="0"/>
+              <a:t>NextRelId</a:t>
+            </a:r>
+            <a:r>
+              <a:rPr kumimoji="1" lang="zh-CN" altLang="en-US" sz="1800" dirty="0"/>
+              <a:t>，关系终点的下一个关系</a:t>
+            </a:r>
+            <a:r>
+              <a:rPr kumimoji="1" lang="en-US" altLang="zh-CN" sz="1800" dirty="0"/>
+              <a:t>id</a:t>
+            </a:r>
+            <a:r>
+              <a:rPr kumimoji="1" lang="zh-CN" altLang="en-US" sz="1800" dirty="0"/>
+              <a:t>（</a:t>
+            </a:r>
+            <a:r>
+              <a:rPr kumimoji="1" lang="en-US" altLang="zh-CN" sz="1800" dirty="0"/>
+              <a:t>-1</a:t>
+            </a:r>
+            <a:r>
+              <a:rPr kumimoji="1" lang="zh-CN" altLang="en-US" sz="1800" dirty="0"/>
+              <a:t>表示没有）</a:t>
+            </a:r>
+            <a:endParaRPr kumimoji="1" lang="en-US" altLang="zh-CN" sz="1800" dirty="0"/>
+          </a:p>
+          <a:p>
+            <a:r>
+              <a:rPr kumimoji="1" lang="zh-CN" altLang="en-US" sz="1800" dirty="0"/>
+              <a:t>第</a:t>
+            </a:r>
+            <a:r>
+              <a:rPr kumimoji="1" lang="en-US" altLang="zh-CN" sz="1800" dirty="0"/>
+              <a:t>30</a:t>
+            </a:r>
+            <a:r>
+              <a:rPr kumimoji="1" lang="zh-CN" altLang="en-US" sz="1800" dirty="0"/>
+              <a:t>到</a:t>
+            </a:r>
+            <a:r>
+              <a:rPr kumimoji="1" lang="en-US" altLang="zh-CN" dirty="0"/>
+              <a:t>33</a:t>
+            </a:r>
+            <a:r>
+              <a:rPr kumimoji="1" lang="zh-CN" altLang="en-US" sz="1800" dirty="0"/>
+              <a:t>共</a:t>
+            </a:r>
+            <a:r>
+              <a:rPr kumimoji="1" lang="en-US" altLang="zh-CN" sz="1800" dirty="0"/>
+              <a:t>4</a:t>
+            </a:r>
+            <a:r>
+              <a:rPr kumimoji="1" lang="zh-CN" altLang="en-US" sz="1800" dirty="0"/>
+              <a:t>个字节，</a:t>
+            </a:r>
+            <a:r>
+              <a:rPr kumimoji="1" lang="zh-CN" altLang="en-US" dirty="0"/>
+              <a:t>代表</a:t>
+            </a:r>
+            <a:r>
+              <a:rPr kumimoji="1" lang="en-US" altLang="zh-CN" sz="1800" dirty="0"/>
+              <a:t>NextPropId</a:t>
+            </a:r>
+            <a:r>
+              <a:rPr kumimoji="1" lang="zh-CN" altLang="en-US" sz="1800" dirty="0"/>
+              <a:t>，关系的第一个属性</a:t>
+            </a:r>
+            <a:r>
+              <a:rPr kumimoji="1" lang="en-US" altLang="zh-CN" sz="1800" dirty="0"/>
+              <a:t>id</a:t>
+            </a:r>
+            <a:r>
+              <a:rPr kumimoji="1" lang="zh-CN" altLang="en-US" sz="1800" dirty="0"/>
+              <a:t>（</a:t>
+            </a:r>
+            <a:r>
+              <a:rPr kumimoji="1" lang="en-US" altLang="zh-CN" sz="1800" dirty="0"/>
+              <a:t>-1</a:t>
+            </a:r>
+            <a:r>
+              <a:rPr kumimoji="1" lang="zh-CN" altLang="en-US" sz="1800" dirty="0"/>
+              <a:t>表示没有）</a:t>
+            </a:r>
+            <a:endParaRPr kumimoji="1" lang="en-US" altLang="zh-CN" sz="1800" dirty="0"/>
+          </a:p>
+          <a:p>
+            <a:r>
+              <a:rPr kumimoji="1" lang="zh-CN" altLang="en-US" dirty="0"/>
+              <a:t>第</a:t>
+            </a:r>
+            <a:r>
+              <a:rPr kumimoji="1" lang="en-US" altLang="zh-CN" dirty="0"/>
+              <a:t>34</a:t>
+            </a:r>
+            <a:r>
+              <a:rPr kumimoji="1" lang="zh-CN" altLang="en-US" dirty="0"/>
+              <a:t>个字节，代表</a:t>
+            </a:r>
+            <a:r>
+              <a:rPr kumimoji="1" lang="en-US" altLang="zh-CN" sz="1800" dirty="0"/>
+              <a:t>Extra</a:t>
+            </a:r>
+            <a:r>
+              <a:rPr kumimoji="1" lang="zh-CN" altLang="en-US" sz="1800" dirty="0"/>
+              <a:t>，</a:t>
+            </a:r>
+            <a:r>
+              <a:rPr kumimoji="1" lang="zh-CN" altLang="en-US" dirty="0"/>
+              <a:t>关系是不是起点和终点的第一个关系</a:t>
+            </a:r>
+            <a:endParaRPr kumimoji="1" lang="en-US" altLang="zh-CN" dirty="0"/>
+          </a:p>
+        </p:txBody>
+      </p:sp>
+      <p:pic>
+        <p:nvPicPr>
+          <p:cNvPr id="5" name="图片 4">
+            <a:extLst>
+              <a:ext uri="{FF2B5EF4-FFF2-40B4-BE49-F238E27FC236}">
+                <a16:creationId xmlns:a16="http://schemas.microsoft.com/office/drawing/2014/main" id="{30322503-FE50-C24A-9F84-73064BF1F333}"/>
+              </a:ext>
+            </a:extLst>
+          </p:cNvPr>
+          <p:cNvPicPr>
+            <a:picLocks noChangeAspect="1"/>
+          </p:cNvPicPr>
+          <p:nvPr/>
+        </p:nvPicPr>
+        <p:blipFill>
+          <a:blip r:embed="rId2"/>
+          <a:stretch>
+            <a:fillRect/>
+          </a:stretch>
+        </p:blipFill>
+        <p:spPr>
+          <a:xfrm>
+            <a:off x="2857754" y="3745772"/>
+            <a:ext cx="5854700" cy="723900"/>
+          </a:xfrm>
+          <a:prstGeom prst="rect">
+            <a:avLst/>
+          </a:prstGeom>
+        </p:spPr>
+      </p:pic>
+    </p:spTree>
+    <p:extLst>
+      <p:ext uri="{BB962C8B-B14F-4D97-AF65-F5344CB8AC3E}">
+        <p14:creationId xmlns:p14="http://schemas.microsoft.com/office/powerpoint/2010/main" val="3686080125"/>
+      </p:ext>
+    </p:extLst>
+  </p:cSld>
+  <p:clrMapOvr>
+    <a:masterClrMapping/>
+  </p:clrMapOvr>
+</p:sld>
+</file>
+
+<file path=ppt/slides/slide24.xml><?xml version="1.0" encoding="utf-8"?>
+<p:sld xmlns:a="http://schemas.openxmlformats.org/drawingml/2006/main" xmlns:r="http://schemas.openxmlformats.org/officeDocument/2006/relationships" xmlns:p="http://schemas.openxmlformats.org/presentationml/2006/main">
+  <p:cSld>
+    <p:spTree>
+      <p:nvGrpSpPr>
+        <p:cNvPr id="1" name=""/>
+        <p:cNvGrpSpPr/>
+        <p:nvPr/>
+      </p:nvGrpSpPr>
+      <p:grpSpPr>
+        <a:xfrm>
+          <a:off x="0" y="0"/>
+          <a:ext cx="0" cy="0"/>
+          <a:chOff x="0" y="0"/>
+          <a:chExt cx="0" cy="0"/>
+        </a:xfrm>
+      </p:grpSpPr>
+      <p:sp>
+        <p:nvSpPr>
+          <p:cNvPr id="2" name="标题 1">
+            <a:extLst>
+              <a:ext uri="{FF2B5EF4-FFF2-40B4-BE49-F238E27FC236}">
+                <a16:creationId xmlns:a16="http://schemas.microsoft.com/office/drawing/2014/main" id="{64AA338F-5E28-8645-9FBA-8CE398797205}"/>
+              </a:ext>
+            </a:extLst>
+          </p:cNvPr>
+          <p:cNvSpPr>
+            <a:spLocks noGrp="1"/>
+          </p:cNvSpPr>
+          <p:nvPr>
+            <p:ph type="title"/>
+          </p:nvPr>
+        </p:nvSpPr>
+        <p:spPr/>
+        <p:txBody>
+          <a:bodyPr/>
+          <a:lstStyle/>
+          <a:p>
+            <a:r>
+              <a:rPr kumimoji="1" lang="en-US" altLang="zh-CN" dirty="0"/>
+              <a:t>Neo4j</a:t>
+            </a:r>
+            <a:r>
+              <a:rPr kumimoji="1" lang="zh-CN" altLang="en-US" dirty="0"/>
+              <a:t>底层存储结构</a:t>
+            </a:r>
+            <a:r>
+              <a:rPr kumimoji="1" lang="en-US" altLang="zh-CN" dirty="0"/>
+              <a:t>-</a:t>
+            </a:r>
+            <a:r>
+              <a:rPr kumimoji="1" lang="zh-CN" altLang="en-US" dirty="0"/>
+              <a:t>查询</a:t>
+            </a:r>
+          </a:p>
+        </p:txBody>
+      </p:sp>
+      <p:sp>
+        <p:nvSpPr>
+          <p:cNvPr id="4" name="内容占位符 3">
+            <a:extLst>
+              <a:ext uri="{FF2B5EF4-FFF2-40B4-BE49-F238E27FC236}">
+                <a16:creationId xmlns:a16="http://schemas.microsoft.com/office/drawing/2014/main" id="{47CFA6BC-9496-6643-A056-F7357D391627}"/>
+              </a:ext>
+            </a:extLst>
+          </p:cNvPr>
+          <p:cNvSpPr>
+            <a:spLocks noGrp="1"/>
+          </p:cNvSpPr>
+          <p:nvPr>
+            <p:ph idx="1"/>
+          </p:nvPr>
+        </p:nvSpPr>
+        <p:spPr>
+          <a:xfrm>
+            <a:off x="2589212" y="1580322"/>
+            <a:ext cx="8915400" cy="4330900"/>
+          </a:xfrm>
+        </p:spPr>
+        <p:txBody>
+          <a:bodyPr>
+            <a:normAutofit/>
+          </a:bodyPr>
+          <a:lstStyle/>
+          <a:p>
+            <a:endParaRPr kumimoji="1" lang="en" altLang="zh-CN" dirty="0"/>
+          </a:p>
+          <a:p>
+            <a:endParaRPr kumimoji="1" lang="zh-CN" altLang="en-US" dirty="0"/>
+          </a:p>
+        </p:txBody>
+      </p:sp>
+    </p:spTree>
+    <p:extLst>
+      <p:ext uri="{BB962C8B-B14F-4D97-AF65-F5344CB8AC3E}">
+        <p14:creationId xmlns:p14="http://schemas.microsoft.com/office/powerpoint/2010/main" val="3210910862"/>
+      </p:ext>
+    </p:extLst>
+  </p:cSld>
+  <p:clrMapOvr>
+    <a:masterClrMapping/>
+  </p:clrMapOvr>
+</p:sld>
+</file>
+
+<file path=ppt/slides/slide25.xml><?xml version="1.0" encoding="utf-8"?>
+<p:sld xmlns:a="http://schemas.openxmlformats.org/drawingml/2006/main" xmlns:r="http://schemas.openxmlformats.org/officeDocument/2006/relationships" xmlns:p="http://schemas.openxmlformats.org/presentationml/2006/main">
+  <p:cSld>
+    <p:spTree>
+      <p:nvGrpSpPr>
+        <p:cNvPr id="1" name=""/>
+        <p:cNvGrpSpPr/>
+        <p:nvPr/>
+      </p:nvGrpSpPr>
+      <p:grpSpPr>
+        <a:xfrm>
+          <a:off x="0" y="0"/>
+          <a:ext cx="0" cy="0"/>
+          <a:chOff x="0" y="0"/>
+          <a:chExt cx="0" cy="0"/>
+        </a:xfrm>
+      </p:grpSpPr>
+      <p:sp>
+        <p:nvSpPr>
+          <p:cNvPr id="2" name="标题 1">
+            <a:extLst>
+              <a:ext uri="{FF2B5EF4-FFF2-40B4-BE49-F238E27FC236}">
+                <a16:creationId xmlns:a16="http://schemas.microsoft.com/office/drawing/2014/main" id="{BA97E35E-627E-EF40-8FB8-1FB6E1A64B63}"/>
+              </a:ext>
+            </a:extLst>
+          </p:cNvPr>
+          <p:cNvSpPr>
+            <a:spLocks noGrp="1"/>
+          </p:cNvSpPr>
+          <p:nvPr>
+            <p:ph type="title"/>
+          </p:nvPr>
+        </p:nvSpPr>
+        <p:spPr/>
+        <p:txBody>
+          <a:bodyPr/>
+          <a:lstStyle/>
+          <a:p>
+            <a:r>
+              <a:rPr kumimoji="1" lang="en-US" altLang="zh-CN" dirty="0"/>
+              <a:t>Neo4j</a:t>
+            </a:r>
+            <a:r>
+              <a:rPr kumimoji="1" lang="zh-CN" altLang="en-US" dirty="0"/>
+              <a:t>集群</a:t>
+            </a:r>
+          </a:p>
+        </p:txBody>
+      </p:sp>
+      <p:sp>
+        <p:nvSpPr>
+          <p:cNvPr id="3" name="内容占位符 2">
+            <a:extLst>
+              <a:ext uri="{FF2B5EF4-FFF2-40B4-BE49-F238E27FC236}">
+                <a16:creationId xmlns:a16="http://schemas.microsoft.com/office/drawing/2014/main" id="{FDEB43B0-99BE-2942-94CE-82F7E461D492}"/>
+              </a:ext>
+            </a:extLst>
+          </p:cNvPr>
+          <p:cNvSpPr>
+            <a:spLocks noGrp="1"/>
+          </p:cNvSpPr>
+          <p:nvPr>
+            <p:ph idx="1"/>
+          </p:nvPr>
+        </p:nvSpPr>
+        <p:spPr/>
+        <p:txBody>
+          <a:bodyPr/>
+          <a:lstStyle/>
+          <a:p>
+            <a:endParaRPr kumimoji="1" lang="zh-CN" altLang="en-US" dirty="0"/>
+          </a:p>
+        </p:txBody>
+      </p:sp>
+    </p:spTree>
+    <p:extLst>
+      <p:ext uri="{BB962C8B-B14F-4D97-AF65-F5344CB8AC3E}">
+        <p14:creationId xmlns:p14="http://schemas.microsoft.com/office/powerpoint/2010/main" val="2155202387"/>
+      </p:ext>
+    </p:extLst>
+  </p:cSld>
+  <p:clrMapOvr>
+    <a:masterClrMapping/>
+  </p:clrMapOvr>
+</p:sld>
+</file>
+
+<file path=ppt/slides/slide26.xml><?xml version="1.0" encoding="utf-8"?>
+<p:sld xmlns:a="http://schemas.openxmlformats.org/drawingml/2006/main" xmlns:r="http://schemas.openxmlformats.org/officeDocument/2006/relationships" xmlns:p="http://schemas.openxmlformats.org/presentationml/2006/main">
+  <p:cSld>
+    <p:spTree>
+      <p:nvGrpSpPr>
+        <p:cNvPr id="1" name=""/>
+        <p:cNvGrpSpPr/>
+        <p:nvPr/>
+      </p:nvGrpSpPr>
+      <p:grpSpPr>
+        <a:xfrm>
+          <a:off x="0" y="0"/>
+          <a:ext cx="0" cy="0"/>
+          <a:chOff x="0" y="0"/>
+          <a:chExt cx="0" cy="0"/>
+        </a:xfrm>
+      </p:grpSpPr>
+      <p:sp>
+        <p:nvSpPr>
+          <p:cNvPr id="2" name="标题 1">
+            <a:extLst>
+              <a:ext uri="{FF2B5EF4-FFF2-40B4-BE49-F238E27FC236}">
                 <a16:creationId xmlns:a16="http://schemas.microsoft.com/office/drawing/2014/main" id="{5ED9FB76-02BD-7D40-A6E0-3DE346D556DF}"/>
               </a:ext>
             </a:extLst>
@@ -12528,6 +13668,25 @@
               <a:rPr lang="zh-CN" altLang="en-US" dirty="0">
                 <a:effectLst/>
                 <a:hlinkClick r:id="rId5"/>
+              </a:rPr>
+              <a:t>底层存储</a:t>
+            </a:r>
+            <a:endParaRPr lang="en-US" altLang="zh-CN" dirty="0">
+              <a:effectLst/>
+            </a:endParaRPr>
+          </a:p>
+          <a:p>
+            <a:r>
+              <a:rPr lang="en" altLang="zh-CN" dirty="0">
+                <a:effectLst/>
+                <a:hlinkClick r:id="rId6"/>
+              </a:rPr>
+              <a:t>Neo4j</a:t>
+            </a:r>
+            <a:r>
+              <a:rPr lang="zh-CN" altLang="en-US" dirty="0">
+                <a:effectLst/>
+                <a:hlinkClick r:id="rId6"/>
               </a:rPr>
               <a:t>底层存储</a:t>
             </a:r>

</xml_diff>